<commit_message>
Add section on data types
</commit_message>
<xml_diff>
--- a/Julia,_good_back_ugly.pptx
+++ b/Julia,_good_back_ugly.pptx
@@ -7,11 +7,17 @@
   <p:sldIdLst>
     <p:sldId id="256" r:id="rId2"/>
     <p:sldId id="257" r:id="rId3"/>
-    <p:sldId id="259" r:id="rId4"/>
-    <p:sldId id="258" r:id="rId5"/>
-    <p:sldId id="260" r:id="rId6"/>
-    <p:sldId id="261" r:id="rId7"/>
-    <p:sldId id="262" r:id="rId8"/>
+    <p:sldId id="263" r:id="rId4"/>
+    <p:sldId id="259" r:id="rId5"/>
+    <p:sldId id="258" r:id="rId6"/>
+    <p:sldId id="260" r:id="rId7"/>
+    <p:sldId id="261" r:id="rId8"/>
+    <p:sldId id="262" r:id="rId9"/>
+    <p:sldId id="264" r:id="rId10"/>
+    <p:sldId id="266" r:id="rId11"/>
+    <p:sldId id="267" r:id="rId12"/>
+    <p:sldId id="268" r:id="rId13"/>
+    <p:sldId id="265" r:id="rId14"/>
   </p:sldIdLst>
   <p:sldSz cx="12192000" cy="6858000"/>
   <p:notesSz cx="6858000" cy="9144000"/>
@@ -3415,6 +3421,1436 @@
 </p:sld>
 </file>
 
+<file path=ppt/slides/slide10.xml><?xml version="1.0" encoding="utf-8"?>
+<p:sld xmlns:a="http://schemas.openxmlformats.org/drawingml/2006/main" xmlns:r="http://schemas.openxmlformats.org/officeDocument/2006/relationships" xmlns:p="http://schemas.openxmlformats.org/presentationml/2006/main">
+  <p:cSld>
+    <p:spTree>
+      <p:nvGrpSpPr>
+        <p:cNvPr id="1" name=""/>
+        <p:cNvGrpSpPr/>
+        <p:nvPr/>
+      </p:nvGrpSpPr>
+      <p:grpSpPr>
+        <a:xfrm>
+          <a:off x="0" y="0"/>
+          <a:ext cx="0" cy="0"/>
+          <a:chOff x="0" y="0"/>
+          <a:chExt cx="0" cy="0"/>
+        </a:xfrm>
+      </p:grpSpPr>
+      <p:sp>
+        <p:nvSpPr>
+          <p:cNvPr id="2" name="Title 1">
+            <a:extLst>
+              <a:ext uri="{FF2B5EF4-FFF2-40B4-BE49-F238E27FC236}">
+                <a16:creationId xmlns:a16="http://schemas.microsoft.com/office/drawing/2014/main" id="{DE8AF62F-AC75-4212-9AE7-C283CD4CDC59}"/>
+              </a:ext>
+            </a:extLst>
+          </p:cNvPr>
+          <p:cNvSpPr>
+            <a:spLocks noGrp="1"/>
+          </p:cNvSpPr>
+          <p:nvPr>
+            <p:ph type="title"/>
+          </p:nvPr>
+        </p:nvSpPr>
+        <p:spPr/>
+        <p:txBody>
+          <a:bodyPr/>
+          <a:lstStyle/>
+          <a:p>
+            <a:r>
+              <a:rPr lang="en-US" dirty="0"/>
+              <a:t>Basic data types</a:t>
+            </a:r>
+          </a:p>
+        </p:txBody>
+      </p:sp>
+      <p:sp>
+        <p:nvSpPr>
+          <p:cNvPr id="3" name="Content Placeholder 2">
+            <a:extLst>
+              <a:ext uri="{FF2B5EF4-FFF2-40B4-BE49-F238E27FC236}">
+                <a16:creationId xmlns:a16="http://schemas.microsoft.com/office/drawing/2014/main" id="{239263D6-7F67-4595-9168-D847FCA4F41E}"/>
+              </a:ext>
+            </a:extLst>
+          </p:cNvPr>
+          <p:cNvSpPr>
+            <a:spLocks noGrp="1"/>
+          </p:cNvSpPr>
+          <p:nvPr>
+            <p:ph idx="1"/>
+          </p:nvPr>
+        </p:nvSpPr>
+        <p:spPr/>
+        <p:txBody>
+          <a:bodyPr>
+            <a:normAutofit fontScale="70000" lnSpcReduction="20000"/>
+          </a:bodyPr>
+          <a:lstStyle/>
+          <a:p>
+            <a:r>
+              <a:rPr lang="en-US" dirty="0"/>
+              <a:t>Integers:</a:t>
+            </a:r>
+          </a:p>
+          <a:p>
+            <a:pPr lvl="1"/>
+            <a:r>
+              <a:rPr lang="en-US" dirty="0">
+                <a:latin typeface="Consolas" panose="020B0609020204030204" pitchFamily="49" charset="0"/>
+              </a:rPr>
+              <a:t>Int8</a:t>
+            </a:r>
+            <a:r>
+              <a:rPr lang="en-US" dirty="0"/>
+              <a:t>, </a:t>
+            </a:r>
+            <a:r>
+              <a:rPr lang="en-US" dirty="0">
+                <a:latin typeface="Consolas" panose="020B0609020204030204" pitchFamily="49" charset="0"/>
+              </a:rPr>
+              <a:t>Int16</a:t>
+            </a:r>
+            <a:r>
+              <a:rPr lang="en-US" dirty="0"/>
+              <a:t>, </a:t>
+            </a:r>
+            <a:r>
+              <a:rPr lang="en-US" dirty="0">
+                <a:latin typeface="Consolas" panose="020B0609020204030204" pitchFamily="49" charset="0"/>
+              </a:rPr>
+              <a:t>Int32</a:t>
+            </a:r>
+            <a:r>
+              <a:rPr lang="en-US" dirty="0"/>
+              <a:t>, </a:t>
+            </a:r>
+            <a:r>
+              <a:rPr lang="en-US" dirty="0">
+                <a:latin typeface="Consolas" panose="020B0609020204030204" pitchFamily="49" charset="0"/>
+              </a:rPr>
+              <a:t>Int64</a:t>
+            </a:r>
+            <a:r>
+              <a:rPr lang="en-US" dirty="0"/>
+              <a:t>, </a:t>
+            </a:r>
+            <a:r>
+              <a:rPr lang="en-US" dirty="0">
+                <a:latin typeface="Consolas" panose="020B0609020204030204" pitchFamily="49" charset="0"/>
+              </a:rPr>
+              <a:t>Int128</a:t>
+            </a:r>
+            <a:endParaRPr lang="en-US" dirty="0"/>
+          </a:p>
+          <a:p>
+            <a:pPr lvl="1"/>
+            <a:r>
+              <a:rPr lang="en-US" dirty="0">
+                <a:latin typeface="Consolas" panose="020B0609020204030204" pitchFamily="49" charset="0"/>
+              </a:rPr>
+              <a:t>UInt8</a:t>
+            </a:r>
+            <a:r>
+              <a:rPr lang="en-US" dirty="0"/>
+              <a:t>, </a:t>
+            </a:r>
+            <a:r>
+              <a:rPr lang="en-US" dirty="0">
+                <a:latin typeface="Consolas" panose="020B0609020204030204" pitchFamily="49" charset="0"/>
+              </a:rPr>
+              <a:t>UInt16</a:t>
+            </a:r>
+            <a:r>
+              <a:rPr lang="en-US" dirty="0"/>
+              <a:t>, </a:t>
+            </a:r>
+            <a:r>
+              <a:rPr lang="en-US" dirty="0">
+                <a:latin typeface="Consolas" panose="020B0609020204030204" pitchFamily="49" charset="0"/>
+              </a:rPr>
+              <a:t>UInt32</a:t>
+            </a:r>
+            <a:r>
+              <a:rPr lang="en-US" dirty="0"/>
+              <a:t>, </a:t>
+            </a:r>
+            <a:r>
+              <a:rPr lang="en-US" dirty="0">
+                <a:latin typeface="Consolas" panose="020B0609020204030204" pitchFamily="49" charset="0"/>
+              </a:rPr>
+              <a:t>UInt64</a:t>
+            </a:r>
+            <a:r>
+              <a:rPr lang="en-US" dirty="0"/>
+              <a:t>, </a:t>
+            </a:r>
+            <a:r>
+              <a:rPr lang="en-US" dirty="0">
+                <a:latin typeface="Consolas" panose="020B0609020204030204" pitchFamily="49" charset="0"/>
+              </a:rPr>
+              <a:t>UInt128</a:t>
+            </a:r>
+          </a:p>
+          <a:p>
+            <a:r>
+              <a:rPr lang="en-US" dirty="0"/>
+              <a:t>Rational numbers: </a:t>
+            </a:r>
+            <a:r>
+              <a:rPr lang="en-US" dirty="0">
+                <a:latin typeface="Consolas" panose="020B0609020204030204" pitchFamily="49" charset="0"/>
+              </a:rPr>
+              <a:t>Rational{</a:t>
+            </a:r>
+            <a:r>
+              <a:rPr lang="en-US" dirty="0" err="1">
+                <a:latin typeface="Consolas" panose="020B0609020204030204" pitchFamily="49" charset="0"/>
+              </a:rPr>
+              <a:t>int_type</a:t>
+            </a:r>
+            <a:r>
+              <a:rPr lang="en-US" dirty="0">
+                <a:latin typeface="Consolas" panose="020B0609020204030204" pitchFamily="49" charset="0"/>
+              </a:rPr>
+              <a:t>}</a:t>
+            </a:r>
+          </a:p>
+          <a:p>
+            <a:pPr lvl="1"/>
+            <a:r>
+              <a:rPr lang="en-US" dirty="0"/>
+              <a:t>E.g., </a:t>
+            </a:r>
+            <a:r>
+              <a:rPr lang="en-US" dirty="0">
+                <a:latin typeface="Consolas" panose="020B0609020204030204" pitchFamily="49" charset="0"/>
+              </a:rPr>
+              <a:t>1//3</a:t>
+            </a:r>
+            <a:r>
+              <a:rPr lang="en-US" dirty="0"/>
+              <a:t>, </a:t>
+            </a:r>
+            <a:r>
+              <a:rPr lang="en-US" dirty="0">
+                <a:latin typeface="Consolas" panose="020B0609020204030204" pitchFamily="49" charset="0"/>
+              </a:rPr>
+              <a:t>5//4</a:t>
+            </a:r>
+          </a:p>
+          <a:p>
+            <a:r>
+              <a:rPr lang="en-US" dirty="0"/>
+              <a:t>Floating point numbers: </a:t>
+            </a:r>
+            <a:r>
+              <a:rPr lang="en-US" dirty="0">
+                <a:latin typeface="Consolas" panose="020B0609020204030204" pitchFamily="49" charset="0"/>
+              </a:rPr>
+              <a:t>Float16</a:t>
+            </a:r>
+            <a:r>
+              <a:rPr lang="en-US" dirty="0"/>
+              <a:t>, </a:t>
+            </a:r>
+            <a:r>
+              <a:rPr lang="en-US" dirty="0">
+                <a:latin typeface="Consolas" panose="020B0609020204030204" pitchFamily="49" charset="0"/>
+              </a:rPr>
+              <a:t>Float32</a:t>
+            </a:r>
+            <a:r>
+              <a:rPr lang="en-US" dirty="0"/>
+              <a:t>, </a:t>
+            </a:r>
+            <a:r>
+              <a:rPr lang="en-US" dirty="0">
+                <a:latin typeface="Consolas" panose="020B0609020204030204" pitchFamily="49" charset="0"/>
+              </a:rPr>
+              <a:t>Float64</a:t>
+            </a:r>
+            <a:endParaRPr lang="en-US" dirty="0"/>
+          </a:p>
+          <a:p>
+            <a:r>
+              <a:rPr lang="en-US" dirty="0"/>
+              <a:t>Complex numbers: </a:t>
+            </a:r>
+            <a:r>
+              <a:rPr lang="en-US" dirty="0">
+                <a:latin typeface="Consolas" panose="020B0609020204030204" pitchFamily="49" charset="0"/>
+              </a:rPr>
+              <a:t>ComplexF16</a:t>
+            </a:r>
+            <a:r>
+              <a:rPr lang="en-US" dirty="0"/>
+              <a:t>, </a:t>
+            </a:r>
+            <a:r>
+              <a:rPr lang="en-US" dirty="0">
+                <a:latin typeface="Consolas" panose="020B0609020204030204" pitchFamily="49" charset="0"/>
+              </a:rPr>
+              <a:t>ComplexF32</a:t>
+            </a:r>
+            <a:r>
+              <a:rPr lang="en-US" dirty="0"/>
+              <a:t>, </a:t>
+            </a:r>
+            <a:r>
+              <a:rPr lang="en-US" dirty="0">
+                <a:latin typeface="Consolas" panose="020B0609020204030204" pitchFamily="49" charset="0"/>
+              </a:rPr>
+              <a:t>ComplexF64</a:t>
+            </a:r>
+            <a:endParaRPr lang="en-US" dirty="0"/>
+          </a:p>
+          <a:p>
+            <a:pPr lvl="1"/>
+            <a:r>
+              <a:rPr lang="en-US" dirty="0"/>
+              <a:t>E.g., </a:t>
+            </a:r>
+            <a:r>
+              <a:rPr lang="en-US" dirty="0">
+                <a:latin typeface="Consolas" panose="020B0609020204030204" pitchFamily="49" charset="0"/>
+              </a:rPr>
+              <a:t>3.1 – 0.3im</a:t>
+            </a:r>
+          </a:p>
+          <a:p>
+            <a:r>
+              <a:rPr lang="en-US" dirty="0"/>
+              <a:t>Boolean type: </a:t>
+            </a:r>
+            <a:r>
+              <a:rPr lang="en-US" dirty="0">
+                <a:latin typeface="Consolas" panose="020B0609020204030204" pitchFamily="49" charset="0"/>
+              </a:rPr>
+              <a:t>Bool</a:t>
+            </a:r>
+            <a:r>
+              <a:rPr lang="en-US" dirty="0"/>
+              <a:t> (8-bit)</a:t>
+            </a:r>
+          </a:p>
+          <a:p>
+            <a:pPr lvl="1"/>
+            <a:r>
+              <a:rPr lang="en-US" dirty="0">
+                <a:latin typeface="Consolas" panose="020B0609020204030204" pitchFamily="49" charset="0"/>
+              </a:rPr>
+              <a:t>true</a:t>
+            </a:r>
+            <a:r>
+              <a:rPr lang="en-US" dirty="0"/>
+              <a:t>/</a:t>
+            </a:r>
+            <a:r>
+              <a:rPr lang="en-US" dirty="0">
+                <a:latin typeface="Consolas" panose="020B0609020204030204" pitchFamily="49" charset="0"/>
+              </a:rPr>
+              <a:t>false</a:t>
+            </a:r>
+          </a:p>
+          <a:p>
+            <a:r>
+              <a:rPr lang="en-US" dirty="0"/>
+              <a:t>Character type: </a:t>
+            </a:r>
+            <a:r>
+              <a:rPr lang="en-US" dirty="0">
+                <a:latin typeface="Consolas" panose="020B0609020204030204" pitchFamily="49" charset="0"/>
+              </a:rPr>
+              <a:t>Char</a:t>
+            </a:r>
+            <a:r>
+              <a:rPr lang="en-US" dirty="0"/>
+              <a:t> (32-bit Unicode)</a:t>
+            </a:r>
+          </a:p>
+          <a:p>
+            <a:pPr lvl="1"/>
+            <a:r>
+              <a:rPr lang="en-US" dirty="0"/>
+              <a:t>E.g., </a:t>
+            </a:r>
+            <a:r>
+              <a:rPr lang="en-US" dirty="0">
+                <a:latin typeface="Consolas" panose="020B0609020204030204" pitchFamily="49" charset="0"/>
+              </a:rPr>
+              <a:t>'a'</a:t>
+            </a:r>
+            <a:r>
+              <a:rPr lang="en-US" dirty="0"/>
+              <a:t>, </a:t>
+            </a:r>
+            <a:r>
+              <a:rPr lang="en-US" dirty="0">
+                <a:latin typeface="Consolas" panose="020B0609020204030204" pitchFamily="49" charset="0"/>
+              </a:rPr>
+              <a:t>'\t'</a:t>
+            </a:r>
+          </a:p>
+          <a:p>
+            <a:r>
+              <a:rPr lang="en-US" dirty="0"/>
+              <a:t>Strings: </a:t>
+            </a:r>
+            <a:r>
+              <a:rPr lang="en-US" dirty="0">
+                <a:latin typeface="Consolas" panose="020B0609020204030204" pitchFamily="49" charset="0"/>
+              </a:rPr>
+              <a:t>String</a:t>
+            </a:r>
+          </a:p>
+          <a:p>
+            <a:pPr lvl="1"/>
+            <a:r>
+              <a:rPr lang="en-US" dirty="0"/>
+              <a:t>E.g., </a:t>
+            </a:r>
+            <a:r>
+              <a:rPr lang="en-US" dirty="0">
+                <a:latin typeface="Consolas" panose="020B0609020204030204" pitchFamily="49" charset="0"/>
+              </a:rPr>
+              <a:t>"</a:t>
+            </a:r>
+            <a:r>
+              <a:rPr lang="en-US" dirty="0" err="1">
+                <a:latin typeface="Consolas" panose="020B0609020204030204" pitchFamily="49" charset="0"/>
+              </a:rPr>
+              <a:t>abc</a:t>
+            </a:r>
+            <a:r>
+              <a:rPr lang="en-US" dirty="0">
+                <a:latin typeface="Consolas" panose="020B0609020204030204" pitchFamily="49" charset="0"/>
+              </a:rPr>
+              <a:t>"</a:t>
+            </a:r>
+          </a:p>
+        </p:txBody>
+      </p:sp>
+    </p:spTree>
+    <p:extLst>
+      <p:ext uri="{BB962C8B-B14F-4D97-AF65-F5344CB8AC3E}">
+        <p14:creationId xmlns:p14="http://schemas.microsoft.com/office/powerpoint/2010/main" val="1672226632"/>
+      </p:ext>
+    </p:extLst>
+  </p:cSld>
+  <p:clrMapOvr>
+    <a:masterClrMapping/>
+  </p:clrMapOvr>
+</p:sld>
+</file>
+
+<file path=ppt/slides/slide11.xml><?xml version="1.0" encoding="utf-8"?>
+<p:sld xmlns:a="http://schemas.openxmlformats.org/drawingml/2006/main" xmlns:r="http://schemas.openxmlformats.org/officeDocument/2006/relationships" xmlns:p="http://schemas.openxmlformats.org/presentationml/2006/main">
+  <p:cSld>
+    <p:spTree>
+      <p:nvGrpSpPr>
+        <p:cNvPr id="1" name=""/>
+        <p:cNvGrpSpPr/>
+        <p:nvPr/>
+      </p:nvGrpSpPr>
+      <p:grpSpPr>
+        <a:xfrm>
+          <a:off x="0" y="0"/>
+          <a:ext cx="0" cy="0"/>
+          <a:chOff x="0" y="0"/>
+          <a:chExt cx="0" cy="0"/>
+        </a:xfrm>
+      </p:grpSpPr>
+      <p:sp>
+        <p:nvSpPr>
+          <p:cNvPr id="2" name="Title 1">
+            <a:extLst>
+              <a:ext uri="{FF2B5EF4-FFF2-40B4-BE49-F238E27FC236}">
+                <a16:creationId xmlns:a16="http://schemas.microsoft.com/office/drawing/2014/main" id="{C601246C-1472-42AD-B64D-5A38240DD9CA}"/>
+              </a:ext>
+            </a:extLst>
+          </p:cNvPr>
+          <p:cNvSpPr>
+            <a:spLocks noGrp="1"/>
+          </p:cNvSpPr>
+          <p:nvPr>
+            <p:ph type="title"/>
+          </p:nvPr>
+        </p:nvSpPr>
+        <p:spPr/>
+        <p:txBody>
+          <a:bodyPr/>
+          <a:lstStyle/>
+          <a:p>
+            <a:r>
+              <a:rPr lang="en-US" dirty="0"/>
+              <a:t>Structures: mutable versus immutable</a:t>
+            </a:r>
+          </a:p>
+        </p:txBody>
+      </p:sp>
+      <p:sp>
+        <p:nvSpPr>
+          <p:cNvPr id="4" name="TextBox 3">
+            <a:extLst>
+              <a:ext uri="{FF2B5EF4-FFF2-40B4-BE49-F238E27FC236}">
+                <a16:creationId xmlns:a16="http://schemas.microsoft.com/office/drawing/2014/main" id="{DD3C4166-BFE6-4D41-B557-12E7B38FF60B}"/>
+              </a:ext>
+            </a:extLst>
+          </p:cNvPr>
+          <p:cNvSpPr txBox="1"/>
+          <p:nvPr/>
+        </p:nvSpPr>
+        <p:spPr>
+          <a:xfrm>
+            <a:off x="724930" y="1867639"/>
+            <a:ext cx="4716166" cy="1477328"/>
+          </a:xfrm>
+          <a:prstGeom prst="rect">
+            <a:avLst/>
+          </a:prstGeom>
+          <a:solidFill>
+            <a:schemeClr val="bg1">
+              <a:lumMod val="85000"/>
+            </a:schemeClr>
+          </a:solidFill>
+        </p:spPr>
+        <p:txBody>
+          <a:bodyPr wrap="square" rtlCol="0">
+            <a:spAutoFit/>
+          </a:bodyPr>
+          <a:lstStyle/>
+          <a:p>
+            <a:r>
+              <a:rPr lang="en-US" dirty="0">
+                <a:latin typeface="Consolas" panose="020B0609020204030204" pitchFamily="49" charset="0"/>
+              </a:rPr>
+              <a:t>struct Person</a:t>
+            </a:r>
+          </a:p>
+          <a:p>
+            <a:r>
+              <a:rPr lang="en-US" dirty="0">
+                <a:latin typeface="Consolas" panose="020B0609020204030204" pitchFamily="49" charset="0"/>
+              </a:rPr>
+              <a:t>    </a:t>
+            </a:r>
+            <a:r>
+              <a:rPr lang="en-US" dirty="0" err="1">
+                <a:latin typeface="Consolas" panose="020B0609020204030204" pitchFamily="49" charset="0"/>
+              </a:rPr>
+              <a:t>first_name</a:t>
+            </a:r>
+            <a:r>
+              <a:rPr lang="en-US" dirty="0">
+                <a:latin typeface="Consolas" panose="020B0609020204030204" pitchFamily="49" charset="0"/>
+              </a:rPr>
+              <a:t>::String</a:t>
+            </a:r>
+          </a:p>
+          <a:p>
+            <a:r>
+              <a:rPr lang="en-US" dirty="0">
+                <a:latin typeface="Consolas" panose="020B0609020204030204" pitchFamily="49" charset="0"/>
+              </a:rPr>
+              <a:t>    </a:t>
+            </a:r>
+            <a:r>
+              <a:rPr lang="en-US" dirty="0" err="1">
+                <a:latin typeface="Consolas" panose="020B0609020204030204" pitchFamily="49" charset="0"/>
+              </a:rPr>
+              <a:t>last_name</a:t>
+            </a:r>
+            <a:r>
+              <a:rPr lang="en-US" dirty="0">
+                <a:latin typeface="Consolas" panose="020B0609020204030204" pitchFamily="49" charset="0"/>
+              </a:rPr>
+              <a:t>::String</a:t>
+            </a:r>
+          </a:p>
+          <a:p>
+            <a:r>
+              <a:rPr lang="en-US" dirty="0">
+                <a:latin typeface="Consolas" panose="020B0609020204030204" pitchFamily="49" charset="0"/>
+              </a:rPr>
+              <a:t>    age::Int8</a:t>
+            </a:r>
+          </a:p>
+          <a:p>
+            <a:r>
+              <a:rPr lang="en-US" dirty="0">
+                <a:latin typeface="Consolas" panose="020B0609020204030204" pitchFamily="49" charset="0"/>
+              </a:rPr>
+              <a:t>end</a:t>
+            </a:r>
+          </a:p>
+        </p:txBody>
+      </p:sp>
+      <p:sp>
+        <p:nvSpPr>
+          <p:cNvPr id="5" name="TextBox 4">
+            <a:extLst>
+              <a:ext uri="{FF2B5EF4-FFF2-40B4-BE49-F238E27FC236}">
+                <a16:creationId xmlns:a16="http://schemas.microsoft.com/office/drawing/2014/main" id="{B96BA6E3-9B93-4A60-8854-1A4F8E21DA3F}"/>
+              </a:ext>
+            </a:extLst>
+          </p:cNvPr>
+          <p:cNvSpPr txBox="1"/>
+          <p:nvPr/>
+        </p:nvSpPr>
+        <p:spPr>
+          <a:xfrm>
+            <a:off x="6404919" y="1867639"/>
+            <a:ext cx="4716166" cy="369332"/>
+          </a:xfrm>
+          <a:prstGeom prst="rect">
+            <a:avLst/>
+          </a:prstGeom>
+          <a:solidFill>
+            <a:schemeClr val="bg1">
+              <a:lumMod val="85000"/>
+            </a:schemeClr>
+          </a:solidFill>
+        </p:spPr>
+        <p:txBody>
+          <a:bodyPr wrap="square" rtlCol="0">
+            <a:spAutoFit/>
+          </a:bodyPr>
+          <a:lstStyle/>
+          <a:p>
+            <a:r>
+              <a:rPr lang="en-US" dirty="0">
+                <a:latin typeface="Consolas" panose="020B0609020204030204" pitchFamily="49" charset="0"/>
+              </a:rPr>
+              <a:t>me = Person("Geert Jan", "Bex", 53)</a:t>
+            </a:r>
+          </a:p>
+        </p:txBody>
+      </p:sp>
+      <p:sp>
+        <p:nvSpPr>
+          <p:cNvPr id="6" name="TextBox 5">
+            <a:extLst>
+              <a:ext uri="{FF2B5EF4-FFF2-40B4-BE49-F238E27FC236}">
+                <a16:creationId xmlns:a16="http://schemas.microsoft.com/office/drawing/2014/main" id="{7D7A28D2-B9DE-496F-AB45-1940C1BD6414}"/>
+              </a:ext>
+            </a:extLst>
+          </p:cNvPr>
+          <p:cNvSpPr txBox="1"/>
+          <p:nvPr/>
+        </p:nvSpPr>
+        <p:spPr>
+          <a:xfrm>
+            <a:off x="7900087" y="1321356"/>
+            <a:ext cx="1416798" cy="400110"/>
+          </a:xfrm>
+          <a:prstGeom prst="rect">
+            <a:avLst/>
+          </a:prstGeom>
+          <a:noFill/>
+        </p:spPr>
+        <p:txBody>
+          <a:bodyPr wrap="none" rtlCol="0">
+            <a:spAutoFit/>
+          </a:bodyPr>
+          <a:lstStyle/>
+          <a:p>
+            <a:r>
+              <a:rPr lang="en-US" sz="2000" dirty="0"/>
+              <a:t>Constructor</a:t>
+            </a:r>
+          </a:p>
+        </p:txBody>
+      </p:sp>
+      <p:cxnSp>
+        <p:nvCxnSpPr>
+          <p:cNvPr id="8" name="Straight Arrow Connector 7">
+            <a:extLst>
+              <a:ext uri="{FF2B5EF4-FFF2-40B4-BE49-F238E27FC236}">
+                <a16:creationId xmlns:a16="http://schemas.microsoft.com/office/drawing/2014/main" id="{8B46CAF8-9364-41D0-815F-090D5D476AA7}"/>
+              </a:ext>
+            </a:extLst>
+          </p:cNvPr>
+          <p:cNvCxnSpPr>
+            <a:stCxn id="6" idx="1"/>
+          </p:cNvCxnSpPr>
+          <p:nvPr/>
+        </p:nvCxnSpPr>
+        <p:spPr>
+          <a:xfrm flipH="1">
+            <a:off x="7595287" y="1521411"/>
+            <a:ext cx="304800" cy="346228"/>
+          </a:xfrm>
+          <a:prstGeom prst="straightConnector1">
+            <a:avLst/>
+          </a:prstGeom>
+          <a:ln w="12700">
+            <a:solidFill>
+              <a:schemeClr val="tx1"/>
+            </a:solidFill>
+            <a:tailEnd type="stealth" w="lg" len="lg"/>
+          </a:ln>
+        </p:spPr>
+        <p:style>
+          <a:lnRef idx="1">
+            <a:schemeClr val="accent1"/>
+          </a:lnRef>
+          <a:fillRef idx="0">
+            <a:schemeClr val="accent1"/>
+          </a:fillRef>
+          <a:effectRef idx="0">
+            <a:schemeClr val="accent1"/>
+          </a:effectRef>
+          <a:fontRef idx="minor">
+            <a:schemeClr val="tx1"/>
+          </a:fontRef>
+        </p:style>
+      </p:cxnSp>
+      <p:sp>
+        <p:nvSpPr>
+          <p:cNvPr id="9" name="TextBox 8">
+            <a:extLst>
+              <a:ext uri="{FF2B5EF4-FFF2-40B4-BE49-F238E27FC236}">
+                <a16:creationId xmlns:a16="http://schemas.microsoft.com/office/drawing/2014/main" id="{E4900A48-CAE2-4B5D-A74C-2CFAAA86868A}"/>
+              </a:ext>
+            </a:extLst>
+          </p:cNvPr>
+          <p:cNvSpPr txBox="1"/>
+          <p:nvPr/>
+        </p:nvSpPr>
+        <p:spPr>
+          <a:xfrm>
+            <a:off x="6404919" y="2421637"/>
+            <a:ext cx="4716166" cy="369332"/>
+          </a:xfrm>
+          <a:prstGeom prst="rect">
+            <a:avLst/>
+          </a:prstGeom>
+          <a:solidFill>
+            <a:schemeClr val="bg1">
+              <a:lumMod val="85000"/>
+            </a:schemeClr>
+          </a:solidFill>
+        </p:spPr>
+        <p:txBody>
+          <a:bodyPr wrap="square" rtlCol="0">
+            <a:spAutoFit/>
+          </a:bodyPr>
+          <a:lstStyle/>
+          <a:p>
+            <a:r>
+              <a:rPr lang="en-US" dirty="0" err="1">
+                <a:latin typeface="Consolas" panose="020B0609020204030204" pitchFamily="49" charset="0"/>
+              </a:rPr>
+              <a:t>println</a:t>
+            </a:r>
+            <a:r>
+              <a:rPr lang="en-US" dirty="0">
+                <a:latin typeface="Consolas" panose="020B0609020204030204" pitchFamily="49" charset="0"/>
+              </a:rPr>
+              <a:t>(</a:t>
+            </a:r>
+            <a:r>
+              <a:rPr lang="en-US" dirty="0" err="1">
+                <a:latin typeface="Consolas" panose="020B0609020204030204" pitchFamily="49" charset="0"/>
+              </a:rPr>
+              <a:t>me.age</a:t>
+            </a:r>
+            <a:r>
+              <a:rPr lang="en-US" dirty="0">
+                <a:latin typeface="Consolas" panose="020B0609020204030204" pitchFamily="49" charset="0"/>
+              </a:rPr>
+              <a:t>)</a:t>
+            </a:r>
+          </a:p>
+        </p:txBody>
+      </p:sp>
+      <p:sp>
+        <p:nvSpPr>
+          <p:cNvPr id="10" name="TextBox 9">
+            <a:extLst>
+              <a:ext uri="{FF2B5EF4-FFF2-40B4-BE49-F238E27FC236}">
+                <a16:creationId xmlns:a16="http://schemas.microsoft.com/office/drawing/2014/main" id="{ECA9B219-F85D-4EB2-867C-CC0BE8CAC4F6}"/>
+              </a:ext>
+            </a:extLst>
+          </p:cNvPr>
+          <p:cNvSpPr txBox="1"/>
+          <p:nvPr/>
+        </p:nvSpPr>
+        <p:spPr>
+          <a:xfrm>
+            <a:off x="6404919" y="2975635"/>
+            <a:ext cx="4716166" cy="369332"/>
+          </a:xfrm>
+          <a:prstGeom prst="rect">
+            <a:avLst/>
+          </a:prstGeom>
+          <a:solidFill>
+            <a:schemeClr val="bg1">
+              <a:lumMod val="85000"/>
+            </a:schemeClr>
+          </a:solidFill>
+        </p:spPr>
+        <p:txBody>
+          <a:bodyPr wrap="square" rtlCol="0">
+            <a:spAutoFit/>
+          </a:bodyPr>
+          <a:lstStyle/>
+          <a:p>
+            <a:r>
+              <a:rPr lang="en-US" dirty="0" err="1">
+                <a:latin typeface="Consolas" panose="020B0609020204030204" pitchFamily="49" charset="0"/>
+              </a:rPr>
+              <a:t>me.age</a:t>
+            </a:r>
+            <a:r>
+              <a:rPr lang="en-US" dirty="0">
+                <a:latin typeface="Consolas" panose="020B0609020204030204" pitchFamily="49" charset="0"/>
+              </a:rPr>
+              <a:t> += 1</a:t>
+            </a:r>
+          </a:p>
+        </p:txBody>
+      </p:sp>
+      <p:sp>
+        <p:nvSpPr>
+          <p:cNvPr id="11" name="TextBox 10">
+            <a:extLst>
+              <a:ext uri="{FF2B5EF4-FFF2-40B4-BE49-F238E27FC236}">
+                <a16:creationId xmlns:a16="http://schemas.microsoft.com/office/drawing/2014/main" id="{06172FA5-057B-48E1-A1DE-74ACCBAE05A0}"/>
+              </a:ext>
+            </a:extLst>
+          </p:cNvPr>
+          <p:cNvSpPr txBox="1"/>
+          <p:nvPr/>
+        </p:nvSpPr>
+        <p:spPr>
+          <a:xfrm>
+            <a:off x="8431995" y="2446864"/>
+            <a:ext cx="352982" cy="461665"/>
+          </a:xfrm>
+          <a:prstGeom prst="rect">
+            <a:avLst/>
+          </a:prstGeom>
+          <a:noFill/>
+        </p:spPr>
+        <p:txBody>
+          <a:bodyPr wrap="none" rtlCol="0">
+            <a:spAutoFit/>
+          </a:bodyPr>
+          <a:lstStyle/>
+          <a:p>
+            <a:r>
+              <a:rPr lang="en-US" sz="2400" b="1" i="1" dirty="0">
+                <a:solidFill>
+                  <a:srgbClr val="00B050"/>
+                </a:solidFill>
+                <a:sym typeface="Symbol" panose="05050102010706020507" pitchFamily="18" charset="2"/>
+              </a:rPr>
+              <a:t></a:t>
+            </a:r>
+            <a:endParaRPr lang="en-US" sz="2400" b="1" i="1" dirty="0">
+              <a:solidFill>
+                <a:srgbClr val="00B050"/>
+              </a:solidFill>
+            </a:endParaRPr>
+          </a:p>
+        </p:txBody>
+      </p:sp>
+      <p:grpSp>
+        <p:nvGrpSpPr>
+          <p:cNvPr id="20" name="Group 19">
+            <a:extLst>
+              <a:ext uri="{FF2B5EF4-FFF2-40B4-BE49-F238E27FC236}">
+                <a16:creationId xmlns:a16="http://schemas.microsoft.com/office/drawing/2014/main" id="{04248046-388E-4EF6-81C7-549217914255}"/>
+              </a:ext>
+            </a:extLst>
+          </p:cNvPr>
+          <p:cNvGrpSpPr/>
+          <p:nvPr/>
+        </p:nvGrpSpPr>
+        <p:grpSpPr>
+          <a:xfrm>
+            <a:off x="8522330" y="3093195"/>
+            <a:ext cx="262647" cy="175098"/>
+            <a:chOff x="6281635" y="4066162"/>
+            <a:chExt cx="262647" cy="175098"/>
+          </a:xfrm>
+        </p:grpSpPr>
+        <p:cxnSp>
+          <p:nvCxnSpPr>
+            <p:cNvPr id="13" name="Straight Connector 12">
+              <a:extLst>
+                <a:ext uri="{FF2B5EF4-FFF2-40B4-BE49-F238E27FC236}">
+                  <a16:creationId xmlns:a16="http://schemas.microsoft.com/office/drawing/2014/main" id="{11329053-26AD-4C83-98E3-87CDF2827771}"/>
+                </a:ext>
+              </a:extLst>
+            </p:cNvPr>
+            <p:cNvCxnSpPr/>
+            <p:nvPr/>
+          </p:nvCxnSpPr>
+          <p:spPr>
+            <a:xfrm>
+              <a:off x="6281635" y="4066162"/>
+              <a:ext cx="262647" cy="175098"/>
+            </a:xfrm>
+            <a:prstGeom prst="line">
+              <a:avLst/>
+            </a:prstGeom>
+            <a:ln w="19050">
+              <a:solidFill>
+                <a:srgbClr val="C00000"/>
+              </a:solidFill>
+            </a:ln>
+          </p:spPr>
+          <p:style>
+            <a:lnRef idx="1">
+              <a:schemeClr val="accent1"/>
+            </a:lnRef>
+            <a:fillRef idx="0">
+              <a:schemeClr val="accent1"/>
+            </a:fillRef>
+            <a:effectRef idx="0">
+              <a:schemeClr val="accent1"/>
+            </a:effectRef>
+            <a:fontRef idx="minor">
+              <a:schemeClr val="tx1"/>
+            </a:fontRef>
+          </p:style>
+        </p:cxnSp>
+        <p:cxnSp>
+          <p:nvCxnSpPr>
+            <p:cNvPr id="14" name="Straight Connector 13">
+              <a:extLst>
+                <a:ext uri="{FF2B5EF4-FFF2-40B4-BE49-F238E27FC236}">
+                  <a16:creationId xmlns:a16="http://schemas.microsoft.com/office/drawing/2014/main" id="{9E6E07F4-E77B-4B80-8CDD-51683CBEE030}"/>
+                </a:ext>
+              </a:extLst>
+            </p:cNvPr>
+            <p:cNvCxnSpPr>
+              <a:cxnSpLocks/>
+            </p:cNvCxnSpPr>
+            <p:nvPr/>
+          </p:nvCxnSpPr>
+          <p:spPr>
+            <a:xfrm flipV="1">
+              <a:off x="6347297" y="4066162"/>
+              <a:ext cx="196985" cy="175098"/>
+            </a:xfrm>
+            <a:prstGeom prst="line">
+              <a:avLst/>
+            </a:prstGeom>
+            <a:ln w="19050">
+              <a:solidFill>
+                <a:srgbClr val="C00000"/>
+              </a:solidFill>
+            </a:ln>
+          </p:spPr>
+          <p:style>
+            <a:lnRef idx="1">
+              <a:schemeClr val="accent1"/>
+            </a:lnRef>
+            <a:fillRef idx="0">
+              <a:schemeClr val="accent1"/>
+            </a:fillRef>
+            <a:effectRef idx="0">
+              <a:schemeClr val="accent1"/>
+            </a:effectRef>
+            <a:fontRef idx="minor">
+              <a:schemeClr val="tx1"/>
+            </a:fontRef>
+          </p:style>
+        </p:cxnSp>
+      </p:grpSp>
+      <p:sp>
+        <p:nvSpPr>
+          <p:cNvPr id="21" name="TextBox 20">
+            <a:extLst>
+              <a:ext uri="{FF2B5EF4-FFF2-40B4-BE49-F238E27FC236}">
+                <a16:creationId xmlns:a16="http://schemas.microsoft.com/office/drawing/2014/main" id="{B3CBD56A-568D-47BE-A706-4E919C580A9F}"/>
+              </a:ext>
+            </a:extLst>
+          </p:cNvPr>
+          <p:cNvSpPr txBox="1"/>
+          <p:nvPr/>
+        </p:nvSpPr>
+        <p:spPr>
+          <a:xfrm>
+            <a:off x="724930" y="3965571"/>
+            <a:ext cx="4716166" cy="1477328"/>
+          </a:xfrm>
+          <a:prstGeom prst="rect">
+            <a:avLst/>
+          </a:prstGeom>
+          <a:solidFill>
+            <a:schemeClr val="bg1">
+              <a:lumMod val="85000"/>
+            </a:schemeClr>
+          </a:solidFill>
+        </p:spPr>
+        <p:txBody>
+          <a:bodyPr wrap="square" rtlCol="0">
+            <a:spAutoFit/>
+          </a:bodyPr>
+          <a:lstStyle/>
+          <a:p>
+            <a:r>
+              <a:rPr lang="en-US" dirty="0">
+                <a:latin typeface="Consolas" panose="020B0609020204030204" pitchFamily="49" charset="0"/>
+              </a:rPr>
+              <a:t>mutable struct Person</a:t>
+            </a:r>
+          </a:p>
+          <a:p>
+            <a:r>
+              <a:rPr lang="en-US" dirty="0">
+                <a:latin typeface="Consolas" panose="020B0609020204030204" pitchFamily="49" charset="0"/>
+              </a:rPr>
+              <a:t>    </a:t>
+            </a:r>
+            <a:r>
+              <a:rPr lang="en-US" dirty="0" err="1">
+                <a:latin typeface="Consolas" panose="020B0609020204030204" pitchFamily="49" charset="0"/>
+              </a:rPr>
+              <a:t>first_name</a:t>
+            </a:r>
+            <a:r>
+              <a:rPr lang="en-US" dirty="0">
+                <a:latin typeface="Consolas" panose="020B0609020204030204" pitchFamily="49" charset="0"/>
+              </a:rPr>
+              <a:t>::String</a:t>
+            </a:r>
+          </a:p>
+          <a:p>
+            <a:r>
+              <a:rPr lang="en-US" dirty="0">
+                <a:latin typeface="Consolas" panose="020B0609020204030204" pitchFamily="49" charset="0"/>
+              </a:rPr>
+              <a:t>    </a:t>
+            </a:r>
+            <a:r>
+              <a:rPr lang="en-US" dirty="0" err="1">
+                <a:latin typeface="Consolas" panose="020B0609020204030204" pitchFamily="49" charset="0"/>
+              </a:rPr>
+              <a:t>last_name</a:t>
+            </a:r>
+            <a:r>
+              <a:rPr lang="en-US" dirty="0">
+                <a:latin typeface="Consolas" panose="020B0609020204030204" pitchFamily="49" charset="0"/>
+              </a:rPr>
+              <a:t>::String</a:t>
+            </a:r>
+          </a:p>
+          <a:p>
+            <a:r>
+              <a:rPr lang="en-US" dirty="0">
+                <a:latin typeface="Consolas" panose="020B0609020204030204" pitchFamily="49" charset="0"/>
+              </a:rPr>
+              <a:t>    age::Int8</a:t>
+            </a:r>
+          </a:p>
+          <a:p>
+            <a:r>
+              <a:rPr lang="en-US" dirty="0">
+                <a:latin typeface="Consolas" panose="020B0609020204030204" pitchFamily="49" charset="0"/>
+              </a:rPr>
+              <a:t>end</a:t>
+            </a:r>
+          </a:p>
+        </p:txBody>
+      </p:sp>
+      <p:sp>
+        <p:nvSpPr>
+          <p:cNvPr id="22" name="TextBox 21">
+            <a:extLst>
+              <a:ext uri="{FF2B5EF4-FFF2-40B4-BE49-F238E27FC236}">
+                <a16:creationId xmlns:a16="http://schemas.microsoft.com/office/drawing/2014/main" id="{20C7800F-9585-4022-8627-E94147A289ED}"/>
+              </a:ext>
+            </a:extLst>
+          </p:cNvPr>
+          <p:cNvSpPr txBox="1"/>
+          <p:nvPr/>
+        </p:nvSpPr>
+        <p:spPr>
+          <a:xfrm>
+            <a:off x="6404919" y="3965571"/>
+            <a:ext cx="4716166" cy="369332"/>
+          </a:xfrm>
+          <a:prstGeom prst="rect">
+            <a:avLst/>
+          </a:prstGeom>
+          <a:solidFill>
+            <a:schemeClr val="bg1">
+              <a:lumMod val="85000"/>
+            </a:schemeClr>
+          </a:solidFill>
+        </p:spPr>
+        <p:txBody>
+          <a:bodyPr wrap="square" rtlCol="0">
+            <a:spAutoFit/>
+          </a:bodyPr>
+          <a:lstStyle/>
+          <a:p>
+            <a:r>
+              <a:rPr lang="en-US" dirty="0">
+                <a:latin typeface="Consolas" panose="020B0609020204030204" pitchFamily="49" charset="0"/>
+              </a:rPr>
+              <a:t>me = Person("Geert Jan", "Bex", 53)</a:t>
+            </a:r>
+          </a:p>
+        </p:txBody>
+      </p:sp>
+      <p:sp>
+        <p:nvSpPr>
+          <p:cNvPr id="23" name="TextBox 22">
+            <a:extLst>
+              <a:ext uri="{FF2B5EF4-FFF2-40B4-BE49-F238E27FC236}">
+                <a16:creationId xmlns:a16="http://schemas.microsoft.com/office/drawing/2014/main" id="{7F8750D1-96BE-49C7-9162-ECD0CCD2F3B5}"/>
+              </a:ext>
+            </a:extLst>
+          </p:cNvPr>
+          <p:cNvSpPr txBox="1"/>
+          <p:nvPr/>
+        </p:nvSpPr>
+        <p:spPr>
+          <a:xfrm>
+            <a:off x="6404919" y="4519569"/>
+            <a:ext cx="4716166" cy="369332"/>
+          </a:xfrm>
+          <a:prstGeom prst="rect">
+            <a:avLst/>
+          </a:prstGeom>
+          <a:solidFill>
+            <a:schemeClr val="bg1">
+              <a:lumMod val="85000"/>
+            </a:schemeClr>
+          </a:solidFill>
+        </p:spPr>
+        <p:txBody>
+          <a:bodyPr wrap="square" rtlCol="0">
+            <a:spAutoFit/>
+          </a:bodyPr>
+          <a:lstStyle/>
+          <a:p>
+            <a:r>
+              <a:rPr lang="en-US" dirty="0" err="1">
+                <a:latin typeface="Consolas" panose="020B0609020204030204" pitchFamily="49" charset="0"/>
+              </a:rPr>
+              <a:t>println</a:t>
+            </a:r>
+            <a:r>
+              <a:rPr lang="en-US" dirty="0">
+                <a:latin typeface="Consolas" panose="020B0609020204030204" pitchFamily="49" charset="0"/>
+              </a:rPr>
+              <a:t>(</a:t>
+            </a:r>
+            <a:r>
+              <a:rPr lang="en-US" dirty="0" err="1">
+                <a:latin typeface="Consolas" panose="020B0609020204030204" pitchFamily="49" charset="0"/>
+              </a:rPr>
+              <a:t>me.age</a:t>
+            </a:r>
+            <a:r>
+              <a:rPr lang="en-US" dirty="0">
+                <a:latin typeface="Consolas" panose="020B0609020204030204" pitchFamily="49" charset="0"/>
+              </a:rPr>
+              <a:t>)</a:t>
+            </a:r>
+          </a:p>
+        </p:txBody>
+      </p:sp>
+      <p:sp>
+        <p:nvSpPr>
+          <p:cNvPr id="24" name="TextBox 23">
+            <a:extLst>
+              <a:ext uri="{FF2B5EF4-FFF2-40B4-BE49-F238E27FC236}">
+                <a16:creationId xmlns:a16="http://schemas.microsoft.com/office/drawing/2014/main" id="{16BACDBF-FF7F-4B9F-B715-1A786A08947B}"/>
+              </a:ext>
+            </a:extLst>
+          </p:cNvPr>
+          <p:cNvSpPr txBox="1"/>
+          <p:nvPr/>
+        </p:nvSpPr>
+        <p:spPr>
+          <a:xfrm>
+            <a:off x="6404919" y="5073567"/>
+            <a:ext cx="4716166" cy="369332"/>
+          </a:xfrm>
+          <a:prstGeom prst="rect">
+            <a:avLst/>
+          </a:prstGeom>
+          <a:solidFill>
+            <a:schemeClr val="bg1">
+              <a:lumMod val="85000"/>
+            </a:schemeClr>
+          </a:solidFill>
+        </p:spPr>
+        <p:txBody>
+          <a:bodyPr wrap="square" rtlCol="0">
+            <a:spAutoFit/>
+          </a:bodyPr>
+          <a:lstStyle/>
+          <a:p>
+            <a:r>
+              <a:rPr lang="en-US" dirty="0" err="1">
+                <a:latin typeface="Consolas" panose="020B0609020204030204" pitchFamily="49" charset="0"/>
+              </a:rPr>
+              <a:t>me.age</a:t>
+            </a:r>
+            <a:r>
+              <a:rPr lang="en-US" dirty="0">
+                <a:latin typeface="Consolas" panose="020B0609020204030204" pitchFamily="49" charset="0"/>
+              </a:rPr>
+              <a:t> += 1</a:t>
+            </a:r>
+          </a:p>
+        </p:txBody>
+      </p:sp>
+      <p:sp>
+        <p:nvSpPr>
+          <p:cNvPr id="25" name="TextBox 24">
+            <a:extLst>
+              <a:ext uri="{FF2B5EF4-FFF2-40B4-BE49-F238E27FC236}">
+                <a16:creationId xmlns:a16="http://schemas.microsoft.com/office/drawing/2014/main" id="{3A5A2F56-1B85-4C1A-87FD-F06898B8D554}"/>
+              </a:ext>
+            </a:extLst>
+          </p:cNvPr>
+          <p:cNvSpPr txBox="1"/>
+          <p:nvPr/>
+        </p:nvSpPr>
+        <p:spPr>
+          <a:xfrm>
+            <a:off x="8477162" y="4473402"/>
+            <a:ext cx="352982" cy="461665"/>
+          </a:xfrm>
+          <a:prstGeom prst="rect">
+            <a:avLst/>
+          </a:prstGeom>
+          <a:noFill/>
+        </p:spPr>
+        <p:txBody>
+          <a:bodyPr wrap="none" rtlCol="0">
+            <a:spAutoFit/>
+          </a:bodyPr>
+          <a:lstStyle/>
+          <a:p>
+            <a:r>
+              <a:rPr lang="en-US" sz="2400" b="1" i="1" dirty="0">
+                <a:solidFill>
+                  <a:srgbClr val="00B050"/>
+                </a:solidFill>
+                <a:sym typeface="Symbol" panose="05050102010706020507" pitchFamily="18" charset="2"/>
+              </a:rPr>
+              <a:t></a:t>
+            </a:r>
+            <a:endParaRPr lang="en-US" sz="2400" b="1" i="1" dirty="0">
+              <a:solidFill>
+                <a:srgbClr val="00B050"/>
+              </a:solidFill>
+            </a:endParaRPr>
+          </a:p>
+        </p:txBody>
+      </p:sp>
+      <p:sp>
+        <p:nvSpPr>
+          <p:cNvPr id="26" name="TextBox 25">
+            <a:extLst>
+              <a:ext uri="{FF2B5EF4-FFF2-40B4-BE49-F238E27FC236}">
+                <a16:creationId xmlns:a16="http://schemas.microsoft.com/office/drawing/2014/main" id="{FF19C974-3FE5-4389-AA02-8A0A6A686158}"/>
+              </a:ext>
+            </a:extLst>
+          </p:cNvPr>
+          <p:cNvSpPr txBox="1"/>
+          <p:nvPr/>
+        </p:nvSpPr>
+        <p:spPr>
+          <a:xfrm>
+            <a:off x="8466942" y="5044126"/>
+            <a:ext cx="352982" cy="461665"/>
+          </a:xfrm>
+          <a:prstGeom prst="rect">
+            <a:avLst/>
+          </a:prstGeom>
+          <a:noFill/>
+        </p:spPr>
+        <p:txBody>
+          <a:bodyPr wrap="none" rtlCol="0">
+            <a:spAutoFit/>
+          </a:bodyPr>
+          <a:lstStyle/>
+          <a:p>
+            <a:r>
+              <a:rPr lang="en-US" sz="2400" b="1" i="1" dirty="0">
+                <a:solidFill>
+                  <a:srgbClr val="00B050"/>
+                </a:solidFill>
+                <a:sym typeface="Symbol" panose="05050102010706020507" pitchFamily="18" charset="2"/>
+              </a:rPr>
+              <a:t></a:t>
+            </a:r>
+            <a:endParaRPr lang="en-US" sz="2400" b="1" i="1" dirty="0">
+              <a:solidFill>
+                <a:srgbClr val="00B050"/>
+              </a:solidFill>
+            </a:endParaRPr>
+          </a:p>
+        </p:txBody>
+      </p:sp>
+    </p:spTree>
+    <p:extLst>
+      <p:ext uri="{BB962C8B-B14F-4D97-AF65-F5344CB8AC3E}">
+        <p14:creationId xmlns:p14="http://schemas.microsoft.com/office/powerpoint/2010/main" val="2381680386"/>
+      </p:ext>
+    </p:extLst>
+  </p:cSld>
+  <p:clrMapOvr>
+    <a:masterClrMapping/>
+  </p:clrMapOvr>
+</p:sld>
+</file>
+
+<file path=ppt/slides/slide12.xml><?xml version="1.0" encoding="utf-8"?>
+<p:sld xmlns:a="http://schemas.openxmlformats.org/drawingml/2006/main" xmlns:r="http://schemas.openxmlformats.org/officeDocument/2006/relationships" xmlns:p="http://schemas.openxmlformats.org/presentationml/2006/main">
+  <p:cSld>
+    <p:spTree>
+      <p:nvGrpSpPr>
+        <p:cNvPr id="1" name=""/>
+        <p:cNvGrpSpPr/>
+        <p:nvPr/>
+      </p:nvGrpSpPr>
+      <p:grpSpPr>
+        <a:xfrm>
+          <a:off x="0" y="0"/>
+          <a:ext cx="0" cy="0"/>
+          <a:chOff x="0" y="0"/>
+          <a:chExt cx="0" cy="0"/>
+        </a:xfrm>
+      </p:grpSpPr>
+      <p:sp>
+        <p:nvSpPr>
+          <p:cNvPr id="2" name="Title 1">
+            <a:extLst>
+              <a:ext uri="{FF2B5EF4-FFF2-40B4-BE49-F238E27FC236}">
+                <a16:creationId xmlns:a16="http://schemas.microsoft.com/office/drawing/2014/main" id="{65A40D97-FFF5-4370-B499-70087C6EAD84}"/>
+              </a:ext>
+            </a:extLst>
+          </p:cNvPr>
+          <p:cNvSpPr>
+            <a:spLocks noGrp="1"/>
+          </p:cNvSpPr>
+          <p:nvPr>
+            <p:ph type="title"/>
+          </p:nvPr>
+        </p:nvSpPr>
+        <p:spPr/>
+        <p:txBody>
+          <a:bodyPr/>
+          <a:lstStyle/>
+          <a:p>
+            <a:r>
+              <a:rPr lang="en-US" dirty="0"/>
+              <a:t>Type hierarchies</a:t>
+            </a:r>
+          </a:p>
+        </p:txBody>
+      </p:sp>
+    </p:spTree>
+    <p:extLst>
+      <p:ext uri="{BB962C8B-B14F-4D97-AF65-F5344CB8AC3E}">
+        <p14:creationId xmlns:p14="http://schemas.microsoft.com/office/powerpoint/2010/main" val="2043097574"/>
+      </p:ext>
+    </p:extLst>
+  </p:cSld>
+  <p:clrMapOvr>
+    <a:masterClrMapping/>
+  </p:clrMapOvr>
+</p:sld>
+</file>
+
+<file path=ppt/slides/slide13.xml><?xml version="1.0" encoding="utf-8"?>
+<p:sld xmlns:a="http://schemas.openxmlformats.org/drawingml/2006/main" xmlns:r="http://schemas.openxmlformats.org/officeDocument/2006/relationships" xmlns:p="http://schemas.openxmlformats.org/presentationml/2006/main">
+  <p:cSld>
+    <p:spTree>
+      <p:nvGrpSpPr>
+        <p:cNvPr id="1" name=""/>
+        <p:cNvGrpSpPr/>
+        <p:nvPr/>
+      </p:nvGrpSpPr>
+      <p:grpSpPr>
+        <a:xfrm>
+          <a:off x="0" y="0"/>
+          <a:ext cx="0" cy="0"/>
+          <a:chOff x="0" y="0"/>
+          <a:chExt cx="0" cy="0"/>
+        </a:xfrm>
+      </p:grpSpPr>
+      <p:sp>
+        <p:nvSpPr>
+          <p:cNvPr id="2" name="Title 1">
+            <a:extLst>
+              <a:ext uri="{FF2B5EF4-FFF2-40B4-BE49-F238E27FC236}">
+                <a16:creationId xmlns:a16="http://schemas.microsoft.com/office/drawing/2014/main" id="{5996CC12-00C7-483E-8CFF-7965D13CF81D}"/>
+              </a:ext>
+            </a:extLst>
+          </p:cNvPr>
+          <p:cNvSpPr>
+            <a:spLocks noGrp="1"/>
+          </p:cNvSpPr>
+          <p:nvPr>
+            <p:ph type="title"/>
+          </p:nvPr>
+        </p:nvSpPr>
+        <p:spPr/>
+        <p:txBody>
+          <a:bodyPr/>
+          <a:lstStyle/>
+          <a:p>
+            <a:r>
+              <a:rPr lang="en-US" dirty="0"/>
+              <a:t>Methods</a:t>
+            </a:r>
+          </a:p>
+        </p:txBody>
+      </p:sp>
+      <p:sp>
+        <p:nvSpPr>
+          <p:cNvPr id="3" name="Text Placeholder 2">
+            <a:extLst>
+              <a:ext uri="{FF2B5EF4-FFF2-40B4-BE49-F238E27FC236}">
+                <a16:creationId xmlns:a16="http://schemas.microsoft.com/office/drawing/2014/main" id="{4DBA96D6-590F-4DFD-8B92-2B05EA00B8D6}"/>
+              </a:ext>
+            </a:extLst>
+          </p:cNvPr>
+          <p:cNvSpPr>
+            <a:spLocks noGrp="1"/>
+          </p:cNvSpPr>
+          <p:nvPr>
+            <p:ph type="body" idx="1"/>
+          </p:nvPr>
+        </p:nvSpPr>
+        <p:spPr/>
+        <p:txBody>
+          <a:bodyPr/>
+          <a:lstStyle/>
+          <a:p>
+            <a:endParaRPr lang="en-US"/>
+          </a:p>
+        </p:txBody>
+      </p:sp>
+    </p:spTree>
+    <p:extLst>
+      <p:ext uri="{BB962C8B-B14F-4D97-AF65-F5344CB8AC3E}">
+        <p14:creationId xmlns:p14="http://schemas.microsoft.com/office/powerpoint/2010/main" val="3245103629"/>
+      </p:ext>
+    </p:extLst>
+  </p:cSld>
+  <p:clrMapOvr>
+    <a:masterClrMapping/>
+  </p:clrMapOvr>
+</p:sld>
+</file>
+
 <file path=ppt/slides/slide2.xml><?xml version="1.0" encoding="utf-8"?>
 <p:sld xmlns:a="http://schemas.openxmlformats.org/drawingml/2006/main" xmlns:r="http://schemas.openxmlformats.org/officeDocument/2006/relationships" xmlns:p="http://schemas.openxmlformats.org/presentationml/2006/main">
   <p:cSld>
@@ -3574,7 +5010,7 @@
           <p:cNvPr id="2" name="Title 1">
             <a:extLst>
               <a:ext uri="{FF2B5EF4-FFF2-40B4-BE49-F238E27FC236}">
-                <a16:creationId xmlns:a16="http://schemas.microsoft.com/office/drawing/2014/main" id="{5DA51F54-BEA7-4B9A-B4AF-10C802805A92}"/>
+                <a16:creationId xmlns:a16="http://schemas.microsoft.com/office/drawing/2014/main" id="{52F16B82-69EF-47B1-8554-4134670A19CC}"/>
               </a:ext>
             </a:extLst>
           </p:cNvPr>
@@ -3592,7 +5028,7 @@
           <a:p>
             <a:r>
               <a:rPr lang="en-US" dirty="0"/>
-              <a:t>Control flow</a:t>
+              <a:t>Expressions</a:t>
             </a:r>
           </a:p>
         </p:txBody>
@@ -3602,7 +5038,7 @@
           <p:cNvPr id="3" name="Text Placeholder 2">
             <a:extLst>
               <a:ext uri="{FF2B5EF4-FFF2-40B4-BE49-F238E27FC236}">
-                <a16:creationId xmlns:a16="http://schemas.microsoft.com/office/drawing/2014/main" id="{D2D4B055-1F47-4228-A880-2E16E12A2492}"/>
+                <a16:creationId xmlns:a16="http://schemas.microsoft.com/office/drawing/2014/main" id="{1D5889F3-BAC9-4049-8601-F093E82E4582}"/>
               </a:ext>
             </a:extLst>
           </p:cNvPr>
@@ -3625,7 +5061,7 @@
     </p:spTree>
     <p:extLst>
       <p:ext uri="{BB962C8B-B14F-4D97-AF65-F5344CB8AC3E}">
-        <p14:creationId xmlns:p14="http://schemas.microsoft.com/office/powerpoint/2010/main" val="3817656817"/>
+        <p14:creationId xmlns:p14="http://schemas.microsoft.com/office/powerpoint/2010/main" val="152509225"/>
       </p:ext>
     </p:extLst>
   </p:cSld>
@@ -3657,7 +5093,7 @@
           <p:cNvPr id="2" name="Title 1">
             <a:extLst>
               <a:ext uri="{FF2B5EF4-FFF2-40B4-BE49-F238E27FC236}">
-                <a16:creationId xmlns:a16="http://schemas.microsoft.com/office/drawing/2014/main" id="{1DDB4967-E607-4674-B726-A520B25D388D}"/>
+                <a16:creationId xmlns:a16="http://schemas.microsoft.com/office/drawing/2014/main" id="{5DA51F54-BEA7-4B9A-B4AF-10C802805A92}"/>
               </a:ext>
             </a:extLst>
           </p:cNvPr>
@@ -3675,199 +5111,40 @@
           <a:p>
             <a:r>
               <a:rPr lang="en-US" dirty="0"/>
-              <a:t>Conditional statement</a:t>
-            </a:r>
-          </a:p>
-        </p:txBody>
-      </p:sp>
-      <p:sp>
-        <p:nvSpPr>
-          <p:cNvPr id="4" name="TextBox 3">
-            <a:extLst>
-              <a:ext uri="{FF2B5EF4-FFF2-40B4-BE49-F238E27FC236}">
-                <a16:creationId xmlns:a16="http://schemas.microsoft.com/office/drawing/2014/main" id="{BDC02A6C-7B9C-4410-8779-47367E255162}"/>
-              </a:ext>
-            </a:extLst>
-          </p:cNvPr>
-          <p:cNvSpPr txBox="1"/>
-          <p:nvPr/>
-        </p:nvSpPr>
-        <p:spPr>
-          <a:xfrm>
-            <a:off x="617836" y="1573749"/>
-            <a:ext cx="6896439" cy="2585323"/>
-          </a:xfrm>
-          <a:prstGeom prst="rect">
-            <a:avLst/>
-          </a:prstGeom>
-          <a:solidFill>
-            <a:schemeClr val="bg1">
-              <a:lumMod val="85000"/>
-            </a:schemeClr>
-          </a:solidFill>
-        </p:spPr>
-        <p:txBody>
-          <a:bodyPr wrap="square" rtlCol="0">
-            <a:spAutoFit/>
-          </a:bodyPr>
-          <a:lstStyle/>
-          <a:p>
-            <a:r>
-              <a:rPr lang="en-US" dirty="0" err="1">
-                <a:latin typeface="Consolas" panose="020B0609020204030204" pitchFamily="49" charset="0"/>
-              </a:rPr>
-              <a:t>funtion</a:t>
-            </a:r>
-            <a:r>
-              <a:rPr lang="en-US" dirty="0">
-                <a:latin typeface="Consolas" panose="020B0609020204030204" pitchFamily="49" charset="0"/>
-              </a:rPr>
-              <a:t> fact(n)</a:t>
-            </a:r>
-          </a:p>
-          <a:p>
-            <a:r>
-              <a:rPr lang="en-US" dirty="0">
-                <a:latin typeface="Consolas" panose="020B0609020204030204" pitchFamily="49" charset="0"/>
-              </a:rPr>
-              <a:t>    if n &lt; 0</a:t>
-            </a:r>
-          </a:p>
-          <a:p>
-            <a:r>
-              <a:rPr lang="en-US" dirty="0">
-                <a:latin typeface="Consolas" panose="020B0609020204030204" pitchFamily="49" charset="0"/>
-              </a:rPr>
-              <a:t>        error("fact argument must be positive")</a:t>
-            </a:r>
-          </a:p>
-          <a:p>
-            <a:r>
-              <a:rPr lang="en-US" dirty="0">
-                <a:latin typeface="Consolas" panose="020B0609020204030204" pitchFamily="49" charset="0"/>
-              </a:rPr>
-              <a:t>    elseif n &lt;= 1</a:t>
-            </a:r>
-          </a:p>
-          <a:p>
-            <a:r>
-              <a:rPr lang="en-US" dirty="0">
-                <a:latin typeface="Consolas" panose="020B0609020204030204" pitchFamily="49" charset="0"/>
-              </a:rPr>
-              <a:t>        return 1</a:t>
-            </a:r>
-          </a:p>
-          <a:p>
-            <a:r>
-              <a:rPr lang="en-US" dirty="0">
-                <a:latin typeface="Consolas" panose="020B0609020204030204" pitchFamily="49" charset="0"/>
-              </a:rPr>
-              <a:t>    else</a:t>
-            </a:r>
-          </a:p>
-          <a:p>
-            <a:r>
-              <a:rPr lang="en-US" dirty="0">
-                <a:latin typeface="Consolas" panose="020B0609020204030204" pitchFamily="49" charset="0"/>
-              </a:rPr>
-              <a:t>        return n*fact(n – 1)</a:t>
-            </a:r>
-          </a:p>
-          <a:p>
-            <a:r>
-              <a:rPr lang="en-US" dirty="0">
-                <a:latin typeface="Consolas" panose="020B0609020204030204" pitchFamily="49" charset="0"/>
-              </a:rPr>
-              <a:t>    end</a:t>
-            </a:r>
-          </a:p>
-          <a:p>
-            <a:r>
-              <a:rPr lang="en-US" dirty="0">
-                <a:latin typeface="Consolas" panose="020B0609020204030204" pitchFamily="49" charset="0"/>
-              </a:rPr>
-              <a:t>end</a:t>
-            </a:r>
-          </a:p>
-        </p:txBody>
-      </p:sp>
-      <p:sp>
-        <p:nvSpPr>
-          <p:cNvPr id="5" name="TextBox 4">
-            <a:extLst>
-              <a:ext uri="{FF2B5EF4-FFF2-40B4-BE49-F238E27FC236}">
-                <a16:creationId xmlns:a16="http://schemas.microsoft.com/office/drawing/2014/main" id="{B7797B44-968F-432A-A0DC-5B5C6E463C91}"/>
-              </a:ext>
-            </a:extLst>
-          </p:cNvPr>
-          <p:cNvSpPr txBox="1"/>
-          <p:nvPr/>
-        </p:nvSpPr>
-        <p:spPr>
-          <a:xfrm>
-            <a:off x="617837" y="4643502"/>
-            <a:ext cx="6896440" cy="1477328"/>
-          </a:xfrm>
-          <a:prstGeom prst="rect">
-            <a:avLst/>
-          </a:prstGeom>
-          <a:solidFill>
-            <a:schemeClr val="bg1">
-              <a:lumMod val="85000"/>
-            </a:schemeClr>
-          </a:solidFill>
-        </p:spPr>
-        <p:txBody>
-          <a:bodyPr wrap="none" rtlCol="0">
-            <a:spAutoFit/>
-          </a:bodyPr>
-          <a:lstStyle/>
-          <a:p>
-            <a:r>
-              <a:rPr lang="en-US" dirty="0">
-                <a:latin typeface="Consolas" panose="020B0609020204030204" pitchFamily="49" charset="0"/>
-              </a:rPr>
-              <a:t>function fact(n)</a:t>
-            </a:r>
-          </a:p>
-          <a:p>
-            <a:r>
-              <a:rPr lang="en-US" dirty="0">
-                <a:latin typeface="Consolas" panose="020B0609020204030204" pitchFamily="49" charset="0"/>
-              </a:rPr>
-              <a:t>    n &gt;= 0 || error("fact argument must be positive")</a:t>
-            </a:r>
-          </a:p>
-          <a:p>
-            <a:r>
-              <a:rPr lang="en-US" dirty="0">
-                <a:latin typeface="Consolas" panose="020B0609020204030204" pitchFamily="49" charset="0"/>
-              </a:rPr>
-              <a:t>    n &lt;= 1 &amp;&amp; return 1</a:t>
-            </a:r>
-          </a:p>
-          <a:p>
-            <a:r>
-              <a:rPr lang="en-US" dirty="0">
-                <a:latin typeface="Consolas" panose="020B0609020204030204" pitchFamily="49" charset="0"/>
-              </a:rPr>
-              <a:t>    return n*fact(n - 1)</a:t>
-            </a:r>
-          </a:p>
-          <a:p>
-            <a:r>
-              <a:rPr lang="en-US" dirty="0">
-                <a:latin typeface="Consolas" panose="020B0609020204030204" pitchFamily="49" charset="0"/>
-              </a:rPr>
-              <a:t>end</a:t>
-            </a:r>
+              <a:t>Control flow</a:t>
+            </a:r>
+          </a:p>
+        </p:txBody>
+      </p:sp>
+      <p:sp>
+        <p:nvSpPr>
+          <p:cNvPr id="3" name="Text Placeholder 2">
+            <a:extLst>
+              <a:ext uri="{FF2B5EF4-FFF2-40B4-BE49-F238E27FC236}">
+                <a16:creationId xmlns:a16="http://schemas.microsoft.com/office/drawing/2014/main" id="{D2D4B055-1F47-4228-A880-2E16E12A2492}"/>
+              </a:ext>
+            </a:extLst>
+          </p:cNvPr>
+          <p:cNvSpPr>
+            <a:spLocks noGrp="1"/>
+          </p:cNvSpPr>
+          <p:nvPr>
+            <p:ph type="body" idx="1"/>
+          </p:nvPr>
+        </p:nvSpPr>
+        <p:spPr/>
+        <p:txBody>
+          <a:bodyPr/>
+          <a:lstStyle/>
+          <a:p>
+            <a:endParaRPr lang="en-US"/>
           </a:p>
         </p:txBody>
       </p:sp>
     </p:spTree>
     <p:extLst>
       <p:ext uri="{BB962C8B-B14F-4D97-AF65-F5344CB8AC3E}">
-        <p14:creationId xmlns:p14="http://schemas.microsoft.com/office/powerpoint/2010/main" val="1868916431"/>
+        <p14:creationId xmlns:p14="http://schemas.microsoft.com/office/powerpoint/2010/main" val="3817656817"/>
       </p:ext>
     </p:extLst>
   </p:cSld>
@@ -3899,7 +5176,7 @@
           <p:cNvPr id="2" name="Title 1">
             <a:extLst>
               <a:ext uri="{FF2B5EF4-FFF2-40B4-BE49-F238E27FC236}">
-                <a16:creationId xmlns:a16="http://schemas.microsoft.com/office/drawing/2014/main" id="{839FEF9C-3687-43B8-81C0-ED9903D10F9A}"/>
+                <a16:creationId xmlns:a16="http://schemas.microsoft.com/office/drawing/2014/main" id="{1DDB4967-E607-4674-B726-A520B25D388D}"/>
               </a:ext>
             </a:extLst>
           </p:cNvPr>
@@ -3917,17 +5194,17 @@
           <a:p>
             <a:r>
               <a:rPr lang="en-US" dirty="0"/>
-              <a:t>Repeated evaluation loops</a:t>
-            </a:r>
-          </a:p>
-        </p:txBody>
-      </p:sp>
-      <p:sp>
-        <p:nvSpPr>
-          <p:cNvPr id="3" name="TextBox 2">
-            <a:extLst>
-              <a:ext uri="{FF2B5EF4-FFF2-40B4-BE49-F238E27FC236}">
-                <a16:creationId xmlns:a16="http://schemas.microsoft.com/office/drawing/2014/main" id="{335BD0C3-342F-41E7-A609-B1AB45BD985A}"/>
+              <a:t>Conditional statement</a:t>
+            </a:r>
+          </a:p>
+        </p:txBody>
+      </p:sp>
+      <p:sp>
+        <p:nvSpPr>
+          <p:cNvPr id="4" name="TextBox 3">
+            <a:extLst>
+              <a:ext uri="{FF2B5EF4-FFF2-40B4-BE49-F238E27FC236}">
+                <a16:creationId xmlns:a16="http://schemas.microsoft.com/office/drawing/2014/main" id="{BDC02A6C-7B9C-4410-8779-47367E255162}"/>
               </a:ext>
             </a:extLst>
           </p:cNvPr>
@@ -3936,8 +5213,8 @@
         </p:nvSpPr>
         <p:spPr>
           <a:xfrm>
-            <a:off x="617837" y="1573749"/>
-            <a:ext cx="3328088" cy="2862322"/>
+            <a:off x="617836" y="1573749"/>
+            <a:ext cx="6896439" cy="2585323"/>
           </a:xfrm>
           <a:prstGeom prst="rect">
             <a:avLst/>
@@ -3955,70 +5232,64 @@
           <a:lstStyle/>
           <a:p>
             <a:r>
-              <a:rPr lang="en-US" dirty="0">
-                <a:latin typeface="Consolas" panose="020B0609020204030204" pitchFamily="49" charset="0"/>
-              </a:rPr>
-              <a:t>function </a:t>
-            </a:r>
-            <a:r>
               <a:rPr lang="en-US" dirty="0" err="1">
                 <a:latin typeface="Consolas" panose="020B0609020204030204" pitchFamily="49" charset="0"/>
               </a:rPr>
-              <a:t>gcd</a:t>
-            </a:r>
-            <a:r>
-              <a:rPr lang="en-US" dirty="0">
-                <a:latin typeface="Consolas" panose="020B0609020204030204" pitchFamily="49" charset="0"/>
-              </a:rPr>
-              <a:t>(a, b)</a:t>
-            </a:r>
-          </a:p>
-          <a:p>
-            <a:r>
-              <a:rPr lang="en-US" dirty="0">
-                <a:latin typeface="Consolas" panose="020B0609020204030204" pitchFamily="49" charset="0"/>
-              </a:rPr>
-              <a:t>    while a != b</a:t>
-            </a:r>
-          </a:p>
-          <a:p>
-            <a:r>
-              <a:rPr lang="en-US" dirty="0">
-                <a:latin typeface="Consolas" panose="020B0609020204030204" pitchFamily="49" charset="0"/>
-              </a:rPr>
-              <a:t>        if a &gt; b</a:t>
-            </a:r>
-          </a:p>
-          <a:p>
-            <a:r>
-              <a:rPr lang="en-US" dirty="0">
-                <a:latin typeface="Consolas" panose="020B0609020204030204" pitchFamily="49" charset="0"/>
-              </a:rPr>
-              <a:t>            a -= b</a:t>
-            </a:r>
-          </a:p>
-          <a:p>
-            <a:r>
-              <a:rPr lang="en-US" dirty="0">
-                <a:latin typeface="Consolas" panose="020B0609020204030204" pitchFamily="49" charset="0"/>
-              </a:rPr>
-              <a:t>        else</a:t>
-            </a:r>
-          </a:p>
-          <a:p>
-            <a:r>
-              <a:rPr lang="en-US" dirty="0">
-                <a:latin typeface="Consolas" panose="020B0609020204030204" pitchFamily="49" charset="0"/>
-              </a:rPr>
-              <a:t>            b -= a</a:t>
-            </a:r>
-          </a:p>
-          <a:p>
-            <a:r>
-              <a:rPr lang="en-US" dirty="0">
-                <a:latin typeface="Consolas" panose="020B0609020204030204" pitchFamily="49" charset="0"/>
-              </a:rPr>
-              <a:t>        end</a:t>
+              <a:t>funtion</a:t>
+            </a:r>
+            <a:r>
+              <a:rPr lang="en-US" dirty="0">
+                <a:latin typeface="Consolas" panose="020B0609020204030204" pitchFamily="49" charset="0"/>
+              </a:rPr>
+              <a:t> fact(n)</a:t>
+            </a:r>
+          </a:p>
+          <a:p>
+            <a:r>
+              <a:rPr lang="en-US" dirty="0">
+                <a:latin typeface="Consolas" panose="020B0609020204030204" pitchFamily="49" charset="0"/>
+              </a:rPr>
+              <a:t>    if n &lt; 0</a:t>
+            </a:r>
+          </a:p>
+          <a:p>
+            <a:r>
+              <a:rPr lang="en-US" dirty="0">
+                <a:latin typeface="Consolas" panose="020B0609020204030204" pitchFamily="49" charset="0"/>
+              </a:rPr>
+              <a:t>        error("fact argument must be positive")</a:t>
+            </a:r>
+          </a:p>
+          <a:p>
+            <a:r>
+              <a:rPr lang="en-US" dirty="0">
+                <a:latin typeface="Consolas" panose="020B0609020204030204" pitchFamily="49" charset="0"/>
+              </a:rPr>
+              <a:t>    elseif n &lt;= 1</a:t>
+            </a:r>
+          </a:p>
+          <a:p>
+            <a:r>
+              <a:rPr lang="en-US" dirty="0">
+                <a:latin typeface="Consolas" panose="020B0609020204030204" pitchFamily="49" charset="0"/>
+              </a:rPr>
+              <a:t>        return 1</a:t>
+            </a:r>
+          </a:p>
+          <a:p>
+            <a:r>
+              <a:rPr lang="en-US" dirty="0">
+                <a:latin typeface="Consolas" panose="020B0609020204030204" pitchFamily="49" charset="0"/>
+              </a:rPr>
+              <a:t>    else</a:t>
+            </a:r>
+          </a:p>
+          <a:p>
+            <a:r>
+              <a:rPr lang="en-US" dirty="0">
+                <a:latin typeface="Consolas" panose="020B0609020204030204" pitchFamily="49" charset="0"/>
+              </a:rPr>
+              <a:t>        return n*fact(n – 1)</a:t>
             </a:r>
           </a:p>
           <a:p>
@@ -4034,14 +5305,6 @@
               <a:rPr lang="en-US" dirty="0">
                 <a:latin typeface="Consolas" panose="020B0609020204030204" pitchFamily="49" charset="0"/>
               </a:rPr>
-              <a:t>    return a</a:t>
-            </a:r>
-          </a:p>
-          <a:p>
-            <a:r>
-              <a:rPr lang="en-US" dirty="0">
-                <a:latin typeface="Consolas" panose="020B0609020204030204" pitchFamily="49" charset="0"/>
-              </a:rPr>
               <a:t>end</a:t>
             </a:r>
           </a:p>
@@ -4049,10 +5312,10 @@
       </p:sp>
       <p:sp>
         <p:nvSpPr>
-          <p:cNvPr id="4" name="TextBox 3">
-            <a:extLst>
-              <a:ext uri="{FF2B5EF4-FFF2-40B4-BE49-F238E27FC236}">
-                <a16:creationId xmlns:a16="http://schemas.microsoft.com/office/drawing/2014/main" id="{04202056-AA70-4D3D-A1A7-8B7381ADA881}"/>
+          <p:cNvPr id="5" name="TextBox 4">
+            <a:extLst>
+              <a:ext uri="{FF2B5EF4-FFF2-40B4-BE49-F238E27FC236}">
+                <a16:creationId xmlns:a16="http://schemas.microsoft.com/office/drawing/2014/main" id="{B7797B44-968F-432A-A0DC-5B5C6E463C91}"/>
               </a:ext>
             </a:extLst>
           </p:cNvPr>
@@ -4062,7 +5325,7 @@
         <p:spPr>
           <a:xfrm>
             <a:off x="617837" y="4643502"/>
-            <a:ext cx="3328088" cy="2031325"/>
+            <a:ext cx="6896440" cy="1477328"/>
           </a:xfrm>
           <a:prstGeom prst="rect">
             <a:avLst/>
@@ -4074,232 +5337,56 @@
           </a:solidFill>
         </p:spPr>
         <p:txBody>
-          <a:bodyPr wrap="square" rtlCol="0">
-            <a:spAutoFit/>
-          </a:bodyPr>
-          <a:lstStyle/>
-          <a:p>
-            <a:r>
-              <a:rPr lang="en-US" dirty="0">
-                <a:latin typeface="Consolas" panose="020B0609020204030204" pitchFamily="49" charset="0"/>
-              </a:rPr>
-              <a:t>function fact(n)</a:t>
-            </a:r>
-          </a:p>
-          <a:p>
-            <a:r>
-              <a:rPr lang="en-US" dirty="0">
-                <a:latin typeface="Consolas" panose="020B0609020204030204" pitchFamily="49" charset="0"/>
-              </a:rPr>
-              <a:t>    result = 1</a:t>
-            </a:r>
-          </a:p>
-          <a:p>
-            <a:r>
-              <a:rPr lang="en-US" dirty="0">
-                <a:latin typeface="Consolas" panose="020B0609020204030204" pitchFamily="49" charset="0"/>
-              </a:rPr>
-              <a:t>    for </a:t>
-            </a:r>
-            <a:r>
-              <a:rPr lang="en-US" dirty="0" err="1">
-                <a:latin typeface="Consolas" panose="020B0609020204030204" pitchFamily="49" charset="0"/>
-              </a:rPr>
-              <a:t>i</a:t>
-            </a:r>
-            <a:r>
-              <a:rPr lang="en-US" dirty="0">
-                <a:latin typeface="Consolas" panose="020B0609020204030204" pitchFamily="49" charset="0"/>
-              </a:rPr>
-              <a:t> in 2:n</a:t>
-            </a:r>
-          </a:p>
-          <a:p>
-            <a:r>
-              <a:rPr lang="en-US" dirty="0">
-                <a:latin typeface="Consolas" panose="020B0609020204030204" pitchFamily="49" charset="0"/>
-              </a:rPr>
-              <a:t>        result *= </a:t>
-            </a:r>
-            <a:r>
-              <a:rPr lang="en-US" dirty="0" err="1">
-                <a:latin typeface="Consolas" panose="020B0609020204030204" pitchFamily="49" charset="0"/>
-              </a:rPr>
-              <a:t>i</a:t>
-            </a:r>
-            <a:endParaRPr lang="en-US" dirty="0">
-              <a:latin typeface="Consolas" panose="020B0609020204030204" pitchFamily="49" charset="0"/>
-            </a:endParaRPr>
-          </a:p>
-          <a:p>
-            <a:r>
-              <a:rPr lang="en-US" dirty="0">
-                <a:latin typeface="Consolas" panose="020B0609020204030204" pitchFamily="49" charset="0"/>
-              </a:rPr>
-              <a:t>     end</a:t>
-            </a:r>
-          </a:p>
-          <a:p>
-            <a:r>
-              <a:rPr lang="en-US" dirty="0">
-                <a:latin typeface="Consolas" panose="020B0609020204030204" pitchFamily="49" charset="0"/>
-              </a:rPr>
-              <a:t>     return result</a:t>
-            </a:r>
-          </a:p>
-          <a:p>
-            <a:r>
-              <a:rPr lang="en-US" dirty="0">
-                <a:latin typeface="Consolas" panose="020B0609020204030204" pitchFamily="49" charset="0"/>
-              </a:rPr>
-              <a:t>end</a:t>
-            </a:r>
-          </a:p>
-        </p:txBody>
-      </p:sp>
-      <p:sp>
-        <p:nvSpPr>
-          <p:cNvPr id="5" name="TextBox 4">
-            <a:extLst>
-              <a:ext uri="{FF2B5EF4-FFF2-40B4-BE49-F238E27FC236}">
-                <a16:creationId xmlns:a16="http://schemas.microsoft.com/office/drawing/2014/main" id="{48B75B53-9880-466C-8BC5-97F68BB92BA5}"/>
-              </a:ext>
-            </a:extLst>
-          </p:cNvPr>
-          <p:cNvSpPr txBox="1"/>
-          <p:nvPr/>
-        </p:nvSpPr>
-        <p:spPr>
-          <a:xfrm>
-            <a:off x="5140411" y="2140049"/>
-            <a:ext cx="1851789" cy="1200329"/>
-          </a:xfrm>
-          <a:prstGeom prst="rect">
-            <a:avLst/>
-          </a:prstGeom>
-          <a:noFill/>
-        </p:spPr>
-        <p:txBody>
           <a:bodyPr wrap="none" rtlCol="0">
             <a:spAutoFit/>
           </a:bodyPr>
           <a:lstStyle/>
           <a:p>
             <a:r>
-              <a:rPr lang="en-US" sz="2400" dirty="0"/>
-              <a:t>Unsurprising:</a:t>
-            </a:r>
-          </a:p>
-          <a:p>
-            <a:pPr marL="285750" indent="-285750">
-              <a:buFont typeface="Arial" panose="020B0604020202020204" pitchFamily="34" charset="0"/>
-              <a:buChar char="•"/>
-            </a:pPr>
-            <a:r>
-              <a:rPr lang="en-US" sz="2400" dirty="0">
-                <a:latin typeface="Consolas" panose="020B0609020204030204" pitchFamily="49" charset="0"/>
-              </a:rPr>
-              <a:t>break</a:t>
-            </a:r>
-          </a:p>
-          <a:p>
-            <a:pPr marL="285750" indent="-285750">
-              <a:buFont typeface="Arial" panose="020B0604020202020204" pitchFamily="34" charset="0"/>
-              <a:buChar char="•"/>
-            </a:pPr>
-            <a:r>
-              <a:rPr lang="en-US" sz="2400" dirty="0">
-                <a:latin typeface="Consolas" panose="020B0609020204030204" pitchFamily="49" charset="0"/>
-              </a:rPr>
-              <a:t>continue</a:t>
-            </a:r>
-          </a:p>
-        </p:txBody>
-      </p:sp>
-      <p:sp>
-        <p:nvSpPr>
-          <p:cNvPr id="6" name="TextBox 5">
-            <a:extLst>
-              <a:ext uri="{FF2B5EF4-FFF2-40B4-BE49-F238E27FC236}">
-                <a16:creationId xmlns:a16="http://schemas.microsoft.com/office/drawing/2014/main" id="{666F4CC9-B96B-4894-BD6E-4F41B8B0B83C}"/>
-              </a:ext>
-            </a:extLst>
-          </p:cNvPr>
-          <p:cNvSpPr txBox="1"/>
-          <p:nvPr/>
-        </p:nvSpPr>
-        <p:spPr>
-          <a:xfrm>
-            <a:off x="5170105" y="4772038"/>
-            <a:ext cx="3776418" cy="461665"/>
-          </a:xfrm>
-          <a:prstGeom prst="rect">
-            <a:avLst/>
-          </a:prstGeom>
-          <a:noFill/>
-        </p:spPr>
-        <p:txBody>
-          <a:bodyPr wrap="none" rtlCol="0">
-            <a:spAutoFit/>
-          </a:bodyPr>
-          <a:lstStyle/>
-          <a:p>
-            <a:r>
-              <a:rPr lang="en-US" sz="2400" dirty="0"/>
-              <a:t>Range: &lt;start&gt;:&lt;step&gt;:&lt;end&gt;</a:t>
-            </a:r>
-            <a:endParaRPr lang="en-US" sz="2400" dirty="0">
-              <a:latin typeface="Consolas" panose="020B0609020204030204" pitchFamily="49" charset="0"/>
-            </a:endParaRPr>
-          </a:p>
-        </p:txBody>
-      </p:sp>
-      <p:sp>
-        <p:nvSpPr>
-          <p:cNvPr id="7" name="TextBox 6">
-            <a:extLst>
-              <a:ext uri="{FF2B5EF4-FFF2-40B4-BE49-F238E27FC236}">
-                <a16:creationId xmlns:a16="http://schemas.microsoft.com/office/drawing/2014/main" id="{155746DA-5867-44D2-9339-F661F7AB9ADA}"/>
-              </a:ext>
-            </a:extLst>
-          </p:cNvPr>
-          <p:cNvSpPr txBox="1"/>
-          <p:nvPr/>
-        </p:nvSpPr>
-        <p:spPr>
-          <a:xfrm>
-            <a:off x="5170105" y="5428331"/>
-            <a:ext cx="3067506" cy="461665"/>
-          </a:xfrm>
-          <a:prstGeom prst="rect">
-            <a:avLst/>
-          </a:prstGeom>
-          <a:noFill/>
-        </p:spPr>
-        <p:txBody>
-          <a:bodyPr wrap="none" rtlCol="0">
-            <a:spAutoFit/>
-          </a:bodyPr>
-          <a:lstStyle/>
-          <a:p>
-            <a:r>
-              <a:rPr lang="en-US" sz="2400" dirty="0"/>
-              <a:t>Also works on </a:t>
-            </a:r>
-            <a:r>
-              <a:rPr lang="en-US" sz="2400" dirty="0" err="1"/>
-              <a:t>iterables</a:t>
-            </a:r>
-            <a:endParaRPr lang="en-US" sz="2400" dirty="0">
-              <a:latin typeface="Consolas" panose="020B0609020204030204" pitchFamily="49" charset="0"/>
-            </a:endParaRPr>
+              <a:rPr lang="en-US" dirty="0">
+                <a:latin typeface="Consolas" panose="020B0609020204030204" pitchFamily="49" charset="0"/>
+              </a:rPr>
+              <a:t>function fact(n)</a:t>
+            </a:r>
+          </a:p>
+          <a:p>
+            <a:r>
+              <a:rPr lang="en-US" dirty="0">
+                <a:latin typeface="Consolas" panose="020B0609020204030204" pitchFamily="49" charset="0"/>
+              </a:rPr>
+              <a:t>    n &gt;= 0 || error("fact argument must be positive")</a:t>
+            </a:r>
+          </a:p>
+          <a:p>
+            <a:r>
+              <a:rPr lang="en-US" dirty="0">
+                <a:latin typeface="Consolas" panose="020B0609020204030204" pitchFamily="49" charset="0"/>
+              </a:rPr>
+              <a:t>    n &lt;= 1 &amp;&amp; return 1</a:t>
+            </a:r>
+          </a:p>
+          <a:p>
+            <a:r>
+              <a:rPr lang="en-US" dirty="0">
+                <a:latin typeface="Consolas" panose="020B0609020204030204" pitchFamily="49" charset="0"/>
+              </a:rPr>
+              <a:t>    return n*fact(n - 1)</a:t>
+            </a:r>
+          </a:p>
+          <a:p>
+            <a:r>
+              <a:rPr lang="en-US" dirty="0">
+                <a:latin typeface="Consolas" panose="020B0609020204030204" pitchFamily="49" charset="0"/>
+              </a:rPr>
+              <a:t>end</a:t>
+            </a:r>
           </a:p>
         </p:txBody>
       </p:sp>
     </p:spTree>
     <p:extLst>
       <p:ext uri="{BB962C8B-B14F-4D97-AF65-F5344CB8AC3E}">
-        <p14:creationId xmlns:p14="http://schemas.microsoft.com/office/powerpoint/2010/main" val="1788976129"/>
+        <p14:creationId xmlns:p14="http://schemas.microsoft.com/office/powerpoint/2010/main" val="1868916431"/>
       </p:ext>
     </p:extLst>
   </p:cSld>
@@ -4331,7 +5418,7 @@
           <p:cNvPr id="2" name="Title 1">
             <a:extLst>
               <a:ext uri="{FF2B5EF4-FFF2-40B4-BE49-F238E27FC236}">
-                <a16:creationId xmlns:a16="http://schemas.microsoft.com/office/drawing/2014/main" id="{F1840B74-7AB5-4842-AD12-2732F9E304FA}"/>
+                <a16:creationId xmlns:a16="http://schemas.microsoft.com/office/drawing/2014/main" id="{839FEF9C-3687-43B8-81C0-ED9903D10F9A}"/>
               </a:ext>
             </a:extLst>
           </p:cNvPr>
@@ -4349,7 +5436,7 @@
           <a:p>
             <a:r>
               <a:rPr lang="en-US" dirty="0"/>
-              <a:t>Compound expressions</a:t>
+              <a:t>Repeated evaluation loops</a:t>
             </a:r>
           </a:p>
         </p:txBody>
@@ -4359,7 +5446,7 @@
           <p:cNvPr id="3" name="TextBox 2">
             <a:extLst>
               <a:ext uri="{FF2B5EF4-FFF2-40B4-BE49-F238E27FC236}">
-                <a16:creationId xmlns:a16="http://schemas.microsoft.com/office/drawing/2014/main" id="{B816B5C9-F08A-45C5-8561-C4A98B3F465C}"/>
+                <a16:creationId xmlns:a16="http://schemas.microsoft.com/office/drawing/2014/main" id="{335BD0C3-342F-41E7-A609-B1AB45BD985A}"/>
               </a:ext>
             </a:extLst>
           </p:cNvPr>
@@ -4368,7 +5455,132 @@
         </p:nvSpPr>
         <p:spPr>
           <a:xfrm>
-            <a:off x="1153297" y="1784972"/>
+            <a:off x="617837" y="1573749"/>
+            <a:ext cx="3328088" cy="2862322"/>
+          </a:xfrm>
+          <a:prstGeom prst="rect">
+            <a:avLst/>
+          </a:prstGeom>
+          <a:solidFill>
+            <a:schemeClr val="bg1">
+              <a:lumMod val="85000"/>
+            </a:schemeClr>
+          </a:solidFill>
+        </p:spPr>
+        <p:txBody>
+          <a:bodyPr wrap="square" rtlCol="0">
+            <a:spAutoFit/>
+          </a:bodyPr>
+          <a:lstStyle/>
+          <a:p>
+            <a:r>
+              <a:rPr lang="en-US" dirty="0">
+                <a:latin typeface="Consolas" panose="020B0609020204030204" pitchFamily="49" charset="0"/>
+              </a:rPr>
+              <a:t>function </a:t>
+            </a:r>
+            <a:r>
+              <a:rPr lang="en-US" dirty="0" err="1">
+                <a:latin typeface="Consolas" panose="020B0609020204030204" pitchFamily="49" charset="0"/>
+              </a:rPr>
+              <a:t>gcd</a:t>
+            </a:r>
+            <a:r>
+              <a:rPr lang="en-US" dirty="0">
+                <a:latin typeface="Consolas" panose="020B0609020204030204" pitchFamily="49" charset="0"/>
+              </a:rPr>
+              <a:t>(a, b)</a:t>
+            </a:r>
+          </a:p>
+          <a:p>
+            <a:r>
+              <a:rPr lang="en-US" dirty="0">
+                <a:latin typeface="Consolas" panose="020B0609020204030204" pitchFamily="49" charset="0"/>
+              </a:rPr>
+              <a:t>    while a != b</a:t>
+            </a:r>
+          </a:p>
+          <a:p>
+            <a:r>
+              <a:rPr lang="en-US" dirty="0">
+                <a:latin typeface="Consolas" panose="020B0609020204030204" pitchFamily="49" charset="0"/>
+              </a:rPr>
+              <a:t>        if a &gt; b</a:t>
+            </a:r>
+          </a:p>
+          <a:p>
+            <a:r>
+              <a:rPr lang="en-US" dirty="0">
+                <a:latin typeface="Consolas" panose="020B0609020204030204" pitchFamily="49" charset="0"/>
+              </a:rPr>
+              <a:t>            a -= b</a:t>
+            </a:r>
+          </a:p>
+          <a:p>
+            <a:r>
+              <a:rPr lang="en-US" dirty="0">
+                <a:latin typeface="Consolas" panose="020B0609020204030204" pitchFamily="49" charset="0"/>
+              </a:rPr>
+              <a:t>        else</a:t>
+            </a:r>
+          </a:p>
+          <a:p>
+            <a:r>
+              <a:rPr lang="en-US" dirty="0">
+                <a:latin typeface="Consolas" panose="020B0609020204030204" pitchFamily="49" charset="0"/>
+              </a:rPr>
+              <a:t>            b -= a</a:t>
+            </a:r>
+          </a:p>
+          <a:p>
+            <a:r>
+              <a:rPr lang="en-US" dirty="0">
+                <a:latin typeface="Consolas" panose="020B0609020204030204" pitchFamily="49" charset="0"/>
+              </a:rPr>
+              <a:t>        end</a:t>
+            </a:r>
+          </a:p>
+          <a:p>
+            <a:r>
+              <a:rPr lang="en-US" dirty="0">
+                <a:latin typeface="Consolas" panose="020B0609020204030204" pitchFamily="49" charset="0"/>
+              </a:rPr>
+              <a:t>    end</a:t>
+            </a:r>
+          </a:p>
+          <a:p>
+            <a:r>
+              <a:rPr lang="en-US" dirty="0">
+                <a:latin typeface="Consolas" panose="020B0609020204030204" pitchFamily="49" charset="0"/>
+              </a:rPr>
+              <a:t>    return a</a:t>
+            </a:r>
+          </a:p>
+          <a:p>
+            <a:r>
+              <a:rPr lang="en-US" dirty="0">
+                <a:latin typeface="Consolas" panose="020B0609020204030204" pitchFamily="49" charset="0"/>
+              </a:rPr>
+              <a:t>end</a:t>
+            </a:r>
+          </a:p>
+        </p:txBody>
+      </p:sp>
+      <p:sp>
+        <p:nvSpPr>
+          <p:cNvPr id="4" name="TextBox 3">
+            <a:extLst>
+              <a:ext uri="{FF2B5EF4-FFF2-40B4-BE49-F238E27FC236}">
+                <a16:creationId xmlns:a16="http://schemas.microsoft.com/office/drawing/2014/main" id="{04202056-AA70-4D3D-A1A7-8B7381ADA881}"/>
+              </a:ext>
+            </a:extLst>
+          </p:cNvPr>
+          <p:cNvSpPr txBox="1"/>
+          <p:nvPr/>
+        </p:nvSpPr>
+        <p:spPr>
+          <a:xfrm>
+            <a:off x="617837" y="4643502"/>
             <a:ext cx="3328088" cy="2031325"/>
           </a:xfrm>
           <a:prstGeom prst="rect">
@@ -4464,10 +5676,149 @@
           </a:p>
         </p:txBody>
       </p:sp>
+      <p:sp>
+        <p:nvSpPr>
+          <p:cNvPr id="5" name="TextBox 4">
+            <a:extLst>
+              <a:ext uri="{FF2B5EF4-FFF2-40B4-BE49-F238E27FC236}">
+                <a16:creationId xmlns:a16="http://schemas.microsoft.com/office/drawing/2014/main" id="{48B75B53-9880-466C-8BC5-97F68BB92BA5}"/>
+              </a:ext>
+            </a:extLst>
+          </p:cNvPr>
+          <p:cNvSpPr txBox="1"/>
+          <p:nvPr/>
+        </p:nvSpPr>
+        <p:spPr>
+          <a:xfrm>
+            <a:off x="5140411" y="2140049"/>
+            <a:ext cx="1851789" cy="1200329"/>
+          </a:xfrm>
+          <a:prstGeom prst="rect">
+            <a:avLst/>
+          </a:prstGeom>
+          <a:noFill/>
+        </p:spPr>
+        <p:txBody>
+          <a:bodyPr wrap="none" rtlCol="0">
+            <a:spAutoFit/>
+          </a:bodyPr>
+          <a:lstStyle/>
+          <a:p>
+            <a:r>
+              <a:rPr lang="en-US" sz="2400" dirty="0"/>
+              <a:t>Unsurprising:</a:t>
+            </a:r>
+          </a:p>
+          <a:p>
+            <a:pPr marL="285750" indent="-285750">
+              <a:buFont typeface="Arial" panose="020B0604020202020204" pitchFamily="34" charset="0"/>
+              <a:buChar char="•"/>
+            </a:pPr>
+            <a:r>
+              <a:rPr lang="en-US" sz="2400" dirty="0">
+                <a:latin typeface="Consolas" panose="020B0609020204030204" pitchFamily="49" charset="0"/>
+              </a:rPr>
+              <a:t>break</a:t>
+            </a:r>
+          </a:p>
+          <a:p>
+            <a:pPr marL="285750" indent="-285750">
+              <a:buFont typeface="Arial" panose="020B0604020202020204" pitchFamily="34" charset="0"/>
+              <a:buChar char="•"/>
+            </a:pPr>
+            <a:r>
+              <a:rPr lang="en-US" sz="2400" dirty="0">
+                <a:latin typeface="Consolas" panose="020B0609020204030204" pitchFamily="49" charset="0"/>
+              </a:rPr>
+              <a:t>continue</a:t>
+            </a:r>
+          </a:p>
+        </p:txBody>
+      </p:sp>
+      <p:sp>
+        <p:nvSpPr>
+          <p:cNvPr id="6" name="TextBox 5">
+            <a:extLst>
+              <a:ext uri="{FF2B5EF4-FFF2-40B4-BE49-F238E27FC236}">
+                <a16:creationId xmlns:a16="http://schemas.microsoft.com/office/drawing/2014/main" id="{666F4CC9-B96B-4894-BD6E-4F41B8B0B83C}"/>
+              </a:ext>
+            </a:extLst>
+          </p:cNvPr>
+          <p:cNvSpPr txBox="1"/>
+          <p:nvPr/>
+        </p:nvSpPr>
+        <p:spPr>
+          <a:xfrm>
+            <a:off x="5170105" y="4772038"/>
+            <a:ext cx="3776418" cy="461665"/>
+          </a:xfrm>
+          <a:prstGeom prst="rect">
+            <a:avLst/>
+          </a:prstGeom>
+          <a:noFill/>
+        </p:spPr>
+        <p:txBody>
+          <a:bodyPr wrap="none" rtlCol="0">
+            <a:spAutoFit/>
+          </a:bodyPr>
+          <a:lstStyle/>
+          <a:p>
+            <a:r>
+              <a:rPr lang="en-US" sz="2400" dirty="0"/>
+              <a:t>Range: &lt;start&gt;:&lt;step&gt;:&lt;end&gt;</a:t>
+            </a:r>
+            <a:endParaRPr lang="en-US" sz="2400" dirty="0">
+              <a:latin typeface="Consolas" panose="020B0609020204030204" pitchFamily="49" charset="0"/>
+            </a:endParaRPr>
+          </a:p>
+        </p:txBody>
+      </p:sp>
+      <p:sp>
+        <p:nvSpPr>
+          <p:cNvPr id="7" name="TextBox 6">
+            <a:extLst>
+              <a:ext uri="{FF2B5EF4-FFF2-40B4-BE49-F238E27FC236}">
+                <a16:creationId xmlns:a16="http://schemas.microsoft.com/office/drawing/2014/main" id="{155746DA-5867-44D2-9339-F661F7AB9ADA}"/>
+              </a:ext>
+            </a:extLst>
+          </p:cNvPr>
+          <p:cNvSpPr txBox="1"/>
+          <p:nvPr/>
+        </p:nvSpPr>
+        <p:spPr>
+          <a:xfrm>
+            <a:off x="5170105" y="5428331"/>
+            <a:ext cx="3067506" cy="461665"/>
+          </a:xfrm>
+          <a:prstGeom prst="rect">
+            <a:avLst/>
+          </a:prstGeom>
+          <a:noFill/>
+        </p:spPr>
+        <p:txBody>
+          <a:bodyPr wrap="none" rtlCol="0">
+            <a:spAutoFit/>
+          </a:bodyPr>
+          <a:lstStyle/>
+          <a:p>
+            <a:r>
+              <a:rPr lang="en-US" sz="2400" dirty="0"/>
+              <a:t>Also works on </a:t>
+            </a:r>
+            <a:r>
+              <a:rPr lang="en-US" sz="2400" dirty="0" err="1"/>
+              <a:t>iterables</a:t>
+            </a:r>
+            <a:endParaRPr lang="en-US" sz="2400" dirty="0">
+              <a:latin typeface="Consolas" panose="020B0609020204030204" pitchFamily="49" charset="0"/>
+            </a:endParaRPr>
+          </a:p>
+        </p:txBody>
+      </p:sp>
     </p:spTree>
     <p:extLst>
       <p:ext uri="{BB962C8B-B14F-4D97-AF65-F5344CB8AC3E}">
-        <p14:creationId xmlns:p14="http://schemas.microsoft.com/office/powerpoint/2010/main" val="2963682273"/>
+        <p14:creationId xmlns:p14="http://schemas.microsoft.com/office/powerpoint/2010/main" val="1788976129"/>
       </p:ext>
     </p:extLst>
   </p:cSld>
@@ -4499,6 +5850,174 @@
           <p:cNvPr id="2" name="Title 1">
             <a:extLst>
               <a:ext uri="{FF2B5EF4-FFF2-40B4-BE49-F238E27FC236}">
+                <a16:creationId xmlns:a16="http://schemas.microsoft.com/office/drawing/2014/main" id="{F1840B74-7AB5-4842-AD12-2732F9E304FA}"/>
+              </a:ext>
+            </a:extLst>
+          </p:cNvPr>
+          <p:cNvSpPr>
+            <a:spLocks noGrp="1"/>
+          </p:cNvSpPr>
+          <p:nvPr>
+            <p:ph type="title"/>
+          </p:nvPr>
+        </p:nvSpPr>
+        <p:spPr/>
+        <p:txBody>
+          <a:bodyPr/>
+          <a:lstStyle/>
+          <a:p>
+            <a:r>
+              <a:rPr lang="en-US" dirty="0"/>
+              <a:t>Compound expressions</a:t>
+            </a:r>
+          </a:p>
+        </p:txBody>
+      </p:sp>
+      <p:sp>
+        <p:nvSpPr>
+          <p:cNvPr id="3" name="TextBox 2">
+            <a:extLst>
+              <a:ext uri="{FF2B5EF4-FFF2-40B4-BE49-F238E27FC236}">
+                <a16:creationId xmlns:a16="http://schemas.microsoft.com/office/drawing/2014/main" id="{B816B5C9-F08A-45C5-8561-C4A98B3F465C}"/>
+              </a:ext>
+            </a:extLst>
+          </p:cNvPr>
+          <p:cNvSpPr txBox="1"/>
+          <p:nvPr/>
+        </p:nvSpPr>
+        <p:spPr>
+          <a:xfrm>
+            <a:off x="1153297" y="1784972"/>
+            <a:ext cx="3328088" cy="2031325"/>
+          </a:xfrm>
+          <a:prstGeom prst="rect">
+            <a:avLst/>
+          </a:prstGeom>
+          <a:solidFill>
+            <a:schemeClr val="bg1">
+              <a:lumMod val="85000"/>
+            </a:schemeClr>
+          </a:solidFill>
+        </p:spPr>
+        <p:txBody>
+          <a:bodyPr wrap="square" rtlCol="0">
+            <a:spAutoFit/>
+          </a:bodyPr>
+          <a:lstStyle/>
+          <a:p>
+            <a:r>
+              <a:rPr lang="en-US" dirty="0">
+                <a:latin typeface="Consolas" panose="020B0609020204030204" pitchFamily="49" charset="0"/>
+              </a:rPr>
+              <a:t>function fact(n)</a:t>
+            </a:r>
+          </a:p>
+          <a:p>
+            <a:r>
+              <a:rPr lang="en-US" dirty="0">
+                <a:latin typeface="Consolas" panose="020B0609020204030204" pitchFamily="49" charset="0"/>
+              </a:rPr>
+              <a:t>    result = 1</a:t>
+            </a:r>
+          </a:p>
+          <a:p>
+            <a:r>
+              <a:rPr lang="en-US" dirty="0">
+                <a:latin typeface="Consolas" panose="020B0609020204030204" pitchFamily="49" charset="0"/>
+              </a:rPr>
+              <a:t>    for </a:t>
+            </a:r>
+            <a:r>
+              <a:rPr lang="en-US" dirty="0" err="1">
+                <a:latin typeface="Consolas" panose="020B0609020204030204" pitchFamily="49" charset="0"/>
+              </a:rPr>
+              <a:t>i</a:t>
+            </a:r>
+            <a:r>
+              <a:rPr lang="en-US" dirty="0">
+                <a:latin typeface="Consolas" panose="020B0609020204030204" pitchFamily="49" charset="0"/>
+              </a:rPr>
+              <a:t> in 2:n</a:t>
+            </a:r>
+          </a:p>
+          <a:p>
+            <a:r>
+              <a:rPr lang="en-US" dirty="0">
+                <a:latin typeface="Consolas" panose="020B0609020204030204" pitchFamily="49" charset="0"/>
+              </a:rPr>
+              <a:t>        result *= </a:t>
+            </a:r>
+            <a:r>
+              <a:rPr lang="en-US" dirty="0" err="1">
+                <a:latin typeface="Consolas" panose="020B0609020204030204" pitchFamily="49" charset="0"/>
+              </a:rPr>
+              <a:t>i</a:t>
+            </a:r>
+            <a:endParaRPr lang="en-US" dirty="0">
+              <a:latin typeface="Consolas" panose="020B0609020204030204" pitchFamily="49" charset="0"/>
+            </a:endParaRPr>
+          </a:p>
+          <a:p>
+            <a:r>
+              <a:rPr lang="en-US" dirty="0">
+                <a:latin typeface="Consolas" panose="020B0609020204030204" pitchFamily="49" charset="0"/>
+              </a:rPr>
+              <a:t>     end</a:t>
+            </a:r>
+          </a:p>
+          <a:p>
+            <a:r>
+              <a:rPr lang="en-US" dirty="0">
+                <a:latin typeface="Consolas" panose="020B0609020204030204" pitchFamily="49" charset="0"/>
+              </a:rPr>
+              <a:t>     return result</a:t>
+            </a:r>
+          </a:p>
+          <a:p>
+            <a:r>
+              <a:rPr lang="en-US" dirty="0">
+                <a:latin typeface="Consolas" panose="020B0609020204030204" pitchFamily="49" charset="0"/>
+              </a:rPr>
+              <a:t>end</a:t>
+            </a:r>
+          </a:p>
+        </p:txBody>
+      </p:sp>
+    </p:spTree>
+    <p:extLst>
+      <p:ext uri="{BB962C8B-B14F-4D97-AF65-F5344CB8AC3E}">
+        <p14:creationId xmlns:p14="http://schemas.microsoft.com/office/powerpoint/2010/main" val="2963682273"/>
+      </p:ext>
+    </p:extLst>
+  </p:cSld>
+  <p:clrMapOvr>
+    <a:masterClrMapping/>
+  </p:clrMapOvr>
+</p:sld>
+</file>
+
+<file path=ppt/slides/slide8.xml><?xml version="1.0" encoding="utf-8"?>
+<p:sld xmlns:a="http://schemas.openxmlformats.org/drawingml/2006/main" xmlns:r="http://schemas.openxmlformats.org/officeDocument/2006/relationships" xmlns:p="http://schemas.openxmlformats.org/presentationml/2006/main">
+  <p:cSld>
+    <p:spTree>
+      <p:nvGrpSpPr>
+        <p:cNvPr id="1" name=""/>
+        <p:cNvGrpSpPr/>
+        <p:nvPr/>
+      </p:nvGrpSpPr>
+      <p:grpSpPr>
+        <a:xfrm>
+          <a:off x="0" y="0"/>
+          <a:ext cx="0" cy="0"/>
+          <a:chOff x="0" y="0"/>
+          <a:chExt cx="0" cy="0"/>
+        </a:xfrm>
+      </p:grpSpPr>
+      <p:sp>
+        <p:nvSpPr>
+          <p:cNvPr id="2" name="Title 1">
+            <a:extLst>
+              <a:ext uri="{FF2B5EF4-FFF2-40B4-BE49-F238E27FC236}">
                 <a16:creationId xmlns:a16="http://schemas.microsoft.com/office/drawing/2014/main" id="{FCBCDC7B-97A8-41BC-A4E7-A4793FC8ADAF}"/>
               </a:ext>
             </a:extLst>
@@ -4800,7 +6319,7 @@
         </p:nvSpPr>
         <p:spPr>
           <a:xfrm>
-            <a:off x="617837" y="4643502"/>
+            <a:off x="683740" y="4594363"/>
             <a:ext cx="4716166" cy="1754326"/>
           </a:xfrm>
           <a:prstGeom prst="rect">
@@ -4949,6 +6468,89 @@
     <p:extLst>
       <p:ext uri="{BB962C8B-B14F-4D97-AF65-F5344CB8AC3E}">
         <p14:creationId xmlns:p14="http://schemas.microsoft.com/office/powerpoint/2010/main" val="1979726115"/>
+      </p:ext>
+    </p:extLst>
+  </p:cSld>
+  <p:clrMapOvr>
+    <a:masterClrMapping/>
+  </p:clrMapOvr>
+</p:sld>
+</file>
+
+<file path=ppt/slides/slide9.xml><?xml version="1.0" encoding="utf-8"?>
+<p:sld xmlns:a="http://schemas.openxmlformats.org/drawingml/2006/main" xmlns:r="http://schemas.openxmlformats.org/officeDocument/2006/relationships" xmlns:p="http://schemas.openxmlformats.org/presentationml/2006/main">
+  <p:cSld>
+    <p:spTree>
+      <p:nvGrpSpPr>
+        <p:cNvPr id="1" name=""/>
+        <p:cNvGrpSpPr/>
+        <p:nvPr/>
+      </p:nvGrpSpPr>
+      <p:grpSpPr>
+        <a:xfrm>
+          <a:off x="0" y="0"/>
+          <a:ext cx="0" cy="0"/>
+          <a:chOff x="0" y="0"/>
+          <a:chExt cx="0" cy="0"/>
+        </a:xfrm>
+      </p:grpSpPr>
+      <p:sp>
+        <p:nvSpPr>
+          <p:cNvPr id="2" name="Title 1">
+            <a:extLst>
+              <a:ext uri="{FF2B5EF4-FFF2-40B4-BE49-F238E27FC236}">
+                <a16:creationId xmlns:a16="http://schemas.microsoft.com/office/drawing/2014/main" id="{2613194F-8BAA-4A07-BBA6-3D6B458520C2}"/>
+              </a:ext>
+            </a:extLst>
+          </p:cNvPr>
+          <p:cNvSpPr>
+            <a:spLocks noGrp="1"/>
+          </p:cNvSpPr>
+          <p:nvPr>
+            <p:ph type="title"/>
+          </p:nvPr>
+        </p:nvSpPr>
+        <p:spPr/>
+        <p:txBody>
+          <a:bodyPr/>
+          <a:lstStyle/>
+          <a:p>
+            <a:r>
+              <a:rPr lang="en-US" dirty="0"/>
+              <a:t>Data types</a:t>
+            </a:r>
+          </a:p>
+        </p:txBody>
+      </p:sp>
+      <p:sp>
+        <p:nvSpPr>
+          <p:cNvPr id="3" name="Text Placeholder 2">
+            <a:extLst>
+              <a:ext uri="{FF2B5EF4-FFF2-40B4-BE49-F238E27FC236}">
+                <a16:creationId xmlns:a16="http://schemas.microsoft.com/office/drawing/2014/main" id="{C2FFBE65-F98F-444F-B4B7-A70536D1013F}"/>
+              </a:ext>
+            </a:extLst>
+          </p:cNvPr>
+          <p:cNvSpPr>
+            <a:spLocks noGrp="1"/>
+          </p:cNvSpPr>
+          <p:nvPr>
+            <p:ph type="body" idx="1"/>
+          </p:nvPr>
+        </p:nvSpPr>
+        <p:spPr/>
+        <p:txBody>
+          <a:bodyPr/>
+          <a:lstStyle/>
+          <a:p>
+            <a:endParaRPr lang="en-US"/>
+          </a:p>
+        </p:txBody>
+      </p:sp>
+    </p:spTree>
+    <p:extLst>
+      <p:ext uri="{BB962C8B-B14F-4D97-AF65-F5344CB8AC3E}">
+        <p14:creationId xmlns:p14="http://schemas.microsoft.com/office/powerpoint/2010/main" val="2961179590"/>
       </p:ext>
     </p:extLst>
   </p:cSld>

</xml_diff>

<commit_message>
Omit remark on info() and warn()
</commit_message>
<xml_diff>
--- a/Julia,_good_back_ugly.pptx
+++ b/Julia,_good_back_ugly.pptx
@@ -116,6 +116,11 @@
       </a:defRPr>
     </a:lvl9pPr>
   </p:defaultTextStyle>
+  <p:extLst>
+    <p:ext uri="{EFAFB233-063F-42B5-8137-9DF3F51BA10A}">
+      <p15:sldGuideLst xmlns:p15="http://schemas.microsoft.com/office/powerpoint/2012/main"/>
+    </p:ext>
+  </p:extLst>
 </p:presentation>
 </file>
 
@@ -266,7 +271,7 @@
           <a:p>
             <a:fld id="{A915D6E4-2626-4E5C-B4BB-83884454EE6F}" type="datetimeFigureOut">
               <a:rPr lang="en-US" smtClean="0"/>
-              <a:t>2021-07-02</a:t>
+              <a:t>2021-07-05</a:t>
             </a:fld>
             <a:endParaRPr lang="en-US"/>
           </a:p>
@@ -464,7 +469,7 @@
           <a:p>
             <a:fld id="{A915D6E4-2626-4E5C-B4BB-83884454EE6F}" type="datetimeFigureOut">
               <a:rPr lang="en-US" smtClean="0"/>
-              <a:t>2021-07-02</a:t>
+              <a:t>2021-07-05</a:t>
             </a:fld>
             <a:endParaRPr lang="en-US"/>
           </a:p>
@@ -672,7 +677,7 @@
           <a:p>
             <a:fld id="{A915D6E4-2626-4E5C-B4BB-83884454EE6F}" type="datetimeFigureOut">
               <a:rPr lang="en-US" smtClean="0"/>
-              <a:t>2021-07-02</a:t>
+              <a:t>2021-07-05</a:t>
             </a:fld>
             <a:endParaRPr lang="en-US"/>
           </a:p>
@@ -870,7 +875,7 @@
           <a:p>
             <a:fld id="{A915D6E4-2626-4E5C-B4BB-83884454EE6F}" type="datetimeFigureOut">
               <a:rPr lang="en-US" smtClean="0"/>
-              <a:t>2021-07-02</a:t>
+              <a:t>2021-07-05</a:t>
             </a:fld>
             <a:endParaRPr lang="en-US"/>
           </a:p>
@@ -1145,7 +1150,7 @@
           <a:p>
             <a:fld id="{A915D6E4-2626-4E5C-B4BB-83884454EE6F}" type="datetimeFigureOut">
               <a:rPr lang="en-US" smtClean="0"/>
-              <a:t>2021-07-02</a:t>
+              <a:t>2021-07-05</a:t>
             </a:fld>
             <a:endParaRPr lang="en-US"/>
           </a:p>
@@ -1410,7 +1415,7 @@
           <a:p>
             <a:fld id="{A915D6E4-2626-4E5C-B4BB-83884454EE6F}" type="datetimeFigureOut">
               <a:rPr lang="en-US" smtClean="0"/>
-              <a:t>2021-07-02</a:t>
+              <a:t>2021-07-05</a:t>
             </a:fld>
             <a:endParaRPr lang="en-US"/>
           </a:p>
@@ -1822,7 +1827,7 @@
           <a:p>
             <a:fld id="{A915D6E4-2626-4E5C-B4BB-83884454EE6F}" type="datetimeFigureOut">
               <a:rPr lang="en-US" smtClean="0"/>
-              <a:t>2021-07-02</a:t>
+              <a:t>2021-07-05</a:t>
             </a:fld>
             <a:endParaRPr lang="en-US"/>
           </a:p>
@@ -1963,7 +1968,7 @@
           <a:p>
             <a:fld id="{A915D6E4-2626-4E5C-B4BB-83884454EE6F}" type="datetimeFigureOut">
               <a:rPr lang="en-US" smtClean="0"/>
-              <a:t>2021-07-02</a:t>
+              <a:t>2021-07-05</a:t>
             </a:fld>
             <a:endParaRPr lang="en-US"/>
           </a:p>
@@ -2076,7 +2081,7 @@
           <a:p>
             <a:fld id="{A915D6E4-2626-4E5C-B4BB-83884454EE6F}" type="datetimeFigureOut">
               <a:rPr lang="en-US" smtClean="0"/>
-              <a:t>2021-07-02</a:t>
+              <a:t>2021-07-05</a:t>
             </a:fld>
             <a:endParaRPr lang="en-US"/>
           </a:p>
@@ -2387,7 +2392,7 @@
           <a:p>
             <a:fld id="{A915D6E4-2626-4E5C-B4BB-83884454EE6F}" type="datetimeFigureOut">
               <a:rPr lang="en-US" smtClean="0"/>
-              <a:t>2021-07-02</a:t>
+              <a:t>2021-07-05</a:t>
             </a:fld>
             <a:endParaRPr lang="en-US"/>
           </a:p>
@@ -2675,7 +2680,7 @@
           <a:p>
             <a:fld id="{A915D6E4-2626-4E5C-B4BB-83884454EE6F}" type="datetimeFigureOut">
               <a:rPr lang="en-US" smtClean="0"/>
-              <a:t>2021-07-02</a:t>
+              <a:t>2021-07-05</a:t>
             </a:fld>
             <a:endParaRPr lang="en-US"/>
           </a:p>
@@ -2916,7 +2921,7 @@
           <a:p>
             <a:fld id="{A915D6E4-2626-4E5C-B4BB-83884454EE6F}" type="datetimeFigureOut">
               <a:rPr lang="en-US" smtClean="0"/>
-              <a:t>2021-07-02</a:t>
+              <a:t>2021-07-05</a:t>
             </a:fld>
             <a:endParaRPr lang="en-US"/>
           </a:p>
@@ -6152,8 +6157,8 @@
         </p:nvSpPr>
         <p:spPr>
           <a:xfrm>
-            <a:off x="6664409" y="1491838"/>
-            <a:ext cx="3155094" cy="923330"/>
+            <a:off x="6096000" y="1579026"/>
+            <a:ext cx="3155094" cy="369332"/>
           </a:xfrm>
           <a:prstGeom prst="rect">
             <a:avLst/>
@@ -6168,32 +6173,11 @@
           <a:p>
             <a:r>
               <a:rPr lang="en-US" dirty="0"/>
-              <a:t>Halts execution, also</a:t>
-            </a:r>
-          </a:p>
-          <a:p>
-            <a:pPr marL="285750" indent="-285750">
-              <a:buFont typeface="Arial" panose="020B0604020202020204" pitchFamily="34" charset="0"/>
-              <a:buChar char="•"/>
-            </a:pPr>
-            <a:r>
-              <a:rPr lang="en-US" dirty="0">
-                <a:latin typeface="Consolas" panose="020B0609020204030204" pitchFamily="49" charset="0"/>
-              </a:rPr>
-              <a:t>warn()</a:t>
-            </a:r>
-          </a:p>
-          <a:p>
-            <a:pPr marL="285750" indent="-285750">
-              <a:buFont typeface="Arial" panose="020B0604020202020204" pitchFamily="34" charset="0"/>
-              <a:buChar char="•"/>
-            </a:pPr>
-            <a:r>
-              <a:rPr lang="en-US" dirty="0">
-                <a:latin typeface="Consolas" panose="020B0609020204030204" pitchFamily="49" charset="0"/>
-              </a:rPr>
-              <a:t>info()</a:t>
-            </a:r>
+              <a:t>Halts execution</a:t>
+            </a:r>
+            <a:endParaRPr lang="en-US" dirty="0">
+              <a:latin typeface="Consolas" panose="020B0609020204030204" pitchFamily="49" charset="0"/>
+            </a:endParaRPr>
           </a:p>
         </p:txBody>
       </p:sp>

</xml_diff>

<commit_message>
Add slides on abstract types, subtypes and traits
</commit_message>
<xml_diff>
--- a/Julia,_good_back_ugly.pptx
+++ b/Julia,_good_back_ugly.pptx
@@ -1,9 +1,12 @@
 
 <file path=ppt/presentation.xml><?xml version="1.0" encoding="utf-8"?>
-<p:presentation xmlns:a="http://schemas.openxmlformats.org/drawingml/2006/main" xmlns:r="http://schemas.openxmlformats.org/officeDocument/2006/relationships" xmlns:p="http://schemas.openxmlformats.org/presentationml/2006/main" saveSubsetFonts="1">
+<p:presentation xmlns:a="http://schemas.openxmlformats.org/drawingml/2006/main" xmlns:r="http://schemas.openxmlformats.org/officeDocument/2006/relationships" xmlns:p="http://schemas.openxmlformats.org/presentationml/2006/main" showSpecialPlsOnTitleSld="0" saveSubsetFonts="1">
   <p:sldMasterIdLst>
     <p:sldMasterId id="2147483648" r:id="rId1"/>
   </p:sldMasterIdLst>
+  <p:notesMasterIdLst>
+    <p:notesMasterId r:id="rId19"/>
+  </p:notesMasterIdLst>
   <p:sldIdLst>
     <p:sldId id="256" r:id="rId2"/>
     <p:sldId id="257" r:id="rId3"/>
@@ -17,7 +20,11 @@
     <p:sldId id="266" r:id="rId11"/>
     <p:sldId id="267" r:id="rId12"/>
     <p:sldId id="268" r:id="rId13"/>
-    <p:sldId id="265" r:id="rId14"/>
+    <p:sldId id="270" r:id="rId14"/>
+    <p:sldId id="269" r:id="rId15"/>
+    <p:sldId id="271" r:id="rId16"/>
+    <p:sldId id="272" r:id="rId17"/>
+    <p:sldId id="265" r:id="rId18"/>
   </p:sldIdLst>
   <p:sldSz cx="12192000" cy="6858000"/>
   <p:notesSz cx="6858000" cy="9144000"/>
@@ -124,6 +131,355 @@
 </p:presentation>
 </file>
 
+<file path=ppt/notesMasters/notesMaster1.xml><?xml version="1.0" encoding="utf-8"?>
+<p:notesMaster xmlns:a="http://schemas.openxmlformats.org/drawingml/2006/main" xmlns:r="http://schemas.openxmlformats.org/officeDocument/2006/relationships" xmlns:p="http://schemas.openxmlformats.org/presentationml/2006/main">
+  <p:cSld>
+    <p:bg>
+      <p:bgRef idx="1001">
+        <a:schemeClr val="bg1"/>
+      </p:bgRef>
+    </p:bg>
+    <p:spTree>
+      <p:nvGrpSpPr>
+        <p:cNvPr id="1" name=""/>
+        <p:cNvGrpSpPr/>
+        <p:nvPr/>
+      </p:nvGrpSpPr>
+      <p:grpSpPr>
+        <a:xfrm>
+          <a:off x="0" y="0"/>
+          <a:ext cx="0" cy="0"/>
+          <a:chOff x="0" y="0"/>
+          <a:chExt cx="0" cy="0"/>
+        </a:xfrm>
+      </p:grpSpPr>
+      <p:sp>
+        <p:nvSpPr>
+          <p:cNvPr id="2" name="Header Placeholder 1"/>
+          <p:cNvSpPr>
+            <a:spLocks noGrp="1"/>
+          </p:cNvSpPr>
+          <p:nvPr>
+            <p:ph type="hdr" sz="quarter"/>
+          </p:nvPr>
+        </p:nvSpPr>
+        <p:spPr>
+          <a:xfrm>
+            <a:off x="0" y="0"/>
+            <a:ext cx="2971800" cy="458788"/>
+          </a:xfrm>
+          <a:prstGeom prst="rect">
+            <a:avLst/>
+          </a:prstGeom>
+        </p:spPr>
+        <p:txBody>
+          <a:bodyPr vert="horz" lIns="91440" tIns="45720" rIns="91440" bIns="45720" rtlCol="0"/>
+          <a:lstStyle>
+            <a:lvl1pPr algn="l">
+              <a:defRPr sz="1200"/>
+            </a:lvl1pPr>
+          </a:lstStyle>
+          <a:p>
+            <a:endParaRPr lang="en-US"/>
+          </a:p>
+        </p:txBody>
+      </p:sp>
+      <p:sp>
+        <p:nvSpPr>
+          <p:cNvPr id="3" name="Date Placeholder 2"/>
+          <p:cNvSpPr>
+            <a:spLocks noGrp="1"/>
+          </p:cNvSpPr>
+          <p:nvPr>
+            <p:ph type="dt" idx="1"/>
+          </p:nvPr>
+        </p:nvSpPr>
+        <p:spPr>
+          <a:xfrm>
+            <a:off x="3884613" y="0"/>
+            <a:ext cx="2971800" cy="458788"/>
+          </a:xfrm>
+          <a:prstGeom prst="rect">
+            <a:avLst/>
+          </a:prstGeom>
+        </p:spPr>
+        <p:txBody>
+          <a:bodyPr vert="horz" lIns="91440" tIns="45720" rIns="91440" bIns="45720" rtlCol="0"/>
+          <a:lstStyle>
+            <a:lvl1pPr algn="r">
+              <a:defRPr sz="1200"/>
+            </a:lvl1pPr>
+          </a:lstStyle>
+          <a:p>
+            <a:fld id="{CC9F3EF1-84A5-42B0-81FF-8805AF740E8D}" type="datetimeFigureOut">
+              <a:rPr lang="en-US" smtClean="0"/>
+              <a:t>2021-07-05</a:t>
+            </a:fld>
+            <a:endParaRPr lang="en-US"/>
+          </a:p>
+        </p:txBody>
+      </p:sp>
+      <p:sp>
+        <p:nvSpPr>
+          <p:cNvPr id="4" name="Slide Image Placeholder 3"/>
+          <p:cNvSpPr>
+            <a:spLocks noGrp="1" noRot="1" noChangeAspect="1"/>
+          </p:cNvSpPr>
+          <p:nvPr>
+            <p:ph type="sldImg" idx="2"/>
+          </p:nvPr>
+        </p:nvSpPr>
+        <p:spPr>
+          <a:xfrm>
+            <a:off x="685800" y="1143000"/>
+            <a:ext cx="5486400" cy="3086100"/>
+          </a:xfrm>
+          <a:prstGeom prst="rect">
+            <a:avLst/>
+          </a:prstGeom>
+          <a:noFill/>
+          <a:ln w="12700">
+            <a:solidFill>
+              <a:prstClr val="black"/>
+            </a:solidFill>
+          </a:ln>
+        </p:spPr>
+        <p:txBody>
+          <a:bodyPr vert="horz" lIns="91440" tIns="45720" rIns="91440" bIns="45720" rtlCol="0" anchor="ctr"/>
+          <a:lstStyle/>
+          <a:p>
+            <a:endParaRPr lang="en-US"/>
+          </a:p>
+        </p:txBody>
+      </p:sp>
+      <p:sp>
+        <p:nvSpPr>
+          <p:cNvPr id="5" name="Notes Placeholder 4"/>
+          <p:cNvSpPr>
+            <a:spLocks noGrp="1"/>
+          </p:cNvSpPr>
+          <p:nvPr>
+            <p:ph type="body" sz="quarter" idx="3"/>
+          </p:nvPr>
+        </p:nvSpPr>
+        <p:spPr>
+          <a:xfrm>
+            <a:off x="685800" y="4400550"/>
+            <a:ext cx="5486400" cy="3600450"/>
+          </a:xfrm>
+          <a:prstGeom prst="rect">
+            <a:avLst/>
+          </a:prstGeom>
+        </p:spPr>
+        <p:txBody>
+          <a:bodyPr vert="horz" lIns="91440" tIns="45720" rIns="91440" bIns="45720" rtlCol="0"/>
+          <a:lstStyle/>
+          <a:p>
+            <a:pPr lvl="0"/>
+            <a:r>
+              <a:rPr lang="en-US"/>
+              <a:t>Click to edit Master text styles</a:t>
+            </a:r>
+          </a:p>
+          <a:p>
+            <a:pPr lvl="1"/>
+            <a:r>
+              <a:rPr lang="en-US"/>
+              <a:t>Second level</a:t>
+            </a:r>
+          </a:p>
+          <a:p>
+            <a:pPr lvl="2"/>
+            <a:r>
+              <a:rPr lang="en-US"/>
+              <a:t>Third level</a:t>
+            </a:r>
+          </a:p>
+          <a:p>
+            <a:pPr lvl="3"/>
+            <a:r>
+              <a:rPr lang="en-US"/>
+              <a:t>Fourth level</a:t>
+            </a:r>
+          </a:p>
+          <a:p>
+            <a:pPr lvl="4"/>
+            <a:r>
+              <a:rPr lang="en-US"/>
+              <a:t>Fifth level</a:t>
+            </a:r>
+          </a:p>
+        </p:txBody>
+      </p:sp>
+      <p:sp>
+        <p:nvSpPr>
+          <p:cNvPr id="6" name="Footer Placeholder 5"/>
+          <p:cNvSpPr>
+            <a:spLocks noGrp="1"/>
+          </p:cNvSpPr>
+          <p:nvPr>
+            <p:ph type="ftr" sz="quarter" idx="4"/>
+          </p:nvPr>
+        </p:nvSpPr>
+        <p:spPr>
+          <a:xfrm>
+            <a:off x="0" y="8685213"/>
+            <a:ext cx="2971800" cy="458787"/>
+          </a:xfrm>
+          <a:prstGeom prst="rect">
+            <a:avLst/>
+          </a:prstGeom>
+        </p:spPr>
+        <p:txBody>
+          <a:bodyPr vert="horz" lIns="91440" tIns="45720" rIns="91440" bIns="45720" rtlCol="0" anchor="b"/>
+          <a:lstStyle>
+            <a:lvl1pPr algn="l">
+              <a:defRPr sz="1200"/>
+            </a:lvl1pPr>
+          </a:lstStyle>
+          <a:p>
+            <a:endParaRPr lang="en-US"/>
+          </a:p>
+        </p:txBody>
+      </p:sp>
+      <p:sp>
+        <p:nvSpPr>
+          <p:cNvPr id="7" name="Slide Number Placeholder 6"/>
+          <p:cNvSpPr>
+            <a:spLocks noGrp="1"/>
+          </p:cNvSpPr>
+          <p:nvPr>
+            <p:ph type="sldNum" sz="quarter" idx="5"/>
+          </p:nvPr>
+        </p:nvSpPr>
+        <p:spPr>
+          <a:xfrm>
+            <a:off x="3884613" y="8685213"/>
+            <a:ext cx="2971800" cy="458787"/>
+          </a:xfrm>
+          <a:prstGeom prst="rect">
+            <a:avLst/>
+          </a:prstGeom>
+        </p:spPr>
+        <p:txBody>
+          <a:bodyPr vert="horz" lIns="91440" tIns="45720" rIns="91440" bIns="45720" rtlCol="0" anchor="b"/>
+          <a:lstStyle>
+            <a:lvl1pPr algn="r">
+              <a:defRPr sz="1200"/>
+            </a:lvl1pPr>
+          </a:lstStyle>
+          <a:p>
+            <a:fld id="{A23E7579-EFCE-4D6E-BE1F-10D57697235F}" type="slidenum">
+              <a:rPr lang="en-US" smtClean="0"/>
+              <a:t>‹#›</a:t>
+            </a:fld>
+            <a:endParaRPr lang="en-US"/>
+          </a:p>
+        </p:txBody>
+      </p:sp>
+    </p:spTree>
+    <p:extLst>
+      <p:ext uri="{BB962C8B-B14F-4D97-AF65-F5344CB8AC3E}">
+        <p14:creationId xmlns:p14="http://schemas.microsoft.com/office/powerpoint/2010/main" val="479989556"/>
+      </p:ext>
+    </p:extLst>
+  </p:cSld>
+  <p:clrMap bg1="lt1" tx1="dk1" bg2="lt2" tx2="dk2" accent1="accent1" accent2="accent2" accent3="accent3" accent4="accent4" accent5="accent5" accent6="accent6" hlink="hlink" folHlink="folHlink"/>
+  <p:notesStyle>
+    <a:lvl1pPr marL="0" algn="l" defTabSz="914400" rtl="0" eaLnBrk="1" latinLnBrk="0" hangingPunct="1">
+      <a:defRPr sz="1200" kern="1200">
+        <a:solidFill>
+          <a:schemeClr val="tx1"/>
+        </a:solidFill>
+        <a:latin typeface="+mn-lt"/>
+        <a:ea typeface="+mn-ea"/>
+        <a:cs typeface="+mn-cs"/>
+      </a:defRPr>
+    </a:lvl1pPr>
+    <a:lvl2pPr marL="457200" algn="l" defTabSz="914400" rtl="0" eaLnBrk="1" latinLnBrk="0" hangingPunct="1">
+      <a:defRPr sz="1200" kern="1200">
+        <a:solidFill>
+          <a:schemeClr val="tx1"/>
+        </a:solidFill>
+        <a:latin typeface="+mn-lt"/>
+        <a:ea typeface="+mn-ea"/>
+        <a:cs typeface="+mn-cs"/>
+      </a:defRPr>
+    </a:lvl2pPr>
+    <a:lvl3pPr marL="914400" algn="l" defTabSz="914400" rtl="0" eaLnBrk="1" latinLnBrk="0" hangingPunct="1">
+      <a:defRPr sz="1200" kern="1200">
+        <a:solidFill>
+          <a:schemeClr val="tx1"/>
+        </a:solidFill>
+        <a:latin typeface="+mn-lt"/>
+        <a:ea typeface="+mn-ea"/>
+        <a:cs typeface="+mn-cs"/>
+      </a:defRPr>
+    </a:lvl3pPr>
+    <a:lvl4pPr marL="1371600" algn="l" defTabSz="914400" rtl="0" eaLnBrk="1" latinLnBrk="0" hangingPunct="1">
+      <a:defRPr sz="1200" kern="1200">
+        <a:solidFill>
+          <a:schemeClr val="tx1"/>
+        </a:solidFill>
+        <a:latin typeface="+mn-lt"/>
+        <a:ea typeface="+mn-ea"/>
+        <a:cs typeface="+mn-cs"/>
+      </a:defRPr>
+    </a:lvl4pPr>
+    <a:lvl5pPr marL="1828800" algn="l" defTabSz="914400" rtl="0" eaLnBrk="1" latinLnBrk="0" hangingPunct="1">
+      <a:defRPr sz="1200" kern="1200">
+        <a:solidFill>
+          <a:schemeClr val="tx1"/>
+        </a:solidFill>
+        <a:latin typeface="+mn-lt"/>
+        <a:ea typeface="+mn-ea"/>
+        <a:cs typeface="+mn-cs"/>
+      </a:defRPr>
+    </a:lvl5pPr>
+    <a:lvl6pPr marL="2286000" algn="l" defTabSz="914400" rtl="0" eaLnBrk="1" latinLnBrk="0" hangingPunct="1">
+      <a:defRPr sz="1200" kern="1200">
+        <a:solidFill>
+          <a:schemeClr val="tx1"/>
+        </a:solidFill>
+        <a:latin typeface="+mn-lt"/>
+        <a:ea typeface="+mn-ea"/>
+        <a:cs typeface="+mn-cs"/>
+      </a:defRPr>
+    </a:lvl6pPr>
+    <a:lvl7pPr marL="2743200" algn="l" defTabSz="914400" rtl="0" eaLnBrk="1" latinLnBrk="0" hangingPunct="1">
+      <a:defRPr sz="1200" kern="1200">
+        <a:solidFill>
+          <a:schemeClr val="tx1"/>
+        </a:solidFill>
+        <a:latin typeface="+mn-lt"/>
+        <a:ea typeface="+mn-ea"/>
+        <a:cs typeface="+mn-cs"/>
+      </a:defRPr>
+    </a:lvl7pPr>
+    <a:lvl8pPr marL="3200400" algn="l" defTabSz="914400" rtl="0" eaLnBrk="1" latinLnBrk="0" hangingPunct="1">
+      <a:defRPr sz="1200" kern="1200">
+        <a:solidFill>
+          <a:schemeClr val="tx1"/>
+        </a:solidFill>
+        <a:latin typeface="+mn-lt"/>
+        <a:ea typeface="+mn-ea"/>
+        <a:cs typeface="+mn-cs"/>
+      </a:defRPr>
+    </a:lvl8pPr>
+    <a:lvl9pPr marL="3657600" algn="l" defTabSz="914400" rtl="0" eaLnBrk="1" latinLnBrk="0" hangingPunct="1">
+      <a:defRPr sz="1200" kern="1200">
+        <a:solidFill>
+          <a:schemeClr val="tx1"/>
+        </a:solidFill>
+        <a:latin typeface="+mn-lt"/>
+        <a:ea typeface="+mn-ea"/>
+        <a:cs typeface="+mn-cs"/>
+      </a:defRPr>
+    </a:lvl9pPr>
+  </p:notesStyle>
+</p:notesMaster>
+</file>
+
 <file path=ppt/slideLayouts/slideLayout1.xml><?xml version="1.0" encoding="utf-8"?>
 <p:sldLayout xmlns:a="http://schemas.openxmlformats.org/drawingml/2006/main" xmlns:r="http://schemas.openxmlformats.org/officeDocument/2006/relationships" xmlns:p="http://schemas.openxmlformats.org/presentationml/2006/main" type="title" preserve="1">
   <p:cSld name="Title Slide">
@@ -269,7 +625,7 @@
           <a:bodyPr/>
           <a:lstStyle/>
           <a:p>
-            <a:fld id="{A915D6E4-2626-4E5C-B4BB-83884454EE6F}" type="datetimeFigureOut">
+            <a:fld id="{0D45F18C-3E18-466F-8ADF-516304A44708}" type="datetime1">
               <a:rPr lang="en-US" smtClean="0"/>
               <a:t>2021-07-05</a:t>
             </a:fld>
@@ -467,7 +823,7 @@
           <a:bodyPr/>
           <a:lstStyle/>
           <a:p>
-            <a:fld id="{A915D6E4-2626-4E5C-B4BB-83884454EE6F}" type="datetimeFigureOut">
+            <a:fld id="{D5980222-6813-4CA6-84DC-753D8B88D809}" type="datetime1">
               <a:rPr lang="en-US" smtClean="0"/>
               <a:t>2021-07-05</a:t>
             </a:fld>
@@ -675,7 +1031,7 @@
           <a:bodyPr/>
           <a:lstStyle/>
           <a:p>
-            <a:fld id="{A915D6E4-2626-4E5C-B4BB-83884454EE6F}" type="datetimeFigureOut">
+            <a:fld id="{96F7B8FF-A661-4CB7-BF06-F03D9C89262B}" type="datetime1">
               <a:rPr lang="en-US" smtClean="0"/>
               <a:t>2021-07-05</a:t>
             </a:fld>
@@ -873,7 +1229,7 @@
           <a:bodyPr/>
           <a:lstStyle/>
           <a:p>
-            <a:fld id="{A915D6E4-2626-4E5C-B4BB-83884454EE6F}" type="datetimeFigureOut">
+            <a:fld id="{CE4E165D-6495-4D37-B27D-5DB6761319B2}" type="datetime1">
               <a:rPr lang="en-US" smtClean="0"/>
               <a:t>2021-07-05</a:t>
             </a:fld>
@@ -1148,7 +1504,7 @@
           <a:bodyPr/>
           <a:lstStyle/>
           <a:p>
-            <a:fld id="{A915D6E4-2626-4E5C-B4BB-83884454EE6F}" type="datetimeFigureOut">
+            <a:fld id="{579D02C7-69E9-4C82-8F80-CB6196DA722C}" type="datetime1">
               <a:rPr lang="en-US" smtClean="0"/>
               <a:t>2021-07-05</a:t>
             </a:fld>
@@ -1413,7 +1769,7 @@
           <a:bodyPr/>
           <a:lstStyle/>
           <a:p>
-            <a:fld id="{A915D6E4-2626-4E5C-B4BB-83884454EE6F}" type="datetimeFigureOut">
+            <a:fld id="{107E8C2C-E058-49BD-9DFF-244106208F3B}" type="datetime1">
               <a:rPr lang="en-US" smtClean="0"/>
               <a:t>2021-07-05</a:t>
             </a:fld>
@@ -1825,7 +2181,7 @@
           <a:bodyPr/>
           <a:lstStyle/>
           <a:p>
-            <a:fld id="{A915D6E4-2626-4E5C-B4BB-83884454EE6F}" type="datetimeFigureOut">
+            <a:fld id="{EBBE2EFD-4DA5-4354-BB09-551207F90777}" type="datetime1">
               <a:rPr lang="en-US" smtClean="0"/>
               <a:t>2021-07-05</a:t>
             </a:fld>
@@ -1966,7 +2322,7 @@
           <a:bodyPr/>
           <a:lstStyle/>
           <a:p>
-            <a:fld id="{A915D6E4-2626-4E5C-B4BB-83884454EE6F}" type="datetimeFigureOut">
+            <a:fld id="{0357F3B6-5D5B-4F6A-8ABC-6500847F3284}" type="datetime1">
               <a:rPr lang="en-US" smtClean="0"/>
               <a:t>2021-07-05</a:t>
             </a:fld>
@@ -2079,7 +2435,7 @@
           <a:bodyPr/>
           <a:lstStyle/>
           <a:p>
-            <a:fld id="{A915D6E4-2626-4E5C-B4BB-83884454EE6F}" type="datetimeFigureOut">
+            <a:fld id="{470EE9C1-5D95-4DE1-8B8E-CE731554AA23}" type="datetime1">
               <a:rPr lang="en-US" smtClean="0"/>
               <a:t>2021-07-05</a:t>
             </a:fld>
@@ -2390,7 +2746,7 @@
           <a:bodyPr/>
           <a:lstStyle/>
           <a:p>
-            <a:fld id="{A915D6E4-2626-4E5C-B4BB-83884454EE6F}" type="datetimeFigureOut">
+            <a:fld id="{ED4A0E8D-A460-4018-89F2-1FF6F9205C86}" type="datetime1">
               <a:rPr lang="en-US" smtClean="0"/>
               <a:t>2021-07-05</a:t>
             </a:fld>
@@ -2678,7 +3034,7 @@
           <a:bodyPr/>
           <a:lstStyle/>
           <a:p>
-            <a:fld id="{A915D6E4-2626-4E5C-B4BB-83884454EE6F}" type="datetimeFigureOut">
+            <a:fld id="{74076E25-3B53-45C6-AE55-8E3CC5E53EDE}" type="datetime1">
               <a:rPr lang="en-US" smtClean="0"/>
               <a:t>2021-07-05</a:t>
             </a:fld>
@@ -2919,7 +3275,7 @@
             </a:lvl1pPr>
           </a:lstStyle>
           <a:p>
-            <a:fld id="{A915D6E4-2626-4E5C-B4BB-83884454EE6F}" type="datetimeFigureOut">
+            <a:fld id="{3B0E2389-F93F-49F3-A6AD-79A456A600D1}" type="datetime1">
               <a:rPr lang="en-US" smtClean="0"/>
               <a:t>2021-07-05</a:t>
             </a:fld>
@@ -3038,6 +3394,7 @@
     <p:sldLayoutId id="2147483658" r:id="rId10"/>
     <p:sldLayoutId id="2147483659" r:id="rId11"/>
   </p:sldLayoutIdLst>
+  <p:hf hdr="0" ftr="0" dt="0"/>
   <p:txStyles>
     <p:titleStyle>
       <a:lvl1pPr algn="l" defTabSz="914400" rtl="0" eaLnBrk="1" latinLnBrk="0" hangingPunct="1">
@@ -3837,6 +4194,35 @@
           </a:p>
         </p:txBody>
       </p:sp>
+      <p:sp>
+        <p:nvSpPr>
+          <p:cNvPr id="4" name="Slide Number Placeholder 3">
+            <a:extLst>
+              <a:ext uri="{FF2B5EF4-FFF2-40B4-BE49-F238E27FC236}">
+                <a16:creationId xmlns:a16="http://schemas.microsoft.com/office/drawing/2014/main" id="{440DB69E-77F2-44F7-B723-90BF436C7591}"/>
+              </a:ext>
+            </a:extLst>
+          </p:cNvPr>
+          <p:cNvSpPr>
+            <a:spLocks noGrp="1"/>
+          </p:cNvSpPr>
+          <p:nvPr>
+            <p:ph type="sldNum" sz="quarter" idx="12"/>
+          </p:nvPr>
+        </p:nvSpPr>
+        <p:spPr/>
+        <p:txBody>
+          <a:bodyPr/>
+          <a:lstStyle/>
+          <a:p>
+            <a:fld id="{78F7A1EC-23D1-431D-8C93-9C4ED5D4A04D}" type="slidenum">
+              <a:rPr lang="en-US" smtClean="0"/>
+              <a:t>10</a:t>
+            </a:fld>
+            <a:endParaRPr lang="en-US"/>
+          </a:p>
+        </p:txBody>
+      </p:sp>
     </p:spTree>
     <p:extLst>
       <p:ext uri="{BB962C8B-B14F-4D97-AF65-F5344CB8AC3E}">
@@ -3931,55 +4317,31 @@
               <a:rPr lang="en-US" dirty="0">
                 <a:latin typeface="Consolas" panose="020B0609020204030204" pitchFamily="49" charset="0"/>
               </a:rPr>
-              <a:t>struct Person</a:t>
-            </a:r>
-          </a:p>
-          <a:p>
-            <a:r>
-              <a:rPr lang="en-US" dirty="0">
-                <a:latin typeface="Consolas" panose="020B0609020204030204" pitchFamily="49" charset="0"/>
-              </a:rPr>
-              <a:t>    </a:t>
-            </a:r>
-            <a:r>
-              <a:rPr lang="en-US" dirty="0" err="1">
-                <a:latin typeface="Consolas" panose="020B0609020204030204" pitchFamily="49" charset="0"/>
-              </a:rPr>
-              <a:t>first_name</a:t>
-            </a:r>
-            <a:r>
-              <a:rPr lang="en-US" dirty="0">
-                <a:latin typeface="Consolas" panose="020B0609020204030204" pitchFamily="49" charset="0"/>
-              </a:rPr>
-              <a:t>::String</a:t>
-            </a:r>
-          </a:p>
-          <a:p>
-            <a:r>
-              <a:rPr lang="en-US" dirty="0">
-                <a:latin typeface="Consolas" panose="020B0609020204030204" pitchFamily="49" charset="0"/>
-              </a:rPr>
-              <a:t>    </a:t>
-            </a:r>
-            <a:r>
-              <a:rPr lang="en-US" dirty="0" err="1">
-                <a:latin typeface="Consolas" panose="020B0609020204030204" pitchFamily="49" charset="0"/>
-              </a:rPr>
-              <a:t>last_name</a:t>
-            </a:r>
-            <a:r>
-              <a:rPr lang="en-US" dirty="0">
-                <a:latin typeface="Consolas" panose="020B0609020204030204" pitchFamily="49" charset="0"/>
-              </a:rPr>
-              <a:t>::String</a:t>
-            </a:r>
-          </a:p>
-          <a:p>
-            <a:r>
-              <a:rPr lang="en-US" dirty="0">
-                <a:latin typeface="Consolas" panose="020B0609020204030204" pitchFamily="49" charset="0"/>
-              </a:rPr>
-              <a:t>    age::Int8</a:t>
+              <a:t>struct Pixel</a:t>
+            </a:r>
+          </a:p>
+          <a:p>
+            <a:r>
+              <a:rPr lang="en-US" dirty="0">
+                <a:latin typeface="Consolas" panose="020B0609020204030204" pitchFamily="49" charset="0"/>
+              </a:rPr>
+              <a:t>    x::UInt32</a:t>
+            </a:r>
+          </a:p>
+          <a:p>
+            <a:r>
+              <a:rPr lang="en-US" dirty="0">
+                <a:latin typeface="Consolas" panose="020B0609020204030204" pitchFamily="49" charset="0"/>
+              </a:rPr>
+              <a:t>    y::UInt32</a:t>
+            </a:r>
+          </a:p>
+          <a:p>
+            <a:r>
+              <a:rPr lang="en-US" dirty="0">
+                <a:latin typeface="Consolas" panose="020B0609020204030204" pitchFamily="49" charset="0"/>
+              </a:rPr>
+              <a:t>    color::String</a:t>
             </a:r>
           </a:p>
           <a:p>
@@ -4028,7 +4390,7 @@
               <a:rPr lang="en-US" dirty="0">
                 <a:latin typeface="Consolas" panose="020B0609020204030204" pitchFamily="49" charset="0"/>
               </a:rPr>
-              <a:t>me = Person("Geert Jan", "Bex", 53)</a:t>
+              <a:t>p = Pixel(3, 7, "blue")</a:t>
             </a:r>
           </a:p>
         </p:txBody>
@@ -4160,7 +4522,7 @@
               <a:rPr lang="en-US" dirty="0" err="1">
                 <a:latin typeface="Consolas" panose="020B0609020204030204" pitchFamily="49" charset="0"/>
               </a:rPr>
-              <a:t>me.age</a:t>
+              <a:t>p.color</a:t>
             </a:r>
             <a:r>
               <a:rPr lang="en-US" dirty="0">
@@ -4207,13 +4569,13 @@
               <a:rPr lang="en-US" dirty="0" err="1">
                 <a:latin typeface="Consolas" panose="020B0609020204030204" pitchFamily="49" charset="0"/>
               </a:rPr>
-              <a:t>me.age</a:t>
-            </a:r>
-            <a:r>
-              <a:rPr lang="en-US" dirty="0">
-                <a:latin typeface="Consolas" panose="020B0609020204030204" pitchFamily="49" charset="0"/>
-              </a:rPr>
-              <a:t> += 1</a:t>
+              <a:t>p.color</a:t>
+            </a:r>
+            <a:r>
+              <a:rPr lang="en-US" dirty="0">
+                <a:latin typeface="Consolas" panose="020B0609020204030204" pitchFamily="49" charset="0"/>
+              </a:rPr>
+              <a:t> = "red"</a:t>
             </a:r>
           </a:p>
         </p:txBody>
@@ -4404,55 +4766,31 @@
               <a:rPr lang="en-US" dirty="0">
                 <a:latin typeface="Consolas" panose="020B0609020204030204" pitchFamily="49" charset="0"/>
               </a:rPr>
-              <a:t>mutable struct Person</a:t>
-            </a:r>
-          </a:p>
-          <a:p>
-            <a:r>
-              <a:rPr lang="en-US" dirty="0">
-                <a:latin typeface="Consolas" panose="020B0609020204030204" pitchFamily="49" charset="0"/>
-              </a:rPr>
-              <a:t>    </a:t>
-            </a:r>
-            <a:r>
-              <a:rPr lang="en-US" dirty="0" err="1">
-                <a:latin typeface="Consolas" panose="020B0609020204030204" pitchFamily="49" charset="0"/>
-              </a:rPr>
-              <a:t>first_name</a:t>
-            </a:r>
-            <a:r>
-              <a:rPr lang="en-US" dirty="0">
-                <a:latin typeface="Consolas" panose="020B0609020204030204" pitchFamily="49" charset="0"/>
-              </a:rPr>
-              <a:t>::String</a:t>
-            </a:r>
-          </a:p>
-          <a:p>
-            <a:r>
-              <a:rPr lang="en-US" dirty="0">
-                <a:latin typeface="Consolas" panose="020B0609020204030204" pitchFamily="49" charset="0"/>
-              </a:rPr>
-              <a:t>    </a:t>
-            </a:r>
-            <a:r>
-              <a:rPr lang="en-US" dirty="0" err="1">
-                <a:latin typeface="Consolas" panose="020B0609020204030204" pitchFamily="49" charset="0"/>
-              </a:rPr>
-              <a:t>last_name</a:t>
-            </a:r>
-            <a:r>
-              <a:rPr lang="en-US" dirty="0">
-                <a:latin typeface="Consolas" panose="020B0609020204030204" pitchFamily="49" charset="0"/>
-              </a:rPr>
-              <a:t>::String</a:t>
-            </a:r>
-          </a:p>
-          <a:p>
-            <a:r>
-              <a:rPr lang="en-US" dirty="0">
-                <a:latin typeface="Consolas" panose="020B0609020204030204" pitchFamily="49" charset="0"/>
-              </a:rPr>
-              <a:t>    age::Int8</a:t>
+              <a:t>mutable struct Pixel</a:t>
+            </a:r>
+          </a:p>
+          <a:p>
+            <a:r>
+              <a:rPr lang="en-US" dirty="0">
+                <a:latin typeface="Consolas" panose="020B0609020204030204" pitchFamily="49" charset="0"/>
+              </a:rPr>
+              <a:t>    x::UInt32</a:t>
+            </a:r>
+          </a:p>
+          <a:p>
+            <a:r>
+              <a:rPr lang="en-US" dirty="0">
+                <a:latin typeface="Consolas" panose="020B0609020204030204" pitchFamily="49" charset="0"/>
+              </a:rPr>
+              <a:t>    y::UInt32</a:t>
+            </a:r>
+          </a:p>
+          <a:p>
+            <a:r>
+              <a:rPr lang="en-US" dirty="0">
+                <a:latin typeface="Consolas" panose="020B0609020204030204" pitchFamily="49" charset="0"/>
+              </a:rPr>
+              <a:t>    color::String</a:t>
             </a:r>
           </a:p>
           <a:p>
@@ -4501,7 +4839,7 @@
               <a:rPr lang="en-US" dirty="0">
                 <a:latin typeface="Consolas" panose="020B0609020204030204" pitchFamily="49" charset="0"/>
               </a:rPr>
-              <a:t>me = Person("Geert Jan", "Bex", 53)</a:t>
+              <a:t>p = Pixel(3, 7, "blue")</a:t>
             </a:r>
           </a:p>
         </p:txBody>
@@ -4554,7 +4892,7 @@
               <a:rPr lang="en-US" dirty="0" err="1">
                 <a:latin typeface="Consolas" panose="020B0609020204030204" pitchFamily="49" charset="0"/>
               </a:rPr>
-              <a:t>me.age</a:t>
+              <a:t>p.color</a:t>
             </a:r>
             <a:r>
               <a:rPr lang="en-US" dirty="0">
@@ -4601,13 +4939,13 @@
               <a:rPr lang="en-US" dirty="0" err="1">
                 <a:latin typeface="Consolas" panose="020B0609020204030204" pitchFamily="49" charset="0"/>
               </a:rPr>
-              <a:t>me.age</a:t>
-            </a:r>
-            <a:r>
-              <a:rPr lang="en-US" dirty="0">
-                <a:latin typeface="Consolas" panose="020B0609020204030204" pitchFamily="49" charset="0"/>
-              </a:rPr>
-              <a:t> += 1</a:t>
+              <a:t>p.color</a:t>
+            </a:r>
+            <a:r>
+              <a:rPr lang="en-US" dirty="0">
+                <a:latin typeface="Consolas" panose="020B0609020204030204" pitchFamily="49" charset="0"/>
+              </a:rPr>
+              <a:t> = "red"</a:t>
             </a:r>
           </a:p>
         </p:txBody>
@@ -4699,6 +5037,35 @@
                 <a:srgbClr val="00B050"/>
               </a:solidFill>
             </a:endParaRPr>
+          </a:p>
+        </p:txBody>
+      </p:sp>
+      <p:sp>
+        <p:nvSpPr>
+          <p:cNvPr id="3" name="Slide Number Placeholder 2">
+            <a:extLst>
+              <a:ext uri="{FF2B5EF4-FFF2-40B4-BE49-F238E27FC236}">
+                <a16:creationId xmlns:a16="http://schemas.microsoft.com/office/drawing/2014/main" id="{CC5D6A7F-925E-469F-988D-A30F7017397B}"/>
+              </a:ext>
+            </a:extLst>
+          </p:cNvPr>
+          <p:cNvSpPr>
+            <a:spLocks noGrp="1"/>
+          </p:cNvSpPr>
+          <p:nvPr>
+            <p:ph type="sldNum" sz="quarter" idx="12"/>
+          </p:nvPr>
+        </p:nvSpPr>
+        <p:spPr/>
+        <p:txBody>
+          <a:bodyPr/>
+          <a:lstStyle/>
+          <a:p>
+            <a:fld id="{78F7A1EC-23D1-431D-8C93-9C4ED5D4A04D}" type="slidenum">
+              <a:rPr lang="en-US" smtClean="0"/>
+              <a:t>11</a:t>
+            </a:fld>
+            <a:endParaRPr lang="en-US"/>
           </a:p>
         </p:txBody>
       </p:sp>
@@ -4760,6 +5127,399 @@
           </a:p>
         </p:txBody>
       </p:sp>
+      <p:sp>
+        <p:nvSpPr>
+          <p:cNvPr id="3" name="Content Placeholder 2">
+            <a:extLst>
+              <a:ext uri="{FF2B5EF4-FFF2-40B4-BE49-F238E27FC236}">
+                <a16:creationId xmlns:a16="http://schemas.microsoft.com/office/drawing/2014/main" id="{20D920DB-FC8B-4A0C-9148-8F97A7B81F0B}"/>
+              </a:ext>
+            </a:extLst>
+          </p:cNvPr>
+          <p:cNvSpPr>
+            <a:spLocks noGrp="1"/>
+          </p:cNvSpPr>
+          <p:nvPr>
+            <p:ph idx="1"/>
+          </p:nvPr>
+        </p:nvSpPr>
+        <p:spPr/>
+        <p:txBody>
+          <a:bodyPr/>
+          <a:lstStyle/>
+          <a:p>
+            <a:r>
+              <a:rPr lang="en-US" dirty="0"/>
+              <a:t>Abstract types, e.g.,</a:t>
+            </a:r>
+          </a:p>
+          <a:p>
+            <a:endParaRPr lang="en-US" dirty="0"/>
+          </a:p>
+          <a:p>
+            <a:r>
+              <a:rPr lang="en-US" dirty="0"/>
+              <a:t>Abstract subtypes of abstract types, e.g.,</a:t>
+            </a:r>
+          </a:p>
+          <a:p>
+            <a:endParaRPr lang="en-US" dirty="0"/>
+          </a:p>
+          <a:p>
+            <a:endParaRPr lang="en-US" dirty="0"/>
+          </a:p>
+          <a:p>
+            <a:r>
+              <a:rPr lang="en-US" dirty="0"/>
+              <a:t>Concrete subtypes of abstract types</a:t>
+            </a:r>
+          </a:p>
+          <a:p>
+            <a:endParaRPr lang="en-US" dirty="0"/>
+          </a:p>
+          <a:p>
+            <a:endParaRPr lang="en-US" dirty="0"/>
+          </a:p>
+          <a:p>
+            <a:endParaRPr lang="en-US" dirty="0"/>
+          </a:p>
+        </p:txBody>
+      </p:sp>
+      <p:sp>
+        <p:nvSpPr>
+          <p:cNvPr id="4" name="TextBox 3">
+            <a:extLst>
+              <a:ext uri="{FF2B5EF4-FFF2-40B4-BE49-F238E27FC236}">
+                <a16:creationId xmlns:a16="http://schemas.microsoft.com/office/drawing/2014/main" id="{8C1317C5-184C-4C69-9CB2-38A4B0EF6DCE}"/>
+              </a:ext>
+            </a:extLst>
+          </p:cNvPr>
+          <p:cNvSpPr txBox="1"/>
+          <p:nvPr/>
+        </p:nvSpPr>
+        <p:spPr>
+          <a:xfrm>
+            <a:off x="1631087" y="2270468"/>
+            <a:ext cx="6656178" cy="369332"/>
+          </a:xfrm>
+          <a:prstGeom prst="rect">
+            <a:avLst/>
+          </a:prstGeom>
+          <a:solidFill>
+            <a:schemeClr val="bg1">
+              <a:lumMod val="85000"/>
+            </a:schemeClr>
+          </a:solidFill>
+        </p:spPr>
+        <p:txBody>
+          <a:bodyPr wrap="square" rtlCol="0">
+            <a:spAutoFit/>
+          </a:bodyPr>
+          <a:lstStyle/>
+          <a:p>
+            <a:r>
+              <a:rPr lang="en-US" dirty="0">
+                <a:latin typeface="Consolas" panose="020B0609020204030204" pitchFamily="49" charset="0"/>
+              </a:rPr>
+              <a:t>abstract type </a:t>
+            </a:r>
+            <a:r>
+              <a:rPr lang="en-US" dirty="0" err="1">
+                <a:latin typeface="Consolas" panose="020B0609020204030204" pitchFamily="49" charset="0"/>
+              </a:rPr>
+              <a:t>AbstractPoint</a:t>
+            </a:r>
+            <a:r>
+              <a:rPr lang="en-US" dirty="0">
+                <a:latin typeface="Consolas" panose="020B0609020204030204" pitchFamily="49" charset="0"/>
+              </a:rPr>
+              <a:t> end</a:t>
+            </a:r>
+          </a:p>
+        </p:txBody>
+      </p:sp>
+      <p:sp>
+        <p:nvSpPr>
+          <p:cNvPr id="5" name="TextBox 4">
+            <a:extLst>
+              <a:ext uri="{FF2B5EF4-FFF2-40B4-BE49-F238E27FC236}">
+                <a16:creationId xmlns:a16="http://schemas.microsoft.com/office/drawing/2014/main" id="{940A8FE7-CEC4-4946-8B5D-530BFFEC1084}"/>
+              </a:ext>
+            </a:extLst>
+          </p:cNvPr>
+          <p:cNvSpPr txBox="1"/>
+          <p:nvPr/>
+        </p:nvSpPr>
+        <p:spPr>
+          <a:xfrm>
+            <a:off x="1631088" y="3312359"/>
+            <a:ext cx="6656178" cy="369332"/>
+          </a:xfrm>
+          <a:prstGeom prst="rect">
+            <a:avLst/>
+          </a:prstGeom>
+          <a:solidFill>
+            <a:schemeClr val="bg1">
+              <a:lumMod val="85000"/>
+            </a:schemeClr>
+          </a:solidFill>
+        </p:spPr>
+        <p:txBody>
+          <a:bodyPr wrap="square" rtlCol="0">
+            <a:spAutoFit/>
+          </a:bodyPr>
+          <a:lstStyle/>
+          <a:p>
+            <a:r>
+              <a:rPr lang="en-US" dirty="0">
+                <a:latin typeface="Consolas" panose="020B0609020204030204" pitchFamily="49" charset="0"/>
+              </a:rPr>
+              <a:t>abstract type Abstract2DPoint &lt;: </a:t>
+            </a:r>
+            <a:r>
+              <a:rPr lang="en-US" dirty="0" err="1">
+                <a:latin typeface="Consolas" panose="020B0609020204030204" pitchFamily="49" charset="0"/>
+              </a:rPr>
+              <a:t>AbstractPoint</a:t>
+            </a:r>
+            <a:r>
+              <a:rPr lang="en-US" dirty="0">
+                <a:latin typeface="Consolas" panose="020B0609020204030204" pitchFamily="49" charset="0"/>
+              </a:rPr>
+              <a:t> end</a:t>
+            </a:r>
+          </a:p>
+        </p:txBody>
+      </p:sp>
+      <p:sp>
+        <p:nvSpPr>
+          <p:cNvPr id="6" name="TextBox 5">
+            <a:extLst>
+              <a:ext uri="{FF2B5EF4-FFF2-40B4-BE49-F238E27FC236}">
+                <a16:creationId xmlns:a16="http://schemas.microsoft.com/office/drawing/2014/main" id="{7B8337DB-9DB6-4CBD-BA8F-697197146FB1}"/>
+              </a:ext>
+            </a:extLst>
+          </p:cNvPr>
+          <p:cNvSpPr txBox="1"/>
+          <p:nvPr/>
+        </p:nvSpPr>
+        <p:spPr>
+          <a:xfrm>
+            <a:off x="1631086" y="3816628"/>
+            <a:ext cx="6656179" cy="369332"/>
+          </a:xfrm>
+          <a:prstGeom prst="rect">
+            <a:avLst/>
+          </a:prstGeom>
+          <a:solidFill>
+            <a:schemeClr val="bg1">
+              <a:lumMod val="85000"/>
+            </a:schemeClr>
+          </a:solidFill>
+        </p:spPr>
+        <p:txBody>
+          <a:bodyPr wrap="square" rtlCol="0">
+            <a:spAutoFit/>
+          </a:bodyPr>
+          <a:lstStyle/>
+          <a:p>
+            <a:r>
+              <a:rPr lang="en-US" dirty="0">
+                <a:latin typeface="Consolas" panose="020B0609020204030204" pitchFamily="49" charset="0"/>
+              </a:rPr>
+              <a:t>abstract type Abstract3DPoint &lt;: </a:t>
+            </a:r>
+            <a:r>
+              <a:rPr lang="en-US" dirty="0" err="1">
+                <a:latin typeface="Consolas" panose="020B0609020204030204" pitchFamily="49" charset="0"/>
+              </a:rPr>
+              <a:t>AbstractPoint</a:t>
+            </a:r>
+            <a:r>
+              <a:rPr lang="en-US" dirty="0">
+                <a:latin typeface="Consolas" panose="020B0609020204030204" pitchFamily="49" charset="0"/>
+              </a:rPr>
+              <a:t> end</a:t>
+            </a:r>
+          </a:p>
+        </p:txBody>
+      </p:sp>
+      <p:sp>
+        <p:nvSpPr>
+          <p:cNvPr id="8" name="TextBox 7">
+            <a:extLst>
+              <a:ext uri="{FF2B5EF4-FFF2-40B4-BE49-F238E27FC236}">
+                <a16:creationId xmlns:a16="http://schemas.microsoft.com/office/drawing/2014/main" id="{B1E9A5C7-AACA-490F-9F3B-53C6A18B898B}"/>
+              </a:ext>
+            </a:extLst>
+          </p:cNvPr>
+          <p:cNvSpPr txBox="1"/>
+          <p:nvPr/>
+        </p:nvSpPr>
+        <p:spPr>
+          <a:xfrm>
+            <a:off x="1631086" y="4858519"/>
+            <a:ext cx="6656179" cy="1200329"/>
+          </a:xfrm>
+          <a:prstGeom prst="rect">
+            <a:avLst/>
+          </a:prstGeom>
+          <a:solidFill>
+            <a:schemeClr val="bg1">
+              <a:lumMod val="85000"/>
+            </a:schemeClr>
+          </a:solidFill>
+        </p:spPr>
+        <p:txBody>
+          <a:bodyPr wrap="square" rtlCol="0">
+            <a:spAutoFit/>
+          </a:bodyPr>
+          <a:lstStyle/>
+          <a:p>
+            <a:r>
+              <a:rPr lang="en-US" dirty="0">
+                <a:latin typeface="Consolas" panose="020B0609020204030204" pitchFamily="49" charset="0"/>
+              </a:rPr>
+              <a:t>mutable struct Point2D &lt;: Abstract2DPoint</a:t>
+            </a:r>
+          </a:p>
+          <a:p>
+            <a:r>
+              <a:rPr lang="en-US" dirty="0">
+                <a:latin typeface="Consolas" panose="020B0609020204030204" pitchFamily="49" charset="0"/>
+              </a:rPr>
+              <a:t>    x::Real</a:t>
+            </a:r>
+          </a:p>
+          <a:p>
+            <a:r>
+              <a:rPr lang="en-US" dirty="0">
+                <a:latin typeface="Consolas" panose="020B0609020204030204" pitchFamily="49" charset="0"/>
+              </a:rPr>
+              <a:t>    y::Real</a:t>
+            </a:r>
+          </a:p>
+          <a:p>
+            <a:r>
+              <a:rPr lang="en-US" dirty="0">
+                <a:latin typeface="Consolas" panose="020B0609020204030204" pitchFamily="49" charset="0"/>
+              </a:rPr>
+              <a:t>end</a:t>
+            </a:r>
+          </a:p>
+        </p:txBody>
+      </p:sp>
+      <p:sp>
+        <p:nvSpPr>
+          <p:cNvPr id="9" name="TextBox 8">
+            <a:extLst>
+              <a:ext uri="{FF2B5EF4-FFF2-40B4-BE49-F238E27FC236}">
+                <a16:creationId xmlns:a16="http://schemas.microsoft.com/office/drawing/2014/main" id="{713E26DD-DDB3-4EE9-B777-21FD1B5118D7}"/>
+              </a:ext>
+            </a:extLst>
+          </p:cNvPr>
+          <p:cNvSpPr txBox="1"/>
+          <p:nvPr/>
+        </p:nvSpPr>
+        <p:spPr>
+          <a:xfrm>
+            <a:off x="9319053" y="4937810"/>
+            <a:ext cx="2034747" cy="646331"/>
+          </a:xfrm>
+          <a:prstGeom prst="rect">
+            <a:avLst/>
+          </a:prstGeom>
+          <a:noFill/>
+          <a:ln>
+            <a:solidFill>
+              <a:schemeClr val="tx1"/>
+            </a:solidFill>
+          </a:ln>
+        </p:spPr>
+        <p:txBody>
+          <a:bodyPr wrap="square" rtlCol="0">
+            <a:spAutoFit/>
+          </a:bodyPr>
+          <a:lstStyle/>
+          <a:p>
+            <a:pPr algn="ctr"/>
+            <a:r>
+              <a:rPr lang="en-US" dirty="0"/>
+              <a:t>No subtyping from concrete types!</a:t>
+            </a:r>
+          </a:p>
+        </p:txBody>
+      </p:sp>
+      <p:sp>
+        <p:nvSpPr>
+          <p:cNvPr id="10" name="TextBox 9">
+            <a:extLst>
+              <a:ext uri="{FF2B5EF4-FFF2-40B4-BE49-F238E27FC236}">
+                <a16:creationId xmlns:a16="http://schemas.microsoft.com/office/drawing/2014/main" id="{A2C6DD19-A381-425A-BC59-6D0385C80243}"/>
+              </a:ext>
+            </a:extLst>
+          </p:cNvPr>
+          <p:cNvSpPr txBox="1"/>
+          <p:nvPr/>
+        </p:nvSpPr>
+        <p:spPr>
+          <a:xfrm>
+            <a:off x="9319052" y="3466092"/>
+            <a:ext cx="2034747" cy="646331"/>
+          </a:xfrm>
+          <a:prstGeom prst="rect">
+            <a:avLst/>
+          </a:prstGeom>
+          <a:noFill/>
+          <a:ln>
+            <a:solidFill>
+              <a:schemeClr val="tx1"/>
+            </a:solidFill>
+          </a:ln>
+        </p:spPr>
+        <p:txBody>
+          <a:bodyPr wrap="square" rtlCol="0">
+            <a:spAutoFit/>
+          </a:bodyPr>
+          <a:lstStyle/>
+          <a:p>
+            <a:pPr algn="ctr"/>
+            <a:r>
+              <a:rPr lang="en-US" dirty="0"/>
+              <a:t>Subtyping from single type only!</a:t>
+            </a:r>
+          </a:p>
+        </p:txBody>
+      </p:sp>
+      <p:sp>
+        <p:nvSpPr>
+          <p:cNvPr id="11" name="Slide Number Placeholder 10">
+            <a:extLst>
+              <a:ext uri="{FF2B5EF4-FFF2-40B4-BE49-F238E27FC236}">
+                <a16:creationId xmlns:a16="http://schemas.microsoft.com/office/drawing/2014/main" id="{8D4442DC-DACE-41A3-A561-9A91FCDF5DF5}"/>
+              </a:ext>
+            </a:extLst>
+          </p:cNvPr>
+          <p:cNvSpPr>
+            <a:spLocks noGrp="1"/>
+          </p:cNvSpPr>
+          <p:nvPr>
+            <p:ph type="sldNum" sz="quarter" idx="12"/>
+          </p:nvPr>
+        </p:nvSpPr>
+        <p:spPr/>
+        <p:txBody>
+          <a:bodyPr/>
+          <a:lstStyle/>
+          <a:p>
+            <a:fld id="{78F7A1EC-23D1-431D-8C93-9C4ED5D4A04D}" type="slidenum">
+              <a:rPr lang="en-US" smtClean="0"/>
+              <a:t>12</a:t>
+            </a:fld>
+            <a:endParaRPr lang="en-US"/>
+          </a:p>
+        </p:txBody>
+      </p:sp>
     </p:spTree>
     <p:extLst>
       <p:ext uri="{BB962C8B-B14F-4D97-AF65-F5344CB8AC3E}">
@@ -4795,6 +5555,2200 @@
           <p:cNvPr id="2" name="Title 1">
             <a:extLst>
               <a:ext uri="{FF2B5EF4-FFF2-40B4-BE49-F238E27FC236}">
+                <a16:creationId xmlns:a16="http://schemas.microsoft.com/office/drawing/2014/main" id="{08E34A9F-7CD3-4560-A76C-7466EB440AB2}"/>
+              </a:ext>
+            </a:extLst>
+          </p:cNvPr>
+          <p:cNvSpPr>
+            <a:spLocks noGrp="1"/>
+          </p:cNvSpPr>
+          <p:nvPr>
+            <p:ph type="title"/>
+          </p:nvPr>
+        </p:nvSpPr>
+        <p:spPr/>
+        <p:txBody>
+          <a:bodyPr/>
+          <a:lstStyle/>
+          <a:p>
+            <a:r>
+              <a:rPr lang="en-US" dirty="0"/>
+              <a:t>Accessor methods</a:t>
+            </a:r>
+          </a:p>
+        </p:txBody>
+      </p:sp>
+      <p:sp>
+        <p:nvSpPr>
+          <p:cNvPr id="3" name="Content Placeholder 2">
+            <a:extLst>
+              <a:ext uri="{FF2B5EF4-FFF2-40B4-BE49-F238E27FC236}">
+                <a16:creationId xmlns:a16="http://schemas.microsoft.com/office/drawing/2014/main" id="{F7E4E4D1-890D-40F4-9674-9B1B41EB6C6B}"/>
+              </a:ext>
+            </a:extLst>
+          </p:cNvPr>
+          <p:cNvSpPr>
+            <a:spLocks noGrp="1"/>
+          </p:cNvSpPr>
+          <p:nvPr>
+            <p:ph idx="1"/>
+          </p:nvPr>
+        </p:nvSpPr>
+        <p:spPr/>
+        <p:txBody>
+          <a:bodyPr/>
+          <a:lstStyle/>
+          <a:p>
+            <a:r>
+              <a:rPr lang="en-US" dirty="0"/>
+              <a:t>Do not access fields in structures, defines accessor methods</a:t>
+            </a:r>
+          </a:p>
+        </p:txBody>
+      </p:sp>
+      <p:sp>
+        <p:nvSpPr>
+          <p:cNvPr id="4" name="TextBox 3">
+            <a:extLst>
+              <a:ext uri="{FF2B5EF4-FFF2-40B4-BE49-F238E27FC236}">
+                <a16:creationId xmlns:a16="http://schemas.microsoft.com/office/drawing/2014/main" id="{438E118A-7838-43C2-AFB9-0EE30E5D570B}"/>
+              </a:ext>
+            </a:extLst>
+          </p:cNvPr>
+          <p:cNvSpPr txBox="1"/>
+          <p:nvPr/>
+        </p:nvSpPr>
+        <p:spPr>
+          <a:xfrm>
+            <a:off x="1499283" y="2686281"/>
+            <a:ext cx="7611766" cy="2308324"/>
+          </a:xfrm>
+          <a:prstGeom prst="rect">
+            <a:avLst/>
+          </a:prstGeom>
+          <a:solidFill>
+            <a:schemeClr val="bg1">
+              <a:lumMod val="85000"/>
+            </a:schemeClr>
+          </a:solidFill>
+        </p:spPr>
+        <p:txBody>
+          <a:bodyPr wrap="square" rtlCol="0">
+            <a:spAutoFit/>
+          </a:bodyPr>
+          <a:lstStyle/>
+          <a:p>
+            <a:r>
+              <a:rPr lang="en-US" dirty="0" err="1">
+                <a:latin typeface="Consolas" panose="020B0609020204030204" pitchFamily="49" charset="0"/>
+              </a:rPr>
+              <a:t>get_x</a:t>
+            </a:r>
+            <a:r>
+              <a:rPr lang="en-US" dirty="0">
+                <a:latin typeface="Consolas" panose="020B0609020204030204" pitchFamily="49" charset="0"/>
+              </a:rPr>
+              <a:t>(p::</a:t>
+            </a:r>
+            <a:r>
+              <a:rPr lang="en-US" dirty="0" err="1">
+                <a:latin typeface="Consolas" panose="020B0609020204030204" pitchFamily="49" charset="0"/>
+              </a:rPr>
+              <a:t>AbstractPoint</a:t>
+            </a:r>
+            <a:r>
+              <a:rPr lang="en-US" dirty="0">
+                <a:latin typeface="Consolas" panose="020B0609020204030204" pitchFamily="49" charset="0"/>
+              </a:rPr>
+              <a:t>) = </a:t>
+            </a:r>
+            <a:r>
+              <a:rPr lang="en-US" dirty="0" err="1">
+                <a:latin typeface="Consolas" panose="020B0609020204030204" pitchFamily="49" charset="0"/>
+              </a:rPr>
+              <a:t>p.x</a:t>
+            </a:r>
+            <a:endParaRPr lang="en-US" dirty="0">
+              <a:latin typeface="Consolas" panose="020B0609020204030204" pitchFamily="49" charset="0"/>
+            </a:endParaRPr>
+          </a:p>
+          <a:p>
+            <a:r>
+              <a:rPr lang="en-US" dirty="0" err="1">
+                <a:latin typeface="Consolas" panose="020B0609020204030204" pitchFamily="49" charset="0"/>
+              </a:rPr>
+              <a:t>set_x</a:t>
+            </a:r>
+            <a:r>
+              <a:rPr lang="en-US" dirty="0">
+                <a:latin typeface="Consolas" panose="020B0609020204030204" pitchFamily="49" charset="0"/>
+              </a:rPr>
+              <a:t>(p::</a:t>
+            </a:r>
+            <a:r>
+              <a:rPr lang="en-US" dirty="0" err="1">
+                <a:latin typeface="Consolas" panose="020B0609020204030204" pitchFamily="49" charset="0"/>
+              </a:rPr>
+              <a:t>AbstractPoint</a:t>
+            </a:r>
+            <a:r>
+              <a:rPr lang="en-US" dirty="0">
+                <a:latin typeface="Consolas" panose="020B0609020204030204" pitchFamily="49" charset="0"/>
+              </a:rPr>
+              <a:t>, </a:t>
+            </a:r>
+            <a:r>
+              <a:rPr lang="en-US" dirty="0" err="1">
+                <a:latin typeface="Consolas" panose="020B0609020204030204" pitchFamily="49" charset="0"/>
+              </a:rPr>
+              <a:t>val</a:t>
+            </a:r>
+            <a:r>
+              <a:rPr lang="en-US" dirty="0">
+                <a:latin typeface="Consolas" panose="020B0609020204030204" pitchFamily="49" charset="0"/>
+              </a:rPr>
+              <a:t>::Real) = begin </a:t>
+            </a:r>
+            <a:r>
+              <a:rPr lang="en-US" dirty="0" err="1">
+                <a:latin typeface="Consolas" panose="020B0609020204030204" pitchFamily="49" charset="0"/>
+              </a:rPr>
+              <a:t>p.x</a:t>
+            </a:r>
+            <a:r>
+              <a:rPr lang="en-US" dirty="0">
+                <a:latin typeface="Consolas" panose="020B0609020204030204" pitchFamily="49" charset="0"/>
+              </a:rPr>
+              <a:t> = </a:t>
+            </a:r>
+            <a:r>
+              <a:rPr lang="en-US" dirty="0" err="1">
+                <a:latin typeface="Consolas" panose="020B0609020204030204" pitchFamily="49" charset="0"/>
+              </a:rPr>
+              <a:t>val</a:t>
+            </a:r>
+            <a:r>
+              <a:rPr lang="en-US" dirty="0">
+                <a:latin typeface="Consolas" panose="020B0609020204030204" pitchFamily="49" charset="0"/>
+              </a:rPr>
+              <a:t>; end</a:t>
+            </a:r>
+          </a:p>
+          <a:p>
+            <a:endParaRPr lang="en-US" dirty="0">
+              <a:latin typeface="Consolas" panose="020B0609020204030204" pitchFamily="49" charset="0"/>
+            </a:endParaRPr>
+          </a:p>
+          <a:p>
+            <a:r>
+              <a:rPr lang="en-US" dirty="0" err="1">
+                <a:latin typeface="Consolas" panose="020B0609020204030204" pitchFamily="49" charset="0"/>
+              </a:rPr>
+              <a:t>get_y</a:t>
+            </a:r>
+            <a:r>
+              <a:rPr lang="en-US" dirty="0">
+                <a:latin typeface="Consolas" panose="020B0609020204030204" pitchFamily="49" charset="0"/>
+              </a:rPr>
+              <a:t>(p::</a:t>
+            </a:r>
+            <a:r>
+              <a:rPr lang="en-US" dirty="0" err="1">
+                <a:latin typeface="Consolas" panose="020B0609020204030204" pitchFamily="49" charset="0"/>
+              </a:rPr>
+              <a:t>AbstractPoint</a:t>
+            </a:r>
+            <a:r>
+              <a:rPr lang="en-US" dirty="0">
+                <a:latin typeface="Consolas" panose="020B0609020204030204" pitchFamily="49" charset="0"/>
+              </a:rPr>
+              <a:t>) = </a:t>
+            </a:r>
+            <a:r>
+              <a:rPr lang="en-US" dirty="0" err="1">
+                <a:latin typeface="Consolas" panose="020B0609020204030204" pitchFamily="49" charset="0"/>
+              </a:rPr>
+              <a:t>p.y</a:t>
+            </a:r>
+            <a:endParaRPr lang="en-US" dirty="0">
+              <a:latin typeface="Consolas" panose="020B0609020204030204" pitchFamily="49" charset="0"/>
+            </a:endParaRPr>
+          </a:p>
+          <a:p>
+            <a:r>
+              <a:rPr lang="en-US" dirty="0" err="1">
+                <a:latin typeface="Consolas" panose="020B0609020204030204" pitchFamily="49" charset="0"/>
+              </a:rPr>
+              <a:t>set_y</a:t>
+            </a:r>
+            <a:r>
+              <a:rPr lang="en-US" dirty="0">
+                <a:latin typeface="Consolas" panose="020B0609020204030204" pitchFamily="49" charset="0"/>
+              </a:rPr>
+              <a:t>(p::</a:t>
+            </a:r>
+            <a:r>
+              <a:rPr lang="en-US" dirty="0" err="1">
+                <a:latin typeface="Consolas" panose="020B0609020204030204" pitchFamily="49" charset="0"/>
+              </a:rPr>
+              <a:t>AbstractPoint</a:t>
+            </a:r>
+            <a:r>
+              <a:rPr lang="en-US" dirty="0">
+                <a:latin typeface="Consolas" panose="020B0609020204030204" pitchFamily="49" charset="0"/>
+              </a:rPr>
+              <a:t>, </a:t>
+            </a:r>
+            <a:r>
+              <a:rPr lang="en-US" dirty="0" err="1">
+                <a:latin typeface="Consolas" panose="020B0609020204030204" pitchFamily="49" charset="0"/>
+              </a:rPr>
+              <a:t>val</a:t>
+            </a:r>
+            <a:r>
+              <a:rPr lang="en-US" dirty="0">
+                <a:latin typeface="Consolas" panose="020B0609020204030204" pitchFamily="49" charset="0"/>
+              </a:rPr>
+              <a:t>::Real) = begin </a:t>
+            </a:r>
+            <a:r>
+              <a:rPr lang="en-US" dirty="0" err="1">
+                <a:latin typeface="Consolas" panose="020B0609020204030204" pitchFamily="49" charset="0"/>
+              </a:rPr>
+              <a:t>p.y</a:t>
+            </a:r>
+            <a:r>
+              <a:rPr lang="en-US" dirty="0">
+                <a:latin typeface="Consolas" panose="020B0609020204030204" pitchFamily="49" charset="0"/>
+              </a:rPr>
+              <a:t> = </a:t>
+            </a:r>
+            <a:r>
+              <a:rPr lang="en-US" dirty="0" err="1">
+                <a:latin typeface="Consolas" panose="020B0609020204030204" pitchFamily="49" charset="0"/>
+              </a:rPr>
+              <a:t>val</a:t>
+            </a:r>
+            <a:r>
+              <a:rPr lang="en-US" dirty="0">
+                <a:latin typeface="Consolas" panose="020B0609020204030204" pitchFamily="49" charset="0"/>
+              </a:rPr>
+              <a:t>; end</a:t>
+            </a:r>
+          </a:p>
+          <a:p>
+            <a:endParaRPr lang="en-US" dirty="0">
+              <a:latin typeface="Consolas" panose="020B0609020204030204" pitchFamily="49" charset="0"/>
+            </a:endParaRPr>
+          </a:p>
+          <a:p>
+            <a:r>
+              <a:rPr lang="en-US" dirty="0" err="1">
+                <a:latin typeface="Consolas" panose="020B0609020204030204" pitchFamily="49" charset="0"/>
+              </a:rPr>
+              <a:t>get_z</a:t>
+            </a:r>
+            <a:r>
+              <a:rPr lang="en-US" dirty="0">
+                <a:latin typeface="Consolas" panose="020B0609020204030204" pitchFamily="49" charset="0"/>
+              </a:rPr>
+              <a:t>(p::AbstractPoint3D) = </a:t>
+            </a:r>
+            <a:r>
+              <a:rPr lang="en-US" dirty="0" err="1">
+                <a:latin typeface="Consolas" panose="020B0609020204030204" pitchFamily="49" charset="0"/>
+              </a:rPr>
+              <a:t>p.z</a:t>
+            </a:r>
+            <a:endParaRPr lang="en-US" dirty="0">
+              <a:latin typeface="Consolas" panose="020B0609020204030204" pitchFamily="49" charset="0"/>
+            </a:endParaRPr>
+          </a:p>
+          <a:p>
+            <a:r>
+              <a:rPr lang="en-US" dirty="0" err="1">
+                <a:latin typeface="Consolas" panose="020B0609020204030204" pitchFamily="49" charset="0"/>
+              </a:rPr>
+              <a:t>set_z</a:t>
+            </a:r>
+            <a:r>
+              <a:rPr lang="en-US" dirty="0">
+                <a:latin typeface="Consolas" panose="020B0609020204030204" pitchFamily="49" charset="0"/>
+              </a:rPr>
+              <a:t>(p::AbstractPoint3D, </a:t>
+            </a:r>
+            <a:r>
+              <a:rPr lang="en-US" dirty="0" err="1">
+                <a:latin typeface="Consolas" panose="020B0609020204030204" pitchFamily="49" charset="0"/>
+              </a:rPr>
+              <a:t>val</a:t>
+            </a:r>
+            <a:r>
+              <a:rPr lang="en-US" dirty="0">
+                <a:latin typeface="Consolas" panose="020B0609020204030204" pitchFamily="49" charset="0"/>
+              </a:rPr>
+              <a:t>::Real) = begin </a:t>
+            </a:r>
+            <a:r>
+              <a:rPr lang="en-US" dirty="0" err="1">
+                <a:latin typeface="Consolas" panose="020B0609020204030204" pitchFamily="49" charset="0"/>
+              </a:rPr>
+              <a:t>p.z</a:t>
+            </a:r>
+            <a:r>
+              <a:rPr lang="en-US" dirty="0">
+                <a:latin typeface="Consolas" panose="020B0609020204030204" pitchFamily="49" charset="0"/>
+              </a:rPr>
+              <a:t> = </a:t>
+            </a:r>
+            <a:r>
+              <a:rPr lang="en-US" dirty="0" err="1">
+                <a:latin typeface="Consolas" panose="020B0609020204030204" pitchFamily="49" charset="0"/>
+              </a:rPr>
+              <a:t>val</a:t>
+            </a:r>
+            <a:r>
+              <a:rPr lang="en-US" dirty="0">
+                <a:latin typeface="Consolas" panose="020B0609020204030204" pitchFamily="49" charset="0"/>
+              </a:rPr>
+              <a:t>; end</a:t>
+            </a:r>
+          </a:p>
+        </p:txBody>
+      </p:sp>
+      <p:sp>
+        <p:nvSpPr>
+          <p:cNvPr id="5" name="Slide Number Placeholder 4">
+            <a:extLst>
+              <a:ext uri="{FF2B5EF4-FFF2-40B4-BE49-F238E27FC236}">
+                <a16:creationId xmlns:a16="http://schemas.microsoft.com/office/drawing/2014/main" id="{D18F523E-7BD0-4609-82CD-1BD2346894A4}"/>
+              </a:ext>
+            </a:extLst>
+          </p:cNvPr>
+          <p:cNvSpPr>
+            <a:spLocks noGrp="1"/>
+          </p:cNvSpPr>
+          <p:nvPr>
+            <p:ph type="sldNum" sz="quarter" idx="12"/>
+          </p:nvPr>
+        </p:nvSpPr>
+        <p:spPr/>
+        <p:txBody>
+          <a:bodyPr/>
+          <a:lstStyle/>
+          <a:p>
+            <a:fld id="{78F7A1EC-23D1-431D-8C93-9C4ED5D4A04D}" type="slidenum">
+              <a:rPr lang="en-US" smtClean="0"/>
+              <a:t>13</a:t>
+            </a:fld>
+            <a:endParaRPr lang="en-US"/>
+          </a:p>
+        </p:txBody>
+      </p:sp>
+    </p:spTree>
+    <p:extLst>
+      <p:ext uri="{BB962C8B-B14F-4D97-AF65-F5344CB8AC3E}">
+        <p14:creationId xmlns:p14="http://schemas.microsoft.com/office/powerpoint/2010/main" val="4283076253"/>
+      </p:ext>
+    </p:extLst>
+  </p:cSld>
+  <p:clrMapOvr>
+    <a:masterClrMapping/>
+  </p:clrMapOvr>
+</p:sld>
+</file>
+
+<file path=ppt/slides/slide14.xml><?xml version="1.0" encoding="utf-8"?>
+<p:sld xmlns:a="http://schemas.openxmlformats.org/drawingml/2006/main" xmlns:r="http://schemas.openxmlformats.org/officeDocument/2006/relationships" xmlns:p="http://schemas.openxmlformats.org/presentationml/2006/main">
+  <p:cSld>
+    <p:spTree>
+      <p:nvGrpSpPr>
+        <p:cNvPr id="1" name=""/>
+        <p:cNvGrpSpPr/>
+        <p:nvPr/>
+      </p:nvGrpSpPr>
+      <p:grpSpPr>
+        <a:xfrm>
+          <a:off x="0" y="0"/>
+          <a:ext cx="0" cy="0"/>
+          <a:chOff x="0" y="0"/>
+          <a:chExt cx="0" cy="0"/>
+        </a:xfrm>
+      </p:grpSpPr>
+      <p:sp>
+        <p:nvSpPr>
+          <p:cNvPr id="2" name="Title 1">
+            <a:extLst>
+              <a:ext uri="{FF2B5EF4-FFF2-40B4-BE49-F238E27FC236}">
+                <a16:creationId xmlns:a16="http://schemas.microsoft.com/office/drawing/2014/main" id="{77FA4432-AC7E-4C0E-A953-616D26182D8F}"/>
+              </a:ext>
+            </a:extLst>
+          </p:cNvPr>
+          <p:cNvSpPr>
+            <a:spLocks noGrp="1"/>
+          </p:cNvSpPr>
+          <p:nvPr>
+            <p:ph type="title"/>
+          </p:nvPr>
+        </p:nvSpPr>
+        <p:spPr/>
+        <p:txBody>
+          <a:bodyPr/>
+          <a:lstStyle/>
+          <a:p>
+            <a:r>
+              <a:rPr lang="en-US" dirty="0"/>
+              <a:t>Methods on types</a:t>
+            </a:r>
+          </a:p>
+        </p:txBody>
+      </p:sp>
+      <p:sp>
+        <p:nvSpPr>
+          <p:cNvPr id="3" name="Content Placeholder 2">
+            <a:extLst>
+              <a:ext uri="{FF2B5EF4-FFF2-40B4-BE49-F238E27FC236}">
+                <a16:creationId xmlns:a16="http://schemas.microsoft.com/office/drawing/2014/main" id="{9C935DC9-D006-48EA-B28F-DFC60708B8D0}"/>
+              </a:ext>
+            </a:extLst>
+          </p:cNvPr>
+          <p:cNvSpPr>
+            <a:spLocks noGrp="1"/>
+          </p:cNvSpPr>
+          <p:nvPr>
+            <p:ph idx="1"/>
+          </p:nvPr>
+        </p:nvSpPr>
+        <p:spPr/>
+        <p:txBody>
+          <a:bodyPr/>
+          <a:lstStyle/>
+          <a:p>
+            <a:r>
+              <a:rPr lang="en-US" dirty="0"/>
+              <a:t>Multiple dispatch</a:t>
+            </a:r>
+          </a:p>
+        </p:txBody>
+      </p:sp>
+      <p:sp>
+        <p:nvSpPr>
+          <p:cNvPr id="4" name="TextBox 3">
+            <a:extLst>
+              <a:ext uri="{FF2B5EF4-FFF2-40B4-BE49-F238E27FC236}">
+                <a16:creationId xmlns:a16="http://schemas.microsoft.com/office/drawing/2014/main" id="{E6AE8D53-8050-492F-8C1B-4E297382426A}"/>
+              </a:ext>
+            </a:extLst>
+          </p:cNvPr>
+          <p:cNvSpPr txBox="1"/>
+          <p:nvPr/>
+        </p:nvSpPr>
+        <p:spPr>
+          <a:xfrm>
+            <a:off x="1458090" y="2403643"/>
+            <a:ext cx="7825953" cy="1477328"/>
+          </a:xfrm>
+          <a:prstGeom prst="rect">
+            <a:avLst/>
+          </a:prstGeom>
+          <a:solidFill>
+            <a:schemeClr val="bg1">
+              <a:lumMod val="85000"/>
+            </a:schemeClr>
+          </a:solidFill>
+        </p:spPr>
+        <p:txBody>
+          <a:bodyPr wrap="square" rtlCol="0">
+            <a:spAutoFit/>
+          </a:bodyPr>
+          <a:lstStyle/>
+          <a:p>
+            <a:r>
+              <a:rPr lang="en-US" dirty="0">
+                <a:latin typeface="Consolas" panose="020B0609020204030204" pitchFamily="49" charset="0"/>
+              </a:rPr>
+              <a:t>function distance(p1::Abstract2DPoint, p2::Abstract2DPoint)</a:t>
+            </a:r>
+          </a:p>
+          <a:p>
+            <a:r>
+              <a:rPr lang="en-US" dirty="0">
+                <a:latin typeface="Consolas" panose="020B0609020204030204" pitchFamily="49" charset="0"/>
+              </a:rPr>
+              <a:t>    x1 = </a:t>
+            </a:r>
+            <a:r>
+              <a:rPr lang="en-US" dirty="0" err="1">
+                <a:latin typeface="Consolas" panose="020B0609020204030204" pitchFamily="49" charset="0"/>
+              </a:rPr>
+              <a:t>get_x</a:t>
+            </a:r>
+            <a:r>
+              <a:rPr lang="en-US" dirty="0">
+                <a:latin typeface="Consolas" panose="020B0609020204030204" pitchFamily="49" charset="0"/>
+              </a:rPr>
+              <a:t>(p1); y1 = </a:t>
+            </a:r>
+            <a:r>
+              <a:rPr lang="en-US" dirty="0" err="1">
+                <a:latin typeface="Consolas" panose="020B0609020204030204" pitchFamily="49" charset="0"/>
+              </a:rPr>
+              <a:t>get_y</a:t>
+            </a:r>
+            <a:r>
+              <a:rPr lang="en-US" dirty="0">
+                <a:latin typeface="Consolas" panose="020B0609020204030204" pitchFamily="49" charset="0"/>
+              </a:rPr>
+              <a:t>(p1)</a:t>
+            </a:r>
+          </a:p>
+          <a:p>
+            <a:r>
+              <a:rPr lang="en-US" dirty="0">
+                <a:latin typeface="Consolas" panose="020B0609020204030204" pitchFamily="49" charset="0"/>
+              </a:rPr>
+              <a:t>    x2 = </a:t>
+            </a:r>
+            <a:r>
+              <a:rPr lang="en-US" dirty="0" err="1">
+                <a:latin typeface="Consolas" panose="020B0609020204030204" pitchFamily="49" charset="0"/>
+              </a:rPr>
+              <a:t>get_x</a:t>
+            </a:r>
+            <a:r>
+              <a:rPr lang="en-US" dirty="0">
+                <a:latin typeface="Consolas" panose="020B0609020204030204" pitchFamily="49" charset="0"/>
+              </a:rPr>
+              <a:t>(p2); y2 = </a:t>
+            </a:r>
+            <a:r>
+              <a:rPr lang="en-US" dirty="0" err="1">
+                <a:latin typeface="Consolas" panose="020B0609020204030204" pitchFamily="49" charset="0"/>
+              </a:rPr>
+              <a:t>get_y</a:t>
+            </a:r>
+            <a:r>
+              <a:rPr lang="en-US" dirty="0">
+                <a:latin typeface="Consolas" panose="020B0609020204030204" pitchFamily="49" charset="0"/>
+              </a:rPr>
+              <a:t>(p2)</a:t>
+            </a:r>
+          </a:p>
+          <a:p>
+            <a:r>
+              <a:rPr lang="en-US" dirty="0">
+                <a:latin typeface="Consolas" panose="020B0609020204030204" pitchFamily="49" charset="0"/>
+              </a:rPr>
+              <a:t>    return sqrt((x1 – x2)^2 + (y1 – y2)^2)</a:t>
+            </a:r>
+          </a:p>
+          <a:p>
+            <a:r>
+              <a:rPr lang="en-US" dirty="0">
+                <a:latin typeface="Consolas" panose="020B0609020204030204" pitchFamily="49" charset="0"/>
+              </a:rPr>
+              <a:t>end</a:t>
+            </a:r>
+          </a:p>
+        </p:txBody>
+      </p:sp>
+      <p:sp>
+        <p:nvSpPr>
+          <p:cNvPr id="5" name="TextBox 4">
+            <a:extLst>
+              <a:ext uri="{FF2B5EF4-FFF2-40B4-BE49-F238E27FC236}">
+                <a16:creationId xmlns:a16="http://schemas.microsoft.com/office/drawing/2014/main" id="{93AE319E-8773-4104-A9B1-174D925CB64C}"/>
+              </a:ext>
+            </a:extLst>
+          </p:cNvPr>
+          <p:cNvSpPr txBox="1"/>
+          <p:nvPr/>
+        </p:nvSpPr>
+        <p:spPr>
+          <a:xfrm>
+            <a:off x="1458089" y="4296930"/>
+            <a:ext cx="7825953" cy="1477328"/>
+          </a:xfrm>
+          <a:prstGeom prst="rect">
+            <a:avLst/>
+          </a:prstGeom>
+          <a:solidFill>
+            <a:schemeClr val="bg1">
+              <a:lumMod val="85000"/>
+            </a:schemeClr>
+          </a:solidFill>
+        </p:spPr>
+        <p:txBody>
+          <a:bodyPr wrap="square" rtlCol="0">
+            <a:spAutoFit/>
+          </a:bodyPr>
+          <a:lstStyle/>
+          <a:p>
+            <a:r>
+              <a:rPr lang="en-US" dirty="0">
+                <a:latin typeface="Consolas" panose="020B0609020204030204" pitchFamily="49" charset="0"/>
+              </a:rPr>
+              <a:t>function distance(p1::Abstract3DPoint, p2::Abstract3DPoint)</a:t>
+            </a:r>
+          </a:p>
+          <a:p>
+            <a:r>
+              <a:rPr lang="en-US" dirty="0">
+                <a:latin typeface="Consolas" panose="020B0609020204030204" pitchFamily="49" charset="0"/>
+              </a:rPr>
+              <a:t>    x1 = </a:t>
+            </a:r>
+            <a:r>
+              <a:rPr lang="en-US" dirty="0" err="1">
+                <a:latin typeface="Consolas" panose="020B0609020204030204" pitchFamily="49" charset="0"/>
+              </a:rPr>
+              <a:t>get_x</a:t>
+            </a:r>
+            <a:r>
+              <a:rPr lang="en-US" dirty="0">
+                <a:latin typeface="Consolas" panose="020B0609020204030204" pitchFamily="49" charset="0"/>
+              </a:rPr>
+              <a:t>(p1); y1 = </a:t>
+            </a:r>
+            <a:r>
+              <a:rPr lang="en-US" dirty="0" err="1">
+                <a:latin typeface="Consolas" panose="020B0609020204030204" pitchFamily="49" charset="0"/>
+              </a:rPr>
+              <a:t>get_y</a:t>
+            </a:r>
+            <a:r>
+              <a:rPr lang="en-US" dirty="0">
+                <a:latin typeface="Consolas" panose="020B0609020204030204" pitchFamily="49" charset="0"/>
+              </a:rPr>
+              <a:t>(p1); z1 = </a:t>
+            </a:r>
+            <a:r>
+              <a:rPr lang="en-US" dirty="0" err="1">
+                <a:latin typeface="Consolas" panose="020B0609020204030204" pitchFamily="49" charset="0"/>
+              </a:rPr>
+              <a:t>get_z</a:t>
+            </a:r>
+            <a:r>
+              <a:rPr lang="en-US" dirty="0">
+                <a:latin typeface="Consolas" panose="020B0609020204030204" pitchFamily="49" charset="0"/>
+              </a:rPr>
+              <a:t>(p1)</a:t>
+            </a:r>
+          </a:p>
+          <a:p>
+            <a:r>
+              <a:rPr lang="en-US" dirty="0">
+                <a:latin typeface="Consolas" panose="020B0609020204030204" pitchFamily="49" charset="0"/>
+              </a:rPr>
+              <a:t>    x2 = </a:t>
+            </a:r>
+            <a:r>
+              <a:rPr lang="en-US" dirty="0" err="1">
+                <a:latin typeface="Consolas" panose="020B0609020204030204" pitchFamily="49" charset="0"/>
+              </a:rPr>
+              <a:t>get_x</a:t>
+            </a:r>
+            <a:r>
+              <a:rPr lang="en-US" dirty="0">
+                <a:latin typeface="Consolas" panose="020B0609020204030204" pitchFamily="49" charset="0"/>
+              </a:rPr>
+              <a:t>(p2); y2 = </a:t>
+            </a:r>
+            <a:r>
+              <a:rPr lang="en-US" dirty="0" err="1">
+                <a:latin typeface="Consolas" panose="020B0609020204030204" pitchFamily="49" charset="0"/>
+              </a:rPr>
+              <a:t>get_y</a:t>
+            </a:r>
+            <a:r>
+              <a:rPr lang="en-US" dirty="0">
+                <a:latin typeface="Consolas" panose="020B0609020204030204" pitchFamily="49" charset="0"/>
+              </a:rPr>
+              <a:t>(p2); z2 = </a:t>
+            </a:r>
+            <a:r>
+              <a:rPr lang="en-US" dirty="0" err="1">
+                <a:latin typeface="Consolas" panose="020B0609020204030204" pitchFamily="49" charset="0"/>
+              </a:rPr>
+              <a:t>get_z</a:t>
+            </a:r>
+            <a:r>
+              <a:rPr lang="en-US" dirty="0">
+                <a:latin typeface="Consolas" panose="020B0609020204030204" pitchFamily="49" charset="0"/>
+              </a:rPr>
+              <a:t>(p2)</a:t>
+            </a:r>
+          </a:p>
+          <a:p>
+            <a:r>
+              <a:rPr lang="en-US" dirty="0">
+                <a:latin typeface="Consolas" panose="020B0609020204030204" pitchFamily="49" charset="0"/>
+              </a:rPr>
+              <a:t>    return sqrt((x1 – x2)^2 + (y1 – y2)^2 + (z1 – z2)^2)</a:t>
+            </a:r>
+          </a:p>
+          <a:p>
+            <a:r>
+              <a:rPr lang="en-US" dirty="0">
+                <a:latin typeface="Consolas" panose="020B0609020204030204" pitchFamily="49" charset="0"/>
+              </a:rPr>
+              <a:t>end</a:t>
+            </a:r>
+          </a:p>
+        </p:txBody>
+      </p:sp>
+      <p:sp>
+        <p:nvSpPr>
+          <p:cNvPr id="6" name="Slide Number Placeholder 5">
+            <a:extLst>
+              <a:ext uri="{FF2B5EF4-FFF2-40B4-BE49-F238E27FC236}">
+                <a16:creationId xmlns:a16="http://schemas.microsoft.com/office/drawing/2014/main" id="{75798C7A-5D56-4878-AEE3-0A2DA14F1DCD}"/>
+              </a:ext>
+            </a:extLst>
+          </p:cNvPr>
+          <p:cNvSpPr>
+            <a:spLocks noGrp="1"/>
+          </p:cNvSpPr>
+          <p:nvPr>
+            <p:ph type="sldNum" sz="quarter" idx="12"/>
+          </p:nvPr>
+        </p:nvSpPr>
+        <p:spPr/>
+        <p:txBody>
+          <a:bodyPr/>
+          <a:lstStyle/>
+          <a:p>
+            <a:fld id="{78F7A1EC-23D1-431D-8C93-9C4ED5D4A04D}" type="slidenum">
+              <a:rPr lang="en-US" smtClean="0"/>
+              <a:t>14</a:t>
+            </a:fld>
+            <a:endParaRPr lang="en-US"/>
+          </a:p>
+        </p:txBody>
+      </p:sp>
+    </p:spTree>
+    <p:extLst>
+      <p:ext uri="{BB962C8B-B14F-4D97-AF65-F5344CB8AC3E}">
+        <p14:creationId xmlns:p14="http://schemas.microsoft.com/office/powerpoint/2010/main" val="4220669020"/>
+      </p:ext>
+    </p:extLst>
+  </p:cSld>
+  <p:clrMapOvr>
+    <a:masterClrMapping/>
+  </p:clrMapOvr>
+</p:sld>
+</file>
+
+<file path=ppt/slides/slide15.xml><?xml version="1.0" encoding="utf-8"?>
+<p:sld xmlns:a="http://schemas.openxmlformats.org/drawingml/2006/main" xmlns:r="http://schemas.openxmlformats.org/officeDocument/2006/relationships" xmlns:p="http://schemas.openxmlformats.org/presentationml/2006/main">
+  <p:cSld>
+    <p:spTree>
+      <p:nvGrpSpPr>
+        <p:cNvPr id="1" name=""/>
+        <p:cNvGrpSpPr/>
+        <p:nvPr/>
+      </p:nvGrpSpPr>
+      <p:grpSpPr>
+        <a:xfrm>
+          <a:off x="0" y="0"/>
+          <a:ext cx="0" cy="0"/>
+          <a:chOff x="0" y="0"/>
+          <a:chExt cx="0" cy="0"/>
+        </a:xfrm>
+      </p:grpSpPr>
+      <p:sp>
+        <p:nvSpPr>
+          <p:cNvPr id="2" name="Title 1">
+            <a:extLst>
+              <a:ext uri="{FF2B5EF4-FFF2-40B4-BE49-F238E27FC236}">
+                <a16:creationId xmlns:a16="http://schemas.microsoft.com/office/drawing/2014/main" id="{E7A16532-2CE8-4AD7-B819-2EC8F46C855E}"/>
+              </a:ext>
+            </a:extLst>
+          </p:cNvPr>
+          <p:cNvSpPr>
+            <a:spLocks noGrp="1"/>
+          </p:cNvSpPr>
+          <p:nvPr>
+            <p:ph type="title"/>
+          </p:nvPr>
+        </p:nvSpPr>
+        <p:spPr/>
+        <p:txBody>
+          <a:bodyPr/>
+          <a:lstStyle/>
+          <a:p>
+            <a:r>
+              <a:rPr lang="en-US" dirty="0"/>
+              <a:t>Traits</a:t>
+            </a:r>
+          </a:p>
+        </p:txBody>
+      </p:sp>
+      <p:sp>
+        <p:nvSpPr>
+          <p:cNvPr id="3" name="Content Placeholder 2">
+            <a:extLst>
+              <a:ext uri="{FF2B5EF4-FFF2-40B4-BE49-F238E27FC236}">
+                <a16:creationId xmlns:a16="http://schemas.microsoft.com/office/drawing/2014/main" id="{D40867FD-9A37-4959-B309-8B83344CD1BB}"/>
+              </a:ext>
+            </a:extLst>
+          </p:cNvPr>
+          <p:cNvSpPr>
+            <a:spLocks noGrp="1"/>
+          </p:cNvSpPr>
+          <p:nvPr>
+            <p:ph idx="1"/>
+          </p:nvPr>
+        </p:nvSpPr>
+        <p:spPr/>
+        <p:txBody>
+          <a:bodyPr/>
+          <a:lstStyle/>
+          <a:p>
+            <a:r>
+              <a:rPr lang="en-US" dirty="0"/>
+              <a:t>Traits are "properties" of types, e.g., color</a:t>
+            </a:r>
+          </a:p>
+          <a:p>
+            <a:endParaRPr lang="en-US" dirty="0"/>
+          </a:p>
+          <a:p>
+            <a:endParaRPr lang="en-US" dirty="0"/>
+          </a:p>
+          <a:p>
+            <a:r>
+              <a:rPr lang="en-US" dirty="0"/>
+              <a:t>Default behavior: types are </a:t>
+            </a:r>
+            <a:r>
+              <a:rPr lang="en-US" i="1" dirty="0"/>
+              <a:t>not</a:t>
+            </a:r>
+            <a:r>
+              <a:rPr lang="en-US" dirty="0"/>
+              <a:t> colored</a:t>
+            </a:r>
+          </a:p>
+          <a:p>
+            <a:endParaRPr lang="en-US" dirty="0"/>
+          </a:p>
+          <a:p>
+            <a:r>
+              <a:rPr lang="en-US" dirty="0"/>
+              <a:t>Action on trait</a:t>
+            </a:r>
+          </a:p>
+        </p:txBody>
+      </p:sp>
+      <p:sp>
+        <p:nvSpPr>
+          <p:cNvPr id="4" name="TextBox 3">
+            <a:extLst>
+              <a:ext uri="{FF2B5EF4-FFF2-40B4-BE49-F238E27FC236}">
+                <a16:creationId xmlns:a16="http://schemas.microsoft.com/office/drawing/2014/main" id="{A6638AD6-5743-4A9B-9763-3C80358644C9}"/>
+              </a:ext>
+            </a:extLst>
+          </p:cNvPr>
+          <p:cNvSpPr txBox="1"/>
+          <p:nvPr/>
+        </p:nvSpPr>
+        <p:spPr>
+          <a:xfrm>
+            <a:off x="1458090" y="2288311"/>
+            <a:ext cx="5198083" cy="923330"/>
+          </a:xfrm>
+          <a:prstGeom prst="rect">
+            <a:avLst/>
+          </a:prstGeom>
+          <a:solidFill>
+            <a:schemeClr val="bg1">
+              <a:lumMod val="85000"/>
+            </a:schemeClr>
+          </a:solidFill>
+        </p:spPr>
+        <p:txBody>
+          <a:bodyPr wrap="square" rtlCol="0">
+            <a:spAutoFit/>
+          </a:bodyPr>
+          <a:lstStyle/>
+          <a:p>
+            <a:r>
+              <a:rPr lang="en-US" dirty="0">
+                <a:latin typeface="Consolas" panose="020B0609020204030204" pitchFamily="49" charset="0"/>
+              </a:rPr>
+              <a:t>abstract type </a:t>
+            </a:r>
+            <a:r>
+              <a:rPr lang="en-US" dirty="0" err="1">
+                <a:latin typeface="Consolas" panose="020B0609020204030204" pitchFamily="49" charset="0"/>
+              </a:rPr>
+              <a:t>ColoredStyle</a:t>
+            </a:r>
+            <a:r>
+              <a:rPr lang="en-US" dirty="0">
+                <a:latin typeface="Consolas" panose="020B0609020204030204" pitchFamily="49" charset="0"/>
+              </a:rPr>
+              <a:t> end</a:t>
+            </a:r>
+          </a:p>
+          <a:p>
+            <a:r>
+              <a:rPr lang="en-US" dirty="0">
+                <a:latin typeface="Consolas" panose="020B0609020204030204" pitchFamily="49" charset="0"/>
+              </a:rPr>
+              <a:t>struct </a:t>
+            </a:r>
+            <a:r>
+              <a:rPr lang="en-US" dirty="0" err="1">
+                <a:latin typeface="Consolas" panose="020B0609020204030204" pitchFamily="49" charset="0"/>
+              </a:rPr>
+              <a:t>IsColored</a:t>
+            </a:r>
+            <a:r>
+              <a:rPr lang="en-US" dirty="0">
+                <a:latin typeface="Consolas" panose="020B0609020204030204" pitchFamily="49" charset="0"/>
+              </a:rPr>
+              <a:t> &lt;: </a:t>
+            </a:r>
+            <a:r>
+              <a:rPr lang="en-US" dirty="0" err="1">
+                <a:latin typeface="Consolas" panose="020B0609020204030204" pitchFamily="49" charset="0"/>
+              </a:rPr>
+              <a:t>ColoredStyle</a:t>
+            </a:r>
+            <a:r>
+              <a:rPr lang="en-US" dirty="0">
+                <a:latin typeface="Consolas" panose="020B0609020204030204" pitchFamily="49" charset="0"/>
+              </a:rPr>
+              <a:t> end</a:t>
+            </a:r>
+          </a:p>
+          <a:p>
+            <a:r>
+              <a:rPr lang="en-US" dirty="0">
+                <a:latin typeface="Consolas" panose="020B0609020204030204" pitchFamily="49" charset="0"/>
+              </a:rPr>
+              <a:t>struct </a:t>
+            </a:r>
+            <a:r>
+              <a:rPr lang="en-US" dirty="0" err="1">
+                <a:latin typeface="Consolas" panose="020B0609020204030204" pitchFamily="49" charset="0"/>
+              </a:rPr>
+              <a:t>IsNotColored</a:t>
+            </a:r>
+            <a:r>
+              <a:rPr lang="en-US" dirty="0">
+                <a:latin typeface="Consolas" panose="020B0609020204030204" pitchFamily="49" charset="0"/>
+              </a:rPr>
+              <a:t> &lt;: </a:t>
+            </a:r>
+            <a:r>
+              <a:rPr lang="en-US" dirty="0" err="1">
+                <a:latin typeface="Consolas" panose="020B0609020204030204" pitchFamily="49" charset="0"/>
+              </a:rPr>
+              <a:t>ColoredStyle</a:t>
+            </a:r>
+            <a:r>
+              <a:rPr lang="en-US" dirty="0">
+                <a:latin typeface="Consolas" panose="020B0609020204030204" pitchFamily="49" charset="0"/>
+              </a:rPr>
+              <a:t> end</a:t>
+            </a:r>
+          </a:p>
+        </p:txBody>
+      </p:sp>
+      <p:sp>
+        <p:nvSpPr>
+          <p:cNvPr id="5" name="TextBox 4">
+            <a:extLst>
+              <a:ext uri="{FF2B5EF4-FFF2-40B4-BE49-F238E27FC236}">
+                <a16:creationId xmlns:a16="http://schemas.microsoft.com/office/drawing/2014/main" id="{D357F073-E5DA-4DA5-9658-8CC43161CD54}"/>
+              </a:ext>
+            </a:extLst>
+          </p:cNvPr>
+          <p:cNvSpPr txBox="1"/>
+          <p:nvPr/>
+        </p:nvSpPr>
+        <p:spPr>
+          <a:xfrm>
+            <a:off x="1458090" y="3849384"/>
+            <a:ext cx="5198084" cy="369332"/>
+          </a:xfrm>
+          <a:prstGeom prst="rect">
+            <a:avLst/>
+          </a:prstGeom>
+          <a:solidFill>
+            <a:schemeClr val="bg1">
+              <a:lumMod val="85000"/>
+            </a:schemeClr>
+          </a:solidFill>
+        </p:spPr>
+        <p:txBody>
+          <a:bodyPr wrap="square" rtlCol="0">
+            <a:spAutoFit/>
+          </a:bodyPr>
+          <a:lstStyle/>
+          <a:p>
+            <a:r>
+              <a:rPr lang="en-US" dirty="0" err="1">
+                <a:latin typeface="Consolas" panose="020B0609020204030204" pitchFamily="49" charset="0"/>
+              </a:rPr>
+              <a:t>ColoredStyle</a:t>
+            </a:r>
+            <a:r>
+              <a:rPr lang="en-US" dirty="0">
+                <a:latin typeface="Consolas" panose="020B0609020204030204" pitchFamily="49" charset="0"/>
+              </a:rPr>
+              <a:t>(::Type) = </a:t>
+            </a:r>
+            <a:r>
+              <a:rPr lang="en-US" dirty="0" err="1">
+                <a:latin typeface="Consolas" panose="020B0609020204030204" pitchFamily="49" charset="0"/>
+              </a:rPr>
+              <a:t>IsNotColored</a:t>
+            </a:r>
+            <a:r>
+              <a:rPr lang="en-US" dirty="0">
+                <a:latin typeface="Consolas" panose="020B0609020204030204" pitchFamily="49" charset="0"/>
+              </a:rPr>
+              <a:t>()</a:t>
+            </a:r>
+          </a:p>
+        </p:txBody>
+      </p:sp>
+      <p:sp>
+        <p:nvSpPr>
+          <p:cNvPr id="7" name="Slide Number Placeholder 6">
+            <a:extLst>
+              <a:ext uri="{FF2B5EF4-FFF2-40B4-BE49-F238E27FC236}">
+                <a16:creationId xmlns:a16="http://schemas.microsoft.com/office/drawing/2014/main" id="{F7BC28D9-A7C5-4E74-A9C2-B18D3D31E6FC}"/>
+              </a:ext>
+            </a:extLst>
+          </p:cNvPr>
+          <p:cNvSpPr>
+            <a:spLocks noGrp="1"/>
+          </p:cNvSpPr>
+          <p:nvPr>
+            <p:ph type="sldNum" sz="quarter" idx="12"/>
+          </p:nvPr>
+        </p:nvSpPr>
+        <p:spPr/>
+        <p:txBody>
+          <a:bodyPr/>
+          <a:lstStyle/>
+          <a:p>
+            <a:fld id="{78F7A1EC-23D1-431D-8C93-9C4ED5D4A04D}" type="slidenum">
+              <a:rPr lang="en-US" smtClean="0"/>
+              <a:t>15</a:t>
+            </a:fld>
+            <a:endParaRPr lang="en-US"/>
+          </a:p>
+        </p:txBody>
+      </p:sp>
+      <p:sp>
+        <p:nvSpPr>
+          <p:cNvPr id="8" name="TextBox 7">
+            <a:extLst>
+              <a:ext uri="{FF2B5EF4-FFF2-40B4-BE49-F238E27FC236}">
+                <a16:creationId xmlns:a16="http://schemas.microsoft.com/office/drawing/2014/main" id="{D2C46F96-6473-4C64-9024-4CE33AF0988A}"/>
+              </a:ext>
+            </a:extLst>
+          </p:cNvPr>
+          <p:cNvSpPr txBox="1"/>
+          <p:nvPr/>
+        </p:nvSpPr>
+        <p:spPr>
+          <a:xfrm>
+            <a:off x="1458089" y="4881662"/>
+            <a:ext cx="9432333" cy="923330"/>
+          </a:xfrm>
+          <a:prstGeom prst="rect">
+            <a:avLst/>
+          </a:prstGeom>
+          <a:solidFill>
+            <a:schemeClr val="bg1">
+              <a:lumMod val="85000"/>
+            </a:schemeClr>
+          </a:solidFill>
+        </p:spPr>
+        <p:txBody>
+          <a:bodyPr wrap="square" rtlCol="0">
+            <a:spAutoFit/>
+          </a:bodyPr>
+          <a:lstStyle/>
+          <a:p>
+            <a:r>
+              <a:rPr lang="en-US" dirty="0" err="1">
+                <a:latin typeface="Consolas" panose="020B0609020204030204" pitchFamily="49" charset="0"/>
+              </a:rPr>
+              <a:t>get_color</a:t>
+            </a:r>
+            <a:r>
+              <a:rPr lang="en-US" dirty="0">
+                <a:latin typeface="Consolas" panose="020B0609020204030204" pitchFamily="49" charset="0"/>
+              </a:rPr>
+              <a:t>(obj::T) where {T} = </a:t>
+            </a:r>
+            <a:r>
+              <a:rPr lang="en-US" dirty="0" err="1">
+                <a:latin typeface="Consolas" panose="020B0609020204030204" pitchFamily="49" charset="0"/>
+              </a:rPr>
+              <a:t>get_color</a:t>
+            </a:r>
+            <a:r>
+              <a:rPr lang="en-US" dirty="0">
+                <a:latin typeface="Consolas" panose="020B0609020204030204" pitchFamily="49" charset="0"/>
+              </a:rPr>
+              <a:t>(</a:t>
+            </a:r>
+            <a:r>
+              <a:rPr lang="en-US" dirty="0" err="1">
+                <a:latin typeface="Consolas" panose="020B0609020204030204" pitchFamily="49" charset="0"/>
+              </a:rPr>
+              <a:t>ColoredStyle</a:t>
+            </a:r>
+            <a:r>
+              <a:rPr lang="en-US" dirty="0">
+                <a:latin typeface="Consolas" panose="020B0609020204030204" pitchFamily="49" charset="0"/>
+              </a:rPr>
+              <a:t>(T), obj)</a:t>
+            </a:r>
+          </a:p>
+          <a:p>
+            <a:r>
+              <a:rPr lang="en-US" dirty="0" err="1">
+                <a:latin typeface="Consolas" panose="020B0609020204030204" pitchFamily="49" charset="0"/>
+              </a:rPr>
+              <a:t>get_color</a:t>
+            </a:r>
+            <a:r>
+              <a:rPr lang="en-US" dirty="0">
+                <a:latin typeface="Consolas" panose="020B0609020204030204" pitchFamily="49" charset="0"/>
+              </a:rPr>
+              <a:t>(::</a:t>
+            </a:r>
+            <a:r>
+              <a:rPr lang="en-US" dirty="0" err="1">
+                <a:latin typeface="Consolas" panose="020B0609020204030204" pitchFamily="49" charset="0"/>
+              </a:rPr>
+              <a:t>IsNotColored</a:t>
+            </a:r>
+            <a:r>
+              <a:rPr lang="en-US" dirty="0">
+                <a:latin typeface="Consolas" panose="020B0609020204030204" pitchFamily="49" charset="0"/>
+              </a:rPr>
+              <a:t>, obj) = error("$(</a:t>
+            </a:r>
+            <a:r>
+              <a:rPr lang="en-US" dirty="0" err="1">
+                <a:latin typeface="Consolas" panose="020B0609020204030204" pitchFamily="49" charset="0"/>
+              </a:rPr>
+              <a:t>typeof</a:t>
+            </a:r>
+            <a:r>
+              <a:rPr lang="en-US" dirty="0">
+                <a:latin typeface="Consolas" panose="020B0609020204030204" pitchFamily="49" charset="0"/>
+              </a:rPr>
+              <a:t>(obj)) is not colored")</a:t>
+            </a:r>
+          </a:p>
+          <a:p>
+            <a:r>
+              <a:rPr lang="en-US" dirty="0" err="1">
+                <a:latin typeface="Consolas" panose="020B0609020204030204" pitchFamily="49" charset="0"/>
+              </a:rPr>
+              <a:t>get_color</a:t>
+            </a:r>
+            <a:r>
+              <a:rPr lang="en-US" dirty="0">
+                <a:latin typeface="Consolas" panose="020B0609020204030204" pitchFamily="49" charset="0"/>
+              </a:rPr>
+              <a:t>(::</a:t>
+            </a:r>
+            <a:r>
+              <a:rPr lang="en-US" dirty="0" err="1">
+                <a:latin typeface="Consolas" panose="020B0609020204030204" pitchFamily="49" charset="0"/>
+              </a:rPr>
+              <a:t>IsColored</a:t>
+            </a:r>
+            <a:r>
+              <a:rPr lang="en-US" dirty="0">
+                <a:latin typeface="Consolas" panose="020B0609020204030204" pitchFamily="49" charset="0"/>
+              </a:rPr>
+              <a:t>, obj) = </a:t>
+            </a:r>
+            <a:r>
+              <a:rPr lang="en-US" dirty="0" err="1">
+                <a:latin typeface="Consolas" panose="020B0609020204030204" pitchFamily="49" charset="0"/>
+              </a:rPr>
+              <a:t>obj.color</a:t>
+            </a:r>
+            <a:endParaRPr lang="en-US" dirty="0">
+              <a:latin typeface="Consolas" panose="020B0609020204030204" pitchFamily="49" charset="0"/>
+            </a:endParaRPr>
+          </a:p>
+        </p:txBody>
+      </p:sp>
+    </p:spTree>
+    <p:extLst>
+      <p:ext uri="{BB962C8B-B14F-4D97-AF65-F5344CB8AC3E}">
+        <p14:creationId xmlns:p14="http://schemas.microsoft.com/office/powerpoint/2010/main" val="1298737522"/>
+      </p:ext>
+    </p:extLst>
+  </p:cSld>
+  <p:clrMapOvr>
+    <a:masterClrMapping/>
+  </p:clrMapOvr>
+</p:sld>
+</file>
+
+<file path=ppt/slides/slide16.xml><?xml version="1.0" encoding="utf-8"?>
+<p:sld xmlns:a="http://schemas.openxmlformats.org/drawingml/2006/main" xmlns:r="http://schemas.openxmlformats.org/officeDocument/2006/relationships" xmlns:p="http://schemas.openxmlformats.org/presentationml/2006/main">
+  <p:cSld>
+    <p:spTree>
+      <p:nvGrpSpPr>
+        <p:cNvPr id="1" name=""/>
+        <p:cNvGrpSpPr/>
+        <p:nvPr/>
+      </p:nvGrpSpPr>
+      <p:grpSpPr>
+        <a:xfrm>
+          <a:off x="0" y="0"/>
+          <a:ext cx="0" cy="0"/>
+          <a:chOff x="0" y="0"/>
+          <a:chExt cx="0" cy="0"/>
+        </a:xfrm>
+      </p:grpSpPr>
+      <p:sp>
+        <p:nvSpPr>
+          <p:cNvPr id="2" name="Title 1">
+            <a:extLst>
+              <a:ext uri="{FF2B5EF4-FFF2-40B4-BE49-F238E27FC236}">
+                <a16:creationId xmlns:a16="http://schemas.microsoft.com/office/drawing/2014/main" id="{C24B8F5C-1F74-45D8-AD90-2A6B9A5C60A9}"/>
+              </a:ext>
+            </a:extLst>
+          </p:cNvPr>
+          <p:cNvSpPr>
+            <a:spLocks noGrp="1"/>
+          </p:cNvSpPr>
+          <p:nvPr>
+            <p:ph type="title"/>
+          </p:nvPr>
+        </p:nvSpPr>
+        <p:spPr/>
+        <p:txBody>
+          <a:bodyPr/>
+          <a:lstStyle/>
+          <a:p>
+            <a:r>
+              <a:rPr lang="en-US" dirty="0"/>
+              <a:t>Applying traits</a:t>
+            </a:r>
+          </a:p>
+        </p:txBody>
+      </p:sp>
+      <p:sp>
+        <p:nvSpPr>
+          <p:cNvPr id="3" name="Content Placeholder 2">
+            <a:extLst>
+              <a:ext uri="{FF2B5EF4-FFF2-40B4-BE49-F238E27FC236}">
+                <a16:creationId xmlns:a16="http://schemas.microsoft.com/office/drawing/2014/main" id="{9CD54D94-4EC8-46DE-8932-F1182147976C}"/>
+              </a:ext>
+            </a:extLst>
+          </p:cNvPr>
+          <p:cNvSpPr>
+            <a:spLocks noGrp="1"/>
+          </p:cNvSpPr>
+          <p:nvPr>
+            <p:ph idx="1"/>
+          </p:nvPr>
+        </p:nvSpPr>
+        <p:spPr/>
+        <p:txBody>
+          <a:bodyPr/>
+          <a:lstStyle/>
+          <a:p>
+            <a:r>
+              <a:rPr lang="en-US" dirty="0"/>
+              <a:t>Pixel again</a:t>
+            </a:r>
+          </a:p>
+          <a:p>
+            <a:endParaRPr lang="en-US" dirty="0"/>
+          </a:p>
+          <a:p>
+            <a:endParaRPr lang="en-US" dirty="0"/>
+          </a:p>
+          <a:p>
+            <a:endParaRPr lang="en-US" dirty="0"/>
+          </a:p>
+          <a:p>
+            <a:endParaRPr lang="en-US" dirty="0"/>
+          </a:p>
+          <a:p>
+            <a:r>
+              <a:rPr lang="en-US" dirty="0"/>
+              <a:t>Paint</a:t>
+            </a:r>
+          </a:p>
+        </p:txBody>
+      </p:sp>
+      <p:sp>
+        <p:nvSpPr>
+          <p:cNvPr id="4" name="Slide Number Placeholder 3">
+            <a:extLst>
+              <a:ext uri="{FF2B5EF4-FFF2-40B4-BE49-F238E27FC236}">
+                <a16:creationId xmlns:a16="http://schemas.microsoft.com/office/drawing/2014/main" id="{6A106F6D-7720-4566-8BBD-70C54F3ED003}"/>
+              </a:ext>
+            </a:extLst>
+          </p:cNvPr>
+          <p:cNvSpPr>
+            <a:spLocks noGrp="1"/>
+          </p:cNvSpPr>
+          <p:nvPr>
+            <p:ph type="sldNum" sz="quarter" idx="12"/>
+          </p:nvPr>
+        </p:nvSpPr>
+        <p:spPr/>
+        <p:txBody>
+          <a:bodyPr/>
+          <a:lstStyle/>
+          <a:p>
+            <a:fld id="{78F7A1EC-23D1-431D-8C93-9C4ED5D4A04D}" type="slidenum">
+              <a:rPr lang="en-US" smtClean="0"/>
+              <a:t>16</a:t>
+            </a:fld>
+            <a:endParaRPr lang="en-US"/>
+          </a:p>
+        </p:txBody>
+      </p:sp>
+      <p:sp>
+        <p:nvSpPr>
+          <p:cNvPr id="5" name="TextBox 4">
+            <a:extLst>
+              <a:ext uri="{FF2B5EF4-FFF2-40B4-BE49-F238E27FC236}">
+                <a16:creationId xmlns:a16="http://schemas.microsoft.com/office/drawing/2014/main" id="{3E08293A-6964-47D3-A2D0-2A9DD53D5B9D}"/>
+              </a:ext>
+            </a:extLst>
+          </p:cNvPr>
+          <p:cNvSpPr txBox="1"/>
+          <p:nvPr/>
+        </p:nvSpPr>
+        <p:spPr>
+          <a:xfrm>
+            <a:off x="1154519" y="2321771"/>
+            <a:ext cx="5198085" cy="1200329"/>
+          </a:xfrm>
+          <a:prstGeom prst="rect">
+            <a:avLst/>
+          </a:prstGeom>
+          <a:solidFill>
+            <a:schemeClr val="bg1">
+              <a:lumMod val="85000"/>
+            </a:schemeClr>
+          </a:solidFill>
+        </p:spPr>
+        <p:txBody>
+          <a:bodyPr wrap="square" rtlCol="0">
+            <a:spAutoFit/>
+          </a:bodyPr>
+          <a:lstStyle/>
+          <a:p>
+            <a:r>
+              <a:rPr lang="en-US" dirty="0">
+                <a:latin typeface="Consolas" panose="020B0609020204030204" pitchFamily="49" charset="0"/>
+              </a:rPr>
+              <a:t>mutable struct Pixel</a:t>
+            </a:r>
+          </a:p>
+          <a:p>
+            <a:r>
+              <a:rPr lang="en-US" dirty="0">
+                <a:latin typeface="Consolas" panose="020B0609020204030204" pitchFamily="49" charset="0"/>
+              </a:rPr>
+              <a:t>    …</a:t>
+            </a:r>
+          </a:p>
+          <a:p>
+            <a:r>
+              <a:rPr lang="en-US" dirty="0">
+                <a:latin typeface="Consolas" panose="020B0609020204030204" pitchFamily="49" charset="0"/>
+              </a:rPr>
+              <a:t>    color::String</a:t>
+            </a:r>
+          </a:p>
+          <a:p>
+            <a:r>
+              <a:rPr lang="en-US" dirty="0">
+                <a:latin typeface="Consolas" panose="020B0609020204030204" pitchFamily="49" charset="0"/>
+              </a:rPr>
+              <a:t>end</a:t>
+            </a:r>
+          </a:p>
+        </p:txBody>
+      </p:sp>
+      <p:sp>
+        <p:nvSpPr>
+          <p:cNvPr id="6" name="TextBox 5">
+            <a:extLst>
+              <a:ext uri="{FF2B5EF4-FFF2-40B4-BE49-F238E27FC236}">
+                <a16:creationId xmlns:a16="http://schemas.microsoft.com/office/drawing/2014/main" id="{A0B55A68-5AC1-4ABE-96D1-E980EA702462}"/>
+              </a:ext>
+            </a:extLst>
+          </p:cNvPr>
+          <p:cNvSpPr txBox="1"/>
+          <p:nvPr/>
+        </p:nvSpPr>
+        <p:spPr>
+          <a:xfrm>
+            <a:off x="1154518" y="3769276"/>
+            <a:ext cx="5198085" cy="369332"/>
+          </a:xfrm>
+          <a:prstGeom prst="rect">
+            <a:avLst/>
+          </a:prstGeom>
+          <a:solidFill>
+            <a:schemeClr val="bg1">
+              <a:lumMod val="85000"/>
+            </a:schemeClr>
+          </a:solidFill>
+        </p:spPr>
+        <p:txBody>
+          <a:bodyPr wrap="square" rtlCol="0">
+            <a:spAutoFit/>
+          </a:bodyPr>
+          <a:lstStyle/>
+          <a:p>
+            <a:r>
+              <a:rPr lang="en-US" dirty="0" err="1">
+                <a:latin typeface="Consolas" panose="020B0609020204030204" pitchFamily="49" charset="0"/>
+              </a:rPr>
+              <a:t>ColoredStyle</a:t>
+            </a:r>
+            <a:r>
+              <a:rPr lang="en-US" dirty="0">
+                <a:latin typeface="Consolas" panose="020B0609020204030204" pitchFamily="49" charset="0"/>
+              </a:rPr>
+              <a:t>(::{&lt;:Pixel}) = </a:t>
+            </a:r>
+            <a:r>
+              <a:rPr lang="en-US" dirty="0" err="1">
+                <a:latin typeface="Consolas" panose="020B0609020204030204" pitchFamily="49" charset="0"/>
+              </a:rPr>
+              <a:t>IsColored</a:t>
+            </a:r>
+            <a:r>
+              <a:rPr lang="en-US" dirty="0">
+                <a:latin typeface="Consolas" panose="020B0609020204030204" pitchFamily="49" charset="0"/>
+              </a:rPr>
+              <a:t>()</a:t>
+            </a:r>
+          </a:p>
+        </p:txBody>
+      </p:sp>
+      <p:sp>
+        <p:nvSpPr>
+          <p:cNvPr id="7" name="TextBox 6">
+            <a:extLst>
+              <a:ext uri="{FF2B5EF4-FFF2-40B4-BE49-F238E27FC236}">
+                <a16:creationId xmlns:a16="http://schemas.microsoft.com/office/drawing/2014/main" id="{28C5593F-2355-43FB-BC93-812DA3422F28}"/>
+              </a:ext>
+            </a:extLst>
+          </p:cNvPr>
+          <p:cNvSpPr txBox="1"/>
+          <p:nvPr/>
+        </p:nvSpPr>
+        <p:spPr>
+          <a:xfrm>
+            <a:off x="1154519" y="4864395"/>
+            <a:ext cx="5198085" cy="923330"/>
+          </a:xfrm>
+          <a:prstGeom prst="rect">
+            <a:avLst/>
+          </a:prstGeom>
+          <a:solidFill>
+            <a:schemeClr val="bg1">
+              <a:lumMod val="85000"/>
+            </a:schemeClr>
+          </a:solidFill>
+        </p:spPr>
+        <p:txBody>
+          <a:bodyPr wrap="square" rtlCol="0">
+            <a:spAutoFit/>
+          </a:bodyPr>
+          <a:lstStyle/>
+          <a:p>
+            <a:r>
+              <a:rPr lang="en-US" dirty="0">
+                <a:latin typeface="Consolas" panose="020B0609020204030204" pitchFamily="49" charset="0"/>
+              </a:rPr>
+              <a:t>struct Paint</a:t>
+            </a:r>
+          </a:p>
+          <a:p>
+            <a:r>
+              <a:rPr lang="en-US" dirty="0">
+                <a:latin typeface="Consolas" panose="020B0609020204030204" pitchFamily="49" charset="0"/>
+              </a:rPr>
+              <a:t>    color::String</a:t>
+            </a:r>
+          </a:p>
+          <a:p>
+            <a:r>
+              <a:rPr lang="en-US" dirty="0">
+                <a:latin typeface="Consolas" panose="020B0609020204030204" pitchFamily="49" charset="0"/>
+              </a:rPr>
+              <a:t>end</a:t>
+            </a:r>
+          </a:p>
+        </p:txBody>
+      </p:sp>
+      <p:sp>
+        <p:nvSpPr>
+          <p:cNvPr id="8" name="TextBox 7">
+            <a:extLst>
+              <a:ext uri="{FF2B5EF4-FFF2-40B4-BE49-F238E27FC236}">
+                <a16:creationId xmlns:a16="http://schemas.microsoft.com/office/drawing/2014/main" id="{971B7C23-F351-49F1-A3B5-B52642CD2CEA}"/>
+              </a:ext>
+            </a:extLst>
+          </p:cNvPr>
+          <p:cNvSpPr txBox="1"/>
+          <p:nvPr/>
+        </p:nvSpPr>
+        <p:spPr>
+          <a:xfrm>
+            <a:off x="1154518" y="6056523"/>
+            <a:ext cx="5198085" cy="369332"/>
+          </a:xfrm>
+          <a:prstGeom prst="rect">
+            <a:avLst/>
+          </a:prstGeom>
+          <a:solidFill>
+            <a:schemeClr val="bg1">
+              <a:lumMod val="85000"/>
+            </a:schemeClr>
+          </a:solidFill>
+        </p:spPr>
+        <p:txBody>
+          <a:bodyPr wrap="square" rtlCol="0">
+            <a:spAutoFit/>
+          </a:bodyPr>
+          <a:lstStyle/>
+          <a:p>
+            <a:r>
+              <a:rPr lang="en-US" dirty="0" err="1">
+                <a:latin typeface="Consolas" panose="020B0609020204030204" pitchFamily="49" charset="0"/>
+              </a:rPr>
+              <a:t>ColoredStyle</a:t>
+            </a:r>
+            <a:r>
+              <a:rPr lang="en-US" dirty="0">
+                <a:latin typeface="Consolas" panose="020B0609020204030204" pitchFamily="49" charset="0"/>
+              </a:rPr>
+              <a:t>(::{&lt;:Paint}) = </a:t>
+            </a:r>
+            <a:r>
+              <a:rPr lang="en-US" dirty="0" err="1">
+                <a:latin typeface="Consolas" panose="020B0609020204030204" pitchFamily="49" charset="0"/>
+              </a:rPr>
+              <a:t>IsColored</a:t>
+            </a:r>
+            <a:r>
+              <a:rPr lang="en-US" dirty="0">
+                <a:latin typeface="Consolas" panose="020B0609020204030204" pitchFamily="49" charset="0"/>
+              </a:rPr>
+              <a:t>()</a:t>
+            </a:r>
+          </a:p>
+        </p:txBody>
+      </p:sp>
+      <p:sp>
+        <p:nvSpPr>
+          <p:cNvPr id="9" name="TextBox 8">
+            <a:extLst>
+              <a:ext uri="{FF2B5EF4-FFF2-40B4-BE49-F238E27FC236}">
+                <a16:creationId xmlns:a16="http://schemas.microsoft.com/office/drawing/2014/main" id="{7C35B9C2-922C-454F-8F4E-BD2F2BD7342C}"/>
+              </a:ext>
+            </a:extLst>
+          </p:cNvPr>
+          <p:cNvSpPr txBox="1"/>
+          <p:nvPr/>
+        </p:nvSpPr>
+        <p:spPr>
+          <a:xfrm>
+            <a:off x="7887286" y="2321771"/>
+            <a:ext cx="3933577" cy="646331"/>
+          </a:xfrm>
+          <a:prstGeom prst="rect">
+            <a:avLst/>
+          </a:prstGeom>
+          <a:solidFill>
+            <a:schemeClr val="bg1">
+              <a:lumMod val="85000"/>
+            </a:schemeClr>
+          </a:solidFill>
+        </p:spPr>
+        <p:txBody>
+          <a:bodyPr wrap="square" rtlCol="0">
+            <a:spAutoFit/>
+          </a:bodyPr>
+          <a:lstStyle/>
+          <a:p>
+            <a:r>
+              <a:rPr lang="en-US" dirty="0">
+                <a:latin typeface="Consolas" panose="020B0609020204030204" pitchFamily="49" charset="0"/>
+              </a:rPr>
+              <a:t>pixel = Pixel(3, 7, "green")</a:t>
+            </a:r>
+          </a:p>
+          <a:p>
+            <a:r>
+              <a:rPr lang="en-US" dirty="0" err="1">
+                <a:latin typeface="Consolas" panose="020B0609020204030204" pitchFamily="49" charset="0"/>
+              </a:rPr>
+              <a:t>println</a:t>
+            </a:r>
+            <a:r>
+              <a:rPr lang="en-US" dirty="0">
+                <a:latin typeface="Consolas" panose="020B0609020204030204" pitchFamily="49" charset="0"/>
+              </a:rPr>
+              <a:t>(</a:t>
+            </a:r>
+            <a:r>
+              <a:rPr lang="en-US" dirty="0" err="1">
+                <a:latin typeface="Consolas" panose="020B0609020204030204" pitchFamily="49" charset="0"/>
+              </a:rPr>
+              <a:t>get_color</a:t>
+            </a:r>
+            <a:r>
+              <a:rPr lang="en-US" dirty="0">
+                <a:latin typeface="Consolas" panose="020B0609020204030204" pitchFamily="49" charset="0"/>
+              </a:rPr>
+              <a:t>(pixel))</a:t>
+            </a:r>
+          </a:p>
+        </p:txBody>
+      </p:sp>
+      <p:sp>
+        <p:nvSpPr>
+          <p:cNvPr id="10" name="TextBox 9">
+            <a:extLst>
+              <a:ext uri="{FF2B5EF4-FFF2-40B4-BE49-F238E27FC236}">
+                <a16:creationId xmlns:a16="http://schemas.microsoft.com/office/drawing/2014/main" id="{CB50DF84-691C-4AF5-80B3-A788DA0005F1}"/>
+              </a:ext>
+            </a:extLst>
+          </p:cNvPr>
+          <p:cNvSpPr txBox="1"/>
+          <p:nvPr/>
+        </p:nvSpPr>
+        <p:spPr>
+          <a:xfrm>
+            <a:off x="7887286" y="4864395"/>
+            <a:ext cx="3933577" cy="646331"/>
+          </a:xfrm>
+          <a:prstGeom prst="rect">
+            <a:avLst/>
+          </a:prstGeom>
+          <a:solidFill>
+            <a:schemeClr val="bg1">
+              <a:lumMod val="85000"/>
+            </a:schemeClr>
+          </a:solidFill>
+        </p:spPr>
+        <p:txBody>
+          <a:bodyPr wrap="square" rtlCol="0">
+            <a:spAutoFit/>
+          </a:bodyPr>
+          <a:lstStyle/>
+          <a:p>
+            <a:r>
+              <a:rPr lang="en-US" dirty="0">
+                <a:latin typeface="Consolas" panose="020B0609020204030204" pitchFamily="49" charset="0"/>
+              </a:rPr>
+              <a:t>paint = Paint("red")</a:t>
+            </a:r>
+          </a:p>
+          <a:p>
+            <a:r>
+              <a:rPr lang="en-US" dirty="0" err="1">
+                <a:latin typeface="Consolas" panose="020B0609020204030204" pitchFamily="49" charset="0"/>
+              </a:rPr>
+              <a:t>println</a:t>
+            </a:r>
+            <a:r>
+              <a:rPr lang="en-US" dirty="0">
+                <a:latin typeface="Consolas" panose="020B0609020204030204" pitchFamily="49" charset="0"/>
+              </a:rPr>
+              <a:t>(</a:t>
+            </a:r>
+            <a:r>
+              <a:rPr lang="en-US" dirty="0" err="1">
+                <a:latin typeface="Consolas" panose="020B0609020204030204" pitchFamily="49" charset="0"/>
+              </a:rPr>
+              <a:t>get_color</a:t>
+            </a:r>
+            <a:r>
+              <a:rPr lang="en-US" dirty="0">
+                <a:latin typeface="Consolas" panose="020B0609020204030204" pitchFamily="49" charset="0"/>
+              </a:rPr>
+              <a:t>(paint))</a:t>
+            </a:r>
+          </a:p>
+        </p:txBody>
+      </p:sp>
+      <p:sp>
+        <p:nvSpPr>
+          <p:cNvPr id="11" name="TextBox 10">
+            <a:extLst>
+              <a:ext uri="{FF2B5EF4-FFF2-40B4-BE49-F238E27FC236}">
+                <a16:creationId xmlns:a16="http://schemas.microsoft.com/office/drawing/2014/main" id="{D624FB99-A394-4E68-9C80-4953F6B8634F}"/>
+              </a:ext>
+            </a:extLst>
+          </p:cNvPr>
+          <p:cNvSpPr txBox="1"/>
+          <p:nvPr/>
+        </p:nvSpPr>
+        <p:spPr>
+          <a:xfrm>
+            <a:off x="8878221" y="3020036"/>
+            <a:ext cx="723468" cy="369332"/>
+          </a:xfrm>
+          <a:prstGeom prst="rect">
+            <a:avLst/>
+          </a:prstGeom>
+          <a:solidFill>
+            <a:schemeClr val="tx1"/>
+          </a:solidFill>
+        </p:spPr>
+        <p:txBody>
+          <a:bodyPr wrap="none" rtlCol="0">
+            <a:spAutoFit/>
+          </a:bodyPr>
+          <a:lstStyle/>
+          <a:p>
+            <a:r>
+              <a:rPr lang="en-US" b="1" dirty="0">
+                <a:solidFill>
+                  <a:schemeClr val="bg1"/>
+                </a:solidFill>
+              </a:rPr>
+              <a:t>green</a:t>
+            </a:r>
+          </a:p>
+        </p:txBody>
+      </p:sp>
+      <p:sp>
+        <p:nvSpPr>
+          <p:cNvPr id="12" name="TextBox 11">
+            <a:extLst>
+              <a:ext uri="{FF2B5EF4-FFF2-40B4-BE49-F238E27FC236}">
+                <a16:creationId xmlns:a16="http://schemas.microsoft.com/office/drawing/2014/main" id="{B605E90D-6F89-4F2A-8673-71C2E81F4748}"/>
+              </a:ext>
+            </a:extLst>
+          </p:cNvPr>
+          <p:cNvSpPr txBox="1"/>
+          <p:nvPr/>
+        </p:nvSpPr>
+        <p:spPr>
+          <a:xfrm>
+            <a:off x="8881406" y="5578194"/>
+            <a:ext cx="502702" cy="369332"/>
+          </a:xfrm>
+          <a:prstGeom prst="rect">
+            <a:avLst/>
+          </a:prstGeom>
+          <a:solidFill>
+            <a:schemeClr val="tx1"/>
+          </a:solidFill>
+        </p:spPr>
+        <p:txBody>
+          <a:bodyPr wrap="none" rtlCol="0">
+            <a:spAutoFit/>
+          </a:bodyPr>
+          <a:lstStyle/>
+          <a:p>
+            <a:r>
+              <a:rPr lang="en-US" b="1" dirty="0">
+                <a:solidFill>
+                  <a:schemeClr val="bg1"/>
+                </a:solidFill>
+              </a:rPr>
+              <a:t>red</a:t>
+            </a:r>
+          </a:p>
+        </p:txBody>
+      </p:sp>
+      <p:sp>
+        <p:nvSpPr>
+          <p:cNvPr id="13" name="TextBox 12">
+            <a:extLst>
+              <a:ext uri="{FF2B5EF4-FFF2-40B4-BE49-F238E27FC236}">
+                <a16:creationId xmlns:a16="http://schemas.microsoft.com/office/drawing/2014/main" id="{F432A60F-5746-42D8-854B-80CC2CA27B26}"/>
+              </a:ext>
+            </a:extLst>
+          </p:cNvPr>
+          <p:cNvSpPr txBox="1"/>
+          <p:nvPr/>
+        </p:nvSpPr>
+        <p:spPr>
+          <a:xfrm>
+            <a:off x="7887286" y="3520566"/>
+            <a:ext cx="3933577" cy="646331"/>
+          </a:xfrm>
+          <a:prstGeom prst="rect">
+            <a:avLst/>
+          </a:prstGeom>
+          <a:solidFill>
+            <a:schemeClr val="bg1">
+              <a:lumMod val="85000"/>
+            </a:schemeClr>
+          </a:solidFill>
+        </p:spPr>
+        <p:txBody>
+          <a:bodyPr wrap="square" rtlCol="0">
+            <a:spAutoFit/>
+          </a:bodyPr>
+          <a:lstStyle/>
+          <a:p>
+            <a:r>
+              <a:rPr lang="en-US" dirty="0">
+                <a:latin typeface="Consolas" panose="020B0609020204030204" pitchFamily="49" charset="0"/>
+              </a:rPr>
+              <a:t>point = Point2D(3.1, 7.5)</a:t>
+            </a:r>
+          </a:p>
+          <a:p>
+            <a:r>
+              <a:rPr lang="en-US" dirty="0" err="1">
+                <a:latin typeface="Consolas" panose="020B0609020204030204" pitchFamily="49" charset="0"/>
+              </a:rPr>
+              <a:t>println</a:t>
+            </a:r>
+            <a:r>
+              <a:rPr lang="en-US" dirty="0">
+                <a:latin typeface="Consolas" panose="020B0609020204030204" pitchFamily="49" charset="0"/>
+              </a:rPr>
+              <a:t>(</a:t>
+            </a:r>
+            <a:r>
+              <a:rPr lang="en-US" dirty="0" err="1">
+                <a:latin typeface="Consolas" panose="020B0609020204030204" pitchFamily="49" charset="0"/>
+              </a:rPr>
+              <a:t>get_color</a:t>
+            </a:r>
+            <a:r>
+              <a:rPr lang="en-US" dirty="0">
+                <a:latin typeface="Consolas" panose="020B0609020204030204" pitchFamily="49" charset="0"/>
+              </a:rPr>
+              <a:t>(point))</a:t>
+            </a:r>
+          </a:p>
+        </p:txBody>
+      </p:sp>
+      <p:sp>
+        <p:nvSpPr>
+          <p:cNvPr id="14" name="TextBox 13">
+            <a:extLst>
+              <a:ext uri="{FF2B5EF4-FFF2-40B4-BE49-F238E27FC236}">
+                <a16:creationId xmlns:a16="http://schemas.microsoft.com/office/drawing/2014/main" id="{622A8210-5DC4-436F-9F07-5A1B35990A54}"/>
+              </a:ext>
+            </a:extLst>
+          </p:cNvPr>
+          <p:cNvSpPr txBox="1"/>
+          <p:nvPr/>
+        </p:nvSpPr>
+        <p:spPr>
+          <a:xfrm>
+            <a:off x="8878221" y="4242929"/>
+            <a:ext cx="2297488" cy="369332"/>
+          </a:xfrm>
+          <a:prstGeom prst="rect">
+            <a:avLst/>
+          </a:prstGeom>
+          <a:solidFill>
+            <a:schemeClr val="tx1"/>
+          </a:solidFill>
+        </p:spPr>
+        <p:txBody>
+          <a:bodyPr wrap="none" rtlCol="0">
+            <a:spAutoFit/>
+          </a:bodyPr>
+          <a:lstStyle/>
+          <a:p>
+            <a:r>
+              <a:rPr lang="en-US" b="1" dirty="0">
+                <a:solidFill>
+                  <a:srgbClr val="FF0000"/>
+                </a:solidFill>
+              </a:rPr>
+              <a:t>Point2D is not colored</a:t>
+            </a:r>
+          </a:p>
+        </p:txBody>
+      </p:sp>
+      <p:grpSp>
+        <p:nvGrpSpPr>
+          <p:cNvPr id="21" name="Group 20">
+            <a:extLst>
+              <a:ext uri="{FF2B5EF4-FFF2-40B4-BE49-F238E27FC236}">
+                <a16:creationId xmlns:a16="http://schemas.microsoft.com/office/drawing/2014/main" id="{879A3822-9708-44CE-AEC1-14E0D8E794FD}"/>
+              </a:ext>
+            </a:extLst>
+          </p:cNvPr>
+          <p:cNvGrpSpPr/>
+          <p:nvPr/>
+        </p:nvGrpSpPr>
+        <p:grpSpPr>
+          <a:xfrm>
+            <a:off x="154858" y="2557880"/>
+            <a:ext cx="1012361" cy="3020314"/>
+            <a:chOff x="154858" y="2557880"/>
+            <a:chExt cx="1012361" cy="3020314"/>
+          </a:xfrm>
+        </p:grpSpPr>
+        <p:cxnSp>
+          <p:nvCxnSpPr>
+            <p:cNvPr id="16" name="Connector: Elbow 15">
+              <a:extLst>
+                <a:ext uri="{FF2B5EF4-FFF2-40B4-BE49-F238E27FC236}">
+                  <a16:creationId xmlns:a16="http://schemas.microsoft.com/office/drawing/2014/main" id="{F893F298-DC95-4F88-8EB5-157C6297C4A1}"/>
+                </a:ext>
+              </a:extLst>
+            </p:cNvPr>
+            <p:cNvCxnSpPr>
+              <a:stCxn id="5" idx="1"/>
+              <a:endCxn id="7" idx="1"/>
+            </p:cNvCxnSpPr>
+            <p:nvPr/>
+          </p:nvCxnSpPr>
+          <p:spPr>
+            <a:xfrm rot="10800000" flipV="1">
+              <a:off x="1154519" y="2921936"/>
+              <a:ext cx="12700" cy="2404124"/>
+            </a:xfrm>
+            <a:prstGeom prst="bentConnector3">
+              <a:avLst>
+                <a:gd name="adj1" fmla="val 3296724"/>
+              </a:avLst>
+            </a:prstGeom>
+            <a:ln w="38100">
+              <a:solidFill>
+                <a:srgbClr val="FF0000"/>
+              </a:solidFill>
+              <a:headEnd type="stealth" w="lg" len="lg"/>
+              <a:tailEnd type="stealth" w="lg" len="lg"/>
+            </a:ln>
+          </p:spPr>
+          <p:style>
+            <a:lnRef idx="1">
+              <a:schemeClr val="accent1"/>
+            </a:lnRef>
+            <a:fillRef idx="0">
+              <a:schemeClr val="accent1"/>
+            </a:fillRef>
+            <a:effectRef idx="0">
+              <a:schemeClr val="accent1"/>
+            </a:effectRef>
+            <a:fontRef idx="minor">
+              <a:schemeClr val="tx1"/>
+            </a:fontRef>
+          </p:style>
+        </p:cxnSp>
+        <p:sp>
+          <p:nvSpPr>
+            <p:cNvPr id="20" name="TextBox 19">
+              <a:extLst>
+                <a:ext uri="{FF2B5EF4-FFF2-40B4-BE49-F238E27FC236}">
+                  <a16:creationId xmlns:a16="http://schemas.microsoft.com/office/drawing/2014/main" id="{C67967E0-EA27-47CC-B920-95AC73896BAB}"/>
+                </a:ext>
+              </a:extLst>
+            </p:cNvPr>
+            <p:cNvSpPr txBox="1"/>
+            <p:nvPr/>
+          </p:nvSpPr>
+          <p:spPr>
+            <a:xfrm rot="16200000">
+              <a:off x="-1093689" y="3806427"/>
+              <a:ext cx="3020314" cy="523220"/>
+            </a:xfrm>
+            <a:prstGeom prst="rect">
+              <a:avLst/>
+            </a:prstGeom>
+            <a:noFill/>
+            <a:ln>
+              <a:solidFill>
+                <a:srgbClr val="FF0000"/>
+              </a:solidFill>
+            </a:ln>
+          </p:spPr>
+          <p:txBody>
+            <a:bodyPr wrap="none" rtlCol="0">
+              <a:spAutoFit/>
+            </a:bodyPr>
+            <a:lstStyle/>
+            <a:p>
+              <a:r>
+                <a:rPr lang="en-US" sz="2800" dirty="0">
+                  <a:solidFill>
+                    <a:srgbClr val="FF0000"/>
+                  </a:solidFill>
+                </a:rPr>
+                <a:t>Not in type relation</a:t>
+              </a:r>
+            </a:p>
+          </p:txBody>
+        </p:sp>
+      </p:grpSp>
+      <p:grpSp>
+        <p:nvGrpSpPr>
+          <p:cNvPr id="22" name="Group 21">
+            <a:extLst>
+              <a:ext uri="{FF2B5EF4-FFF2-40B4-BE49-F238E27FC236}">
+                <a16:creationId xmlns:a16="http://schemas.microsoft.com/office/drawing/2014/main" id="{E419ADEC-3664-47BD-A448-FDDFB4A87F5F}"/>
+              </a:ext>
+            </a:extLst>
+          </p:cNvPr>
+          <p:cNvGrpSpPr/>
+          <p:nvPr/>
+        </p:nvGrpSpPr>
+        <p:grpSpPr>
+          <a:xfrm>
+            <a:off x="6352603" y="3953942"/>
+            <a:ext cx="1017612" cy="2287247"/>
+            <a:chOff x="-5264" y="3005406"/>
+            <a:chExt cx="1017612" cy="2287247"/>
+          </a:xfrm>
+        </p:grpSpPr>
+        <p:cxnSp>
+          <p:nvCxnSpPr>
+            <p:cNvPr id="23" name="Connector: Elbow 22">
+              <a:extLst>
+                <a:ext uri="{FF2B5EF4-FFF2-40B4-BE49-F238E27FC236}">
+                  <a16:creationId xmlns:a16="http://schemas.microsoft.com/office/drawing/2014/main" id="{7A3A0939-B0BB-4FC5-AB02-A8AC2BAB204F}"/>
+                </a:ext>
+              </a:extLst>
+            </p:cNvPr>
+            <p:cNvCxnSpPr>
+              <a:cxnSpLocks/>
+              <a:stCxn id="6" idx="3"/>
+              <a:endCxn id="8" idx="3"/>
+            </p:cNvCxnSpPr>
+            <p:nvPr/>
+          </p:nvCxnSpPr>
+          <p:spPr>
+            <a:xfrm>
+              <a:off x="-5264" y="3005406"/>
+              <a:ext cx="12700" cy="2287247"/>
+            </a:xfrm>
+            <a:prstGeom prst="bentConnector3">
+              <a:avLst>
+                <a:gd name="adj1" fmla="val 3255315"/>
+              </a:avLst>
+            </a:prstGeom>
+            <a:ln w="38100">
+              <a:solidFill>
+                <a:srgbClr val="00B050"/>
+              </a:solidFill>
+              <a:headEnd type="stealth" w="lg" len="lg"/>
+              <a:tailEnd type="stealth" w="lg" len="lg"/>
+            </a:ln>
+          </p:spPr>
+          <p:style>
+            <a:lnRef idx="1">
+              <a:schemeClr val="accent1"/>
+            </a:lnRef>
+            <a:fillRef idx="0">
+              <a:schemeClr val="accent1"/>
+            </a:fillRef>
+            <a:effectRef idx="0">
+              <a:schemeClr val="accent1"/>
+            </a:effectRef>
+            <a:fontRef idx="minor">
+              <a:schemeClr val="tx1"/>
+            </a:fontRef>
+          </p:style>
+        </p:cxnSp>
+        <p:sp>
+          <p:nvSpPr>
+            <p:cNvPr id="24" name="TextBox 23">
+              <a:extLst>
+                <a:ext uri="{FF2B5EF4-FFF2-40B4-BE49-F238E27FC236}">
+                  <a16:creationId xmlns:a16="http://schemas.microsoft.com/office/drawing/2014/main" id="{F870A401-3AA5-4E46-ACEF-DC3ADB6B603E}"/>
+                </a:ext>
+              </a:extLst>
+            </p:cNvPr>
+            <p:cNvSpPr txBox="1"/>
+            <p:nvPr/>
+          </p:nvSpPr>
+          <p:spPr>
+            <a:xfrm rot="16200000">
+              <a:off x="-100169" y="3887418"/>
+              <a:ext cx="1701813" cy="523220"/>
+            </a:xfrm>
+            <a:prstGeom prst="rect">
+              <a:avLst/>
+            </a:prstGeom>
+            <a:noFill/>
+            <a:ln>
+              <a:solidFill>
+                <a:srgbClr val="00B050"/>
+              </a:solidFill>
+            </a:ln>
+          </p:spPr>
+          <p:txBody>
+            <a:bodyPr wrap="none" rtlCol="0">
+              <a:spAutoFit/>
+            </a:bodyPr>
+            <a:lstStyle/>
+            <a:p>
+              <a:r>
+                <a:rPr lang="en-US" sz="2800" dirty="0">
+                  <a:solidFill>
+                    <a:srgbClr val="00B050"/>
+                  </a:solidFill>
+                </a:rPr>
+                <a:t>Share trait</a:t>
+              </a:r>
+            </a:p>
+          </p:txBody>
+        </p:sp>
+      </p:grpSp>
+    </p:spTree>
+    <p:extLst>
+      <p:ext uri="{BB962C8B-B14F-4D97-AF65-F5344CB8AC3E}">
+        <p14:creationId xmlns:p14="http://schemas.microsoft.com/office/powerpoint/2010/main" val="1925560802"/>
+      </p:ext>
+    </p:extLst>
+  </p:cSld>
+  <p:clrMapOvr>
+    <a:masterClrMapping/>
+  </p:clrMapOvr>
+</p:sld>
+</file>
+
+<file path=ppt/slides/slide17.xml><?xml version="1.0" encoding="utf-8"?>
+<p:sld xmlns:a="http://schemas.openxmlformats.org/drawingml/2006/main" xmlns:r="http://schemas.openxmlformats.org/officeDocument/2006/relationships" xmlns:p="http://schemas.openxmlformats.org/presentationml/2006/main">
+  <p:cSld>
+    <p:spTree>
+      <p:nvGrpSpPr>
+        <p:cNvPr id="1" name=""/>
+        <p:cNvGrpSpPr/>
+        <p:nvPr/>
+      </p:nvGrpSpPr>
+      <p:grpSpPr>
+        <a:xfrm>
+          <a:off x="0" y="0"/>
+          <a:ext cx="0" cy="0"/>
+          <a:chOff x="0" y="0"/>
+          <a:chExt cx="0" cy="0"/>
+        </a:xfrm>
+      </p:grpSpPr>
+      <p:sp>
+        <p:nvSpPr>
+          <p:cNvPr id="2" name="Title 1">
+            <a:extLst>
+              <a:ext uri="{FF2B5EF4-FFF2-40B4-BE49-F238E27FC236}">
                 <a16:creationId xmlns:a16="http://schemas.microsoft.com/office/drawing/2014/main" id="{5996CC12-00C7-483E-8CFF-7965D13CF81D}"/>
               </a:ext>
             </a:extLst>
@@ -4839,6 +7793,35 @@
           <a:bodyPr/>
           <a:lstStyle/>
           <a:p>
+            <a:endParaRPr lang="en-US"/>
+          </a:p>
+        </p:txBody>
+      </p:sp>
+      <p:sp>
+        <p:nvSpPr>
+          <p:cNvPr id="4" name="Slide Number Placeholder 3">
+            <a:extLst>
+              <a:ext uri="{FF2B5EF4-FFF2-40B4-BE49-F238E27FC236}">
+                <a16:creationId xmlns:a16="http://schemas.microsoft.com/office/drawing/2014/main" id="{D4FDC261-61BA-4399-84EE-BBD1B46F99D2}"/>
+              </a:ext>
+            </a:extLst>
+          </p:cNvPr>
+          <p:cNvSpPr>
+            <a:spLocks noGrp="1"/>
+          </p:cNvSpPr>
+          <p:nvPr>
+            <p:ph type="sldNum" sz="quarter" idx="12"/>
+          </p:nvPr>
+        </p:nvSpPr>
+        <p:spPr/>
+        <p:txBody>
+          <a:bodyPr/>
+          <a:lstStyle/>
+          <a:p>
+            <a:fld id="{78F7A1EC-23D1-431D-8C93-9C4ED5D4A04D}" type="slidenum">
+              <a:rPr lang="en-US" smtClean="0"/>
+              <a:t>17</a:t>
+            </a:fld>
             <a:endParaRPr lang="en-US"/>
           </a:p>
         </p:txBody>
@@ -4980,6 +7963,35 @@
           </a:p>
         </p:txBody>
       </p:sp>
+      <p:sp>
+        <p:nvSpPr>
+          <p:cNvPr id="4" name="Slide Number Placeholder 3">
+            <a:extLst>
+              <a:ext uri="{FF2B5EF4-FFF2-40B4-BE49-F238E27FC236}">
+                <a16:creationId xmlns:a16="http://schemas.microsoft.com/office/drawing/2014/main" id="{67D8F1E2-BDF5-4404-BC92-E91371642E7C}"/>
+              </a:ext>
+            </a:extLst>
+          </p:cNvPr>
+          <p:cNvSpPr>
+            <a:spLocks noGrp="1"/>
+          </p:cNvSpPr>
+          <p:nvPr>
+            <p:ph type="sldNum" sz="quarter" idx="12"/>
+          </p:nvPr>
+        </p:nvSpPr>
+        <p:spPr/>
+        <p:txBody>
+          <a:bodyPr/>
+          <a:lstStyle/>
+          <a:p>
+            <a:fld id="{78F7A1EC-23D1-431D-8C93-9C4ED5D4A04D}" type="slidenum">
+              <a:rPr lang="en-US" smtClean="0"/>
+              <a:t>2</a:t>
+            </a:fld>
+            <a:endParaRPr lang="en-US"/>
+          </a:p>
+        </p:txBody>
+      </p:sp>
     </p:spTree>
     <p:extLst>
       <p:ext uri="{BB962C8B-B14F-4D97-AF65-F5344CB8AC3E}">
@@ -5063,6 +8075,35 @@
           </a:p>
         </p:txBody>
       </p:sp>
+      <p:sp>
+        <p:nvSpPr>
+          <p:cNvPr id="4" name="Slide Number Placeholder 3">
+            <a:extLst>
+              <a:ext uri="{FF2B5EF4-FFF2-40B4-BE49-F238E27FC236}">
+                <a16:creationId xmlns:a16="http://schemas.microsoft.com/office/drawing/2014/main" id="{AE1A160F-B4E1-4A14-A961-1D4AD6211244}"/>
+              </a:ext>
+            </a:extLst>
+          </p:cNvPr>
+          <p:cNvSpPr>
+            <a:spLocks noGrp="1"/>
+          </p:cNvSpPr>
+          <p:nvPr>
+            <p:ph type="sldNum" sz="quarter" idx="12"/>
+          </p:nvPr>
+        </p:nvSpPr>
+        <p:spPr/>
+        <p:txBody>
+          <a:bodyPr/>
+          <a:lstStyle/>
+          <a:p>
+            <a:fld id="{78F7A1EC-23D1-431D-8C93-9C4ED5D4A04D}" type="slidenum">
+              <a:rPr lang="en-US" smtClean="0"/>
+              <a:t>3</a:t>
+            </a:fld>
+            <a:endParaRPr lang="en-US"/>
+          </a:p>
+        </p:txBody>
+      </p:sp>
     </p:spTree>
     <p:extLst>
       <p:ext uri="{BB962C8B-B14F-4D97-AF65-F5344CB8AC3E}">
@@ -5146,6 +8187,35 @@
           </a:p>
         </p:txBody>
       </p:sp>
+      <p:sp>
+        <p:nvSpPr>
+          <p:cNvPr id="4" name="Slide Number Placeholder 3">
+            <a:extLst>
+              <a:ext uri="{FF2B5EF4-FFF2-40B4-BE49-F238E27FC236}">
+                <a16:creationId xmlns:a16="http://schemas.microsoft.com/office/drawing/2014/main" id="{FF3B91FC-66AE-49F0-8B3D-335EAC8719A1}"/>
+              </a:ext>
+            </a:extLst>
+          </p:cNvPr>
+          <p:cNvSpPr>
+            <a:spLocks noGrp="1"/>
+          </p:cNvSpPr>
+          <p:nvPr>
+            <p:ph type="sldNum" sz="quarter" idx="12"/>
+          </p:nvPr>
+        </p:nvSpPr>
+        <p:spPr/>
+        <p:txBody>
+          <a:bodyPr/>
+          <a:lstStyle/>
+          <a:p>
+            <a:fld id="{78F7A1EC-23D1-431D-8C93-9C4ED5D4A04D}" type="slidenum">
+              <a:rPr lang="en-US" smtClean="0"/>
+              <a:t>4</a:t>
+            </a:fld>
+            <a:endParaRPr lang="en-US"/>
+          </a:p>
+        </p:txBody>
+      </p:sp>
     </p:spTree>
     <p:extLst>
       <p:ext uri="{BB962C8B-B14F-4D97-AF65-F5344CB8AC3E}">
@@ -5388,6 +8458,35 @@
           </a:p>
         </p:txBody>
       </p:sp>
+      <p:sp>
+        <p:nvSpPr>
+          <p:cNvPr id="3" name="Slide Number Placeholder 2">
+            <a:extLst>
+              <a:ext uri="{FF2B5EF4-FFF2-40B4-BE49-F238E27FC236}">
+                <a16:creationId xmlns:a16="http://schemas.microsoft.com/office/drawing/2014/main" id="{2E385944-C97A-4BDE-8549-28EC99A9934D}"/>
+              </a:ext>
+            </a:extLst>
+          </p:cNvPr>
+          <p:cNvSpPr>
+            <a:spLocks noGrp="1"/>
+          </p:cNvSpPr>
+          <p:nvPr>
+            <p:ph type="sldNum" sz="quarter" idx="12"/>
+          </p:nvPr>
+        </p:nvSpPr>
+        <p:spPr/>
+        <p:txBody>
+          <a:bodyPr/>
+          <a:lstStyle/>
+          <a:p>
+            <a:fld id="{78F7A1EC-23D1-431D-8C93-9C4ED5D4A04D}" type="slidenum">
+              <a:rPr lang="en-US" smtClean="0"/>
+              <a:t>5</a:t>
+            </a:fld>
+            <a:endParaRPr lang="en-US"/>
+          </a:p>
+        </p:txBody>
+      </p:sp>
     </p:spTree>
     <p:extLst>
       <p:ext uri="{BB962C8B-B14F-4D97-AF65-F5344CB8AC3E}">
@@ -5820,6 +8919,35 @@
           </a:p>
         </p:txBody>
       </p:sp>
+      <p:sp>
+        <p:nvSpPr>
+          <p:cNvPr id="8" name="Slide Number Placeholder 7">
+            <a:extLst>
+              <a:ext uri="{FF2B5EF4-FFF2-40B4-BE49-F238E27FC236}">
+                <a16:creationId xmlns:a16="http://schemas.microsoft.com/office/drawing/2014/main" id="{6C13E8F8-AF99-45AD-BAA4-C60CA830704C}"/>
+              </a:ext>
+            </a:extLst>
+          </p:cNvPr>
+          <p:cNvSpPr>
+            <a:spLocks noGrp="1"/>
+          </p:cNvSpPr>
+          <p:nvPr>
+            <p:ph type="sldNum" sz="quarter" idx="12"/>
+          </p:nvPr>
+        </p:nvSpPr>
+        <p:spPr/>
+        <p:txBody>
+          <a:bodyPr/>
+          <a:lstStyle/>
+          <a:p>
+            <a:fld id="{78F7A1EC-23D1-431D-8C93-9C4ED5D4A04D}" type="slidenum">
+              <a:rPr lang="en-US" smtClean="0"/>
+              <a:t>6</a:t>
+            </a:fld>
+            <a:endParaRPr lang="en-US"/>
+          </a:p>
+        </p:txBody>
+      </p:sp>
     </p:spTree>
     <p:extLst>
       <p:ext uri="{BB962C8B-B14F-4D97-AF65-F5344CB8AC3E}">
@@ -5988,6 +9116,35 @@
           </a:p>
         </p:txBody>
       </p:sp>
+      <p:sp>
+        <p:nvSpPr>
+          <p:cNvPr id="4" name="Slide Number Placeholder 3">
+            <a:extLst>
+              <a:ext uri="{FF2B5EF4-FFF2-40B4-BE49-F238E27FC236}">
+                <a16:creationId xmlns:a16="http://schemas.microsoft.com/office/drawing/2014/main" id="{13CFE5D9-8BB6-40ED-A900-507525122503}"/>
+              </a:ext>
+            </a:extLst>
+          </p:cNvPr>
+          <p:cNvSpPr>
+            <a:spLocks noGrp="1"/>
+          </p:cNvSpPr>
+          <p:nvPr>
+            <p:ph type="sldNum" sz="quarter" idx="12"/>
+          </p:nvPr>
+        </p:nvSpPr>
+        <p:spPr/>
+        <p:txBody>
+          <a:bodyPr/>
+          <a:lstStyle/>
+          <a:p>
+            <a:fld id="{78F7A1EC-23D1-431D-8C93-9C4ED5D4A04D}" type="slidenum">
+              <a:rPr lang="en-US" smtClean="0"/>
+              <a:t>7</a:t>
+            </a:fld>
+            <a:endParaRPr lang="en-US"/>
+          </a:p>
+        </p:txBody>
+      </p:sp>
     </p:spTree>
     <p:extLst>
       <p:ext uri="{BB962C8B-B14F-4D97-AF65-F5344CB8AC3E}">
@@ -6448,6 +9605,35 @@
           </a:p>
         </p:txBody>
       </p:sp>
+      <p:sp>
+        <p:nvSpPr>
+          <p:cNvPr id="10" name="Slide Number Placeholder 9">
+            <a:extLst>
+              <a:ext uri="{FF2B5EF4-FFF2-40B4-BE49-F238E27FC236}">
+                <a16:creationId xmlns:a16="http://schemas.microsoft.com/office/drawing/2014/main" id="{B7E1F6A2-C7AD-48A4-BF81-4D16E6865C99}"/>
+              </a:ext>
+            </a:extLst>
+          </p:cNvPr>
+          <p:cNvSpPr>
+            <a:spLocks noGrp="1"/>
+          </p:cNvSpPr>
+          <p:nvPr>
+            <p:ph type="sldNum" sz="quarter" idx="12"/>
+          </p:nvPr>
+        </p:nvSpPr>
+        <p:spPr/>
+        <p:txBody>
+          <a:bodyPr/>
+          <a:lstStyle/>
+          <a:p>
+            <a:fld id="{78F7A1EC-23D1-431D-8C93-9C4ED5D4A04D}" type="slidenum">
+              <a:rPr lang="en-US" smtClean="0"/>
+              <a:t>8</a:t>
+            </a:fld>
+            <a:endParaRPr lang="en-US"/>
+          </a:p>
+        </p:txBody>
+      </p:sp>
     </p:spTree>
     <p:extLst>
       <p:ext uri="{BB962C8B-B14F-4D97-AF65-F5344CB8AC3E}">
@@ -6527,6 +9713,35 @@
           <a:bodyPr/>
           <a:lstStyle/>
           <a:p>
+            <a:endParaRPr lang="en-US"/>
+          </a:p>
+        </p:txBody>
+      </p:sp>
+      <p:sp>
+        <p:nvSpPr>
+          <p:cNvPr id="4" name="Slide Number Placeholder 3">
+            <a:extLst>
+              <a:ext uri="{FF2B5EF4-FFF2-40B4-BE49-F238E27FC236}">
+                <a16:creationId xmlns:a16="http://schemas.microsoft.com/office/drawing/2014/main" id="{14CAC51D-39BD-4BAC-8555-31C8CF0E14DB}"/>
+              </a:ext>
+            </a:extLst>
+          </p:cNvPr>
+          <p:cNvSpPr>
+            <a:spLocks noGrp="1"/>
+          </p:cNvSpPr>
+          <p:nvPr>
+            <p:ph type="sldNum" sz="quarter" idx="12"/>
+          </p:nvPr>
+        </p:nvSpPr>
+        <p:spPr/>
+        <p:txBody>
+          <a:bodyPr/>
+          <a:lstStyle/>
+          <a:p>
+            <a:fld id="{78F7A1EC-23D1-431D-8C93-9C4ED5D4A04D}" type="slidenum">
+              <a:rPr lang="en-US" smtClean="0"/>
+              <a:t>9</a:t>
+            </a:fld>
             <a:endParaRPr lang="en-US"/>
           </a:p>
         </p:txBody>
@@ -6837,4 +10052,299 @@
     </a:ext>
   </a:extLst>
 </a:theme>
+</file>
+
+<file path=ppt/theme/theme2.xml><?xml version="1.0" encoding="utf-8"?>
+<a:theme xmlns:a="http://schemas.openxmlformats.org/drawingml/2006/main" name="Office Theme">
+  <a:themeElements>
+    <a:clrScheme name="Office">
+      <a:dk1>
+        <a:sysClr val="windowText" lastClr="000000"/>
+      </a:dk1>
+      <a:lt1>
+        <a:sysClr val="window" lastClr="FFFFFF"/>
+      </a:lt1>
+      <a:dk2>
+        <a:srgbClr val="44546A"/>
+      </a:dk2>
+      <a:lt2>
+        <a:srgbClr val="E7E6E6"/>
+      </a:lt2>
+      <a:accent1>
+        <a:srgbClr val="4472C4"/>
+      </a:accent1>
+      <a:accent2>
+        <a:srgbClr val="ED7D31"/>
+      </a:accent2>
+      <a:accent3>
+        <a:srgbClr val="A5A5A5"/>
+      </a:accent3>
+      <a:accent4>
+        <a:srgbClr val="FFC000"/>
+      </a:accent4>
+      <a:accent5>
+        <a:srgbClr val="5B9BD5"/>
+      </a:accent5>
+      <a:accent6>
+        <a:srgbClr val="70AD47"/>
+      </a:accent6>
+      <a:hlink>
+        <a:srgbClr val="0563C1"/>
+      </a:hlink>
+      <a:folHlink>
+        <a:srgbClr val="954F72"/>
+      </a:folHlink>
+    </a:clrScheme>
+    <a:fontScheme name="Office">
+      <a:majorFont>
+        <a:latin typeface="Calibri Light" panose="020F0302020204030204"/>
+        <a:ea typeface=""/>
+        <a:cs typeface=""/>
+        <a:font script="Jpan" typeface="游ゴシック Light"/>
+        <a:font script="Hang" typeface="맑은 고딕"/>
+        <a:font script="Hans" typeface="等线 Light"/>
+        <a:font script="Hant" typeface="新細明體"/>
+        <a:font script="Arab" typeface="Times New Roman"/>
+        <a:font script="Hebr" typeface="Times New Roman"/>
+        <a:font script="Thai" typeface="Angsana New"/>
+        <a:font script="Ethi" typeface="Nyala"/>
+        <a:font script="Beng" typeface="Vrinda"/>
+        <a:font script="Gujr" typeface="Shruti"/>
+        <a:font script="Khmr" typeface="MoolBoran"/>
+        <a:font script="Knda" typeface="Tunga"/>
+        <a:font script="Guru" typeface="Raavi"/>
+        <a:font script="Cans" typeface="Euphemia"/>
+        <a:font script="Cher" typeface="Plantagenet Cherokee"/>
+        <a:font script="Yiii" typeface="Microsoft Yi Baiti"/>
+        <a:font script="Tibt" typeface="Microsoft Himalaya"/>
+        <a:font script="Thaa" typeface="MV Boli"/>
+        <a:font script="Deva" typeface="Mangal"/>
+        <a:font script="Telu" typeface="Gautami"/>
+        <a:font script="Taml" typeface="Latha"/>
+        <a:font script="Syrc" typeface="Estrangelo Edessa"/>
+        <a:font script="Orya" typeface="Kalinga"/>
+        <a:font script="Mlym" typeface="Kartika"/>
+        <a:font script="Laoo" typeface="DokChampa"/>
+        <a:font script="Sinh" typeface="Iskoola Pota"/>
+        <a:font script="Mong" typeface="Mongolian Baiti"/>
+        <a:font script="Viet" typeface="Times New Roman"/>
+        <a:font script="Uigh" typeface="Microsoft Uighur"/>
+        <a:font script="Geor" typeface="Sylfaen"/>
+        <a:font script="Armn" typeface="Arial"/>
+        <a:font script="Bugi" typeface="Leelawadee UI"/>
+        <a:font script="Bopo" typeface="Microsoft JhengHei"/>
+        <a:font script="Java" typeface="Javanese Text"/>
+        <a:font script="Lisu" typeface="Segoe UI"/>
+        <a:font script="Mymr" typeface="Myanmar Text"/>
+        <a:font script="Nkoo" typeface="Ebrima"/>
+        <a:font script="Olck" typeface="Nirmala UI"/>
+        <a:font script="Osma" typeface="Ebrima"/>
+        <a:font script="Phag" typeface="Phagspa"/>
+        <a:font script="Syrn" typeface="Estrangelo Edessa"/>
+        <a:font script="Syrj" typeface="Estrangelo Edessa"/>
+        <a:font script="Syre" typeface="Estrangelo Edessa"/>
+        <a:font script="Sora" typeface="Nirmala UI"/>
+        <a:font script="Tale" typeface="Microsoft Tai Le"/>
+        <a:font script="Talu" typeface="Microsoft New Tai Lue"/>
+        <a:font script="Tfng" typeface="Ebrima"/>
+      </a:majorFont>
+      <a:minorFont>
+        <a:latin typeface="Calibri" panose="020F0502020204030204"/>
+        <a:ea typeface=""/>
+        <a:cs typeface=""/>
+        <a:font script="Jpan" typeface="游ゴシック"/>
+        <a:font script="Hang" typeface="맑은 고딕"/>
+        <a:font script="Hans" typeface="等线"/>
+        <a:font script="Hant" typeface="新細明體"/>
+        <a:font script="Arab" typeface="Arial"/>
+        <a:font script="Hebr" typeface="Arial"/>
+        <a:font script="Thai" typeface="Cordia New"/>
+        <a:font script="Ethi" typeface="Nyala"/>
+        <a:font script="Beng" typeface="Vrinda"/>
+        <a:font script="Gujr" typeface="Shruti"/>
+        <a:font script="Khmr" typeface="DaunPenh"/>
+        <a:font script="Knda" typeface="Tunga"/>
+        <a:font script="Guru" typeface="Raavi"/>
+        <a:font script="Cans" typeface="Euphemia"/>
+        <a:font script="Cher" typeface="Plantagenet Cherokee"/>
+        <a:font script="Yiii" typeface="Microsoft Yi Baiti"/>
+        <a:font script="Tibt" typeface="Microsoft Himalaya"/>
+        <a:font script="Thaa" typeface="MV Boli"/>
+        <a:font script="Deva" typeface="Mangal"/>
+        <a:font script="Telu" typeface="Gautami"/>
+        <a:font script="Taml" typeface="Latha"/>
+        <a:font script="Syrc" typeface="Estrangelo Edessa"/>
+        <a:font script="Orya" typeface="Kalinga"/>
+        <a:font script="Mlym" typeface="Kartika"/>
+        <a:font script="Laoo" typeface="DokChampa"/>
+        <a:font script="Sinh" typeface="Iskoola Pota"/>
+        <a:font script="Mong" typeface="Mongolian Baiti"/>
+        <a:font script="Viet" typeface="Arial"/>
+        <a:font script="Uigh" typeface="Microsoft Uighur"/>
+        <a:font script="Geor" typeface="Sylfaen"/>
+        <a:font script="Armn" typeface="Arial"/>
+        <a:font script="Bugi" typeface="Leelawadee UI"/>
+        <a:font script="Bopo" typeface="Microsoft JhengHei"/>
+        <a:font script="Java" typeface="Javanese Text"/>
+        <a:font script="Lisu" typeface="Segoe UI"/>
+        <a:font script="Mymr" typeface="Myanmar Text"/>
+        <a:font script="Nkoo" typeface="Ebrima"/>
+        <a:font script="Olck" typeface="Nirmala UI"/>
+        <a:font script="Osma" typeface="Ebrima"/>
+        <a:font script="Phag" typeface="Phagspa"/>
+        <a:font script="Syrn" typeface="Estrangelo Edessa"/>
+        <a:font script="Syrj" typeface="Estrangelo Edessa"/>
+        <a:font script="Syre" typeface="Estrangelo Edessa"/>
+        <a:font script="Sora" typeface="Nirmala UI"/>
+        <a:font script="Tale" typeface="Microsoft Tai Le"/>
+        <a:font script="Talu" typeface="Microsoft New Tai Lue"/>
+        <a:font script="Tfng" typeface="Ebrima"/>
+      </a:minorFont>
+    </a:fontScheme>
+    <a:fmtScheme name="Office">
+      <a:fillStyleLst>
+        <a:solidFill>
+          <a:schemeClr val="phClr"/>
+        </a:solidFill>
+        <a:gradFill rotWithShape="1">
+          <a:gsLst>
+            <a:gs pos="0">
+              <a:schemeClr val="phClr">
+                <a:lumMod val="110000"/>
+                <a:satMod val="105000"/>
+                <a:tint val="67000"/>
+              </a:schemeClr>
+            </a:gs>
+            <a:gs pos="50000">
+              <a:schemeClr val="phClr">
+                <a:lumMod val="105000"/>
+                <a:satMod val="103000"/>
+                <a:tint val="73000"/>
+              </a:schemeClr>
+            </a:gs>
+            <a:gs pos="100000">
+              <a:schemeClr val="phClr">
+                <a:lumMod val="105000"/>
+                <a:satMod val="109000"/>
+                <a:tint val="81000"/>
+              </a:schemeClr>
+            </a:gs>
+          </a:gsLst>
+          <a:lin ang="5400000" scaled="0"/>
+        </a:gradFill>
+        <a:gradFill rotWithShape="1">
+          <a:gsLst>
+            <a:gs pos="0">
+              <a:schemeClr val="phClr">
+                <a:satMod val="103000"/>
+                <a:lumMod val="102000"/>
+                <a:tint val="94000"/>
+              </a:schemeClr>
+            </a:gs>
+            <a:gs pos="50000">
+              <a:schemeClr val="phClr">
+                <a:satMod val="110000"/>
+                <a:lumMod val="100000"/>
+                <a:shade val="100000"/>
+              </a:schemeClr>
+            </a:gs>
+            <a:gs pos="100000">
+              <a:schemeClr val="phClr">
+                <a:lumMod val="99000"/>
+                <a:satMod val="120000"/>
+                <a:shade val="78000"/>
+              </a:schemeClr>
+            </a:gs>
+          </a:gsLst>
+          <a:lin ang="5400000" scaled="0"/>
+        </a:gradFill>
+      </a:fillStyleLst>
+      <a:lnStyleLst>
+        <a:ln w="6350" cap="flat" cmpd="sng" algn="ctr">
+          <a:solidFill>
+            <a:schemeClr val="phClr"/>
+          </a:solidFill>
+          <a:prstDash val="solid"/>
+          <a:miter lim="800000"/>
+        </a:ln>
+        <a:ln w="12700" cap="flat" cmpd="sng" algn="ctr">
+          <a:solidFill>
+            <a:schemeClr val="phClr"/>
+          </a:solidFill>
+          <a:prstDash val="solid"/>
+          <a:miter lim="800000"/>
+        </a:ln>
+        <a:ln w="19050" cap="flat" cmpd="sng" algn="ctr">
+          <a:solidFill>
+            <a:schemeClr val="phClr"/>
+          </a:solidFill>
+          <a:prstDash val="solid"/>
+          <a:miter lim="800000"/>
+        </a:ln>
+      </a:lnStyleLst>
+      <a:effectStyleLst>
+        <a:effectStyle>
+          <a:effectLst/>
+        </a:effectStyle>
+        <a:effectStyle>
+          <a:effectLst/>
+        </a:effectStyle>
+        <a:effectStyle>
+          <a:effectLst>
+            <a:outerShdw blurRad="57150" dist="19050" dir="5400000" algn="ctr" rotWithShape="0">
+              <a:srgbClr val="000000">
+                <a:alpha val="63000"/>
+              </a:srgbClr>
+            </a:outerShdw>
+          </a:effectLst>
+        </a:effectStyle>
+      </a:effectStyleLst>
+      <a:bgFillStyleLst>
+        <a:solidFill>
+          <a:schemeClr val="phClr"/>
+        </a:solidFill>
+        <a:solidFill>
+          <a:schemeClr val="phClr">
+            <a:tint val="95000"/>
+            <a:satMod val="170000"/>
+          </a:schemeClr>
+        </a:solidFill>
+        <a:gradFill rotWithShape="1">
+          <a:gsLst>
+            <a:gs pos="0">
+              <a:schemeClr val="phClr">
+                <a:tint val="93000"/>
+                <a:satMod val="150000"/>
+                <a:shade val="98000"/>
+                <a:lumMod val="102000"/>
+              </a:schemeClr>
+            </a:gs>
+            <a:gs pos="50000">
+              <a:schemeClr val="phClr">
+                <a:tint val="98000"/>
+                <a:satMod val="130000"/>
+                <a:shade val="90000"/>
+                <a:lumMod val="103000"/>
+              </a:schemeClr>
+            </a:gs>
+            <a:gs pos="100000">
+              <a:schemeClr val="phClr">
+                <a:shade val="63000"/>
+                <a:satMod val="120000"/>
+              </a:schemeClr>
+            </a:gs>
+          </a:gsLst>
+          <a:lin ang="5400000" scaled="0"/>
+        </a:gradFill>
+      </a:bgFillStyleLst>
+    </a:fmtScheme>
+  </a:themeElements>
+  <a:objectDefaults/>
+  <a:extraClrSchemeLst/>
+  <a:extLst>
+    <a:ext uri="{05A4C25C-085E-4340-85A3-A5531E510DB2}">
+      <thm15:themeFamily xmlns:thm15="http://schemas.microsoft.com/office/thememl/2012/main" name="Office Theme" id="{62F939B6-93AF-4DB8-9C6B-D6C7DFDC589F}" vid="{4A3C46E8-61CC-4603-A589-7422A47A8E4A}"/>
+    </a:ext>
+  </a:extLst>
+</a:theme>
 </file>
</xml_diff>

<commit_message>
Add slides on code organization and ecosystem
</commit_message>
<xml_diff>
--- a/Julia,_good_back_ugly.pptx
+++ b/Julia,_good_back_ugly.pptx
@@ -5,7 +5,7 @@
     <p:sldMasterId id="2147483648" r:id="rId1"/>
   </p:sldMasterIdLst>
   <p:notesMasterIdLst>
-    <p:notesMasterId r:id="rId43"/>
+    <p:notesMasterId r:id="rId45"/>
   </p:notesMasterIdLst>
   <p:sldIdLst>
     <p:sldId id="256" r:id="rId2"/>
@@ -47,8 +47,10 @@
     <p:sldId id="291" r:id="rId38"/>
     <p:sldId id="281" r:id="rId39"/>
     <p:sldId id="292" r:id="rId40"/>
-    <p:sldId id="273" r:id="rId41"/>
-    <p:sldId id="274" r:id="rId42"/>
+    <p:sldId id="298" r:id="rId41"/>
+    <p:sldId id="273" r:id="rId42"/>
+    <p:sldId id="299" r:id="rId43"/>
+    <p:sldId id="274" r:id="rId44"/>
   </p:sldIdLst>
   <p:sldSz cx="12192000" cy="6858000"/>
   <p:notesSz cx="6858000" cy="9144000"/>
@@ -237,7 +239,7 @@
           <a:p>
             <a:fld id="{CC9F3EF1-84A5-42B0-81FF-8805AF740E8D}" type="datetimeFigureOut">
               <a:rPr lang="en-US" smtClean="0"/>
-              <a:t>2021-07-05</a:t>
+              <a:t>2021-07-12</a:t>
             </a:fld>
             <a:endParaRPr lang="en-US"/>
           </a:p>
@@ -651,7 +653,7 @@
           <a:p>
             <a:fld id="{0D45F18C-3E18-466F-8ADF-516304A44708}" type="datetime1">
               <a:rPr lang="en-US" smtClean="0"/>
-              <a:t>2021-07-05</a:t>
+              <a:t>2021-07-12</a:t>
             </a:fld>
             <a:endParaRPr lang="en-US"/>
           </a:p>
@@ -849,7 +851,7 @@
           <a:p>
             <a:fld id="{D5980222-6813-4CA6-84DC-753D8B88D809}" type="datetime1">
               <a:rPr lang="en-US" smtClean="0"/>
-              <a:t>2021-07-05</a:t>
+              <a:t>2021-07-12</a:t>
             </a:fld>
             <a:endParaRPr lang="en-US"/>
           </a:p>
@@ -1057,7 +1059,7 @@
           <a:p>
             <a:fld id="{96F7B8FF-A661-4CB7-BF06-F03D9C89262B}" type="datetime1">
               <a:rPr lang="en-US" smtClean="0"/>
-              <a:t>2021-07-05</a:t>
+              <a:t>2021-07-12</a:t>
             </a:fld>
             <a:endParaRPr lang="en-US"/>
           </a:p>
@@ -1255,7 +1257,7 @@
           <a:p>
             <a:fld id="{CE4E165D-6495-4D37-B27D-5DB6761319B2}" type="datetime1">
               <a:rPr lang="en-US" smtClean="0"/>
-              <a:t>2021-07-05</a:t>
+              <a:t>2021-07-12</a:t>
             </a:fld>
             <a:endParaRPr lang="en-US"/>
           </a:p>
@@ -1530,7 +1532,7 @@
           <a:p>
             <a:fld id="{579D02C7-69E9-4C82-8F80-CB6196DA722C}" type="datetime1">
               <a:rPr lang="en-US" smtClean="0"/>
-              <a:t>2021-07-05</a:t>
+              <a:t>2021-07-12</a:t>
             </a:fld>
             <a:endParaRPr lang="en-US"/>
           </a:p>
@@ -1795,7 +1797,7 @@
           <a:p>
             <a:fld id="{107E8C2C-E058-49BD-9DFF-244106208F3B}" type="datetime1">
               <a:rPr lang="en-US" smtClean="0"/>
-              <a:t>2021-07-05</a:t>
+              <a:t>2021-07-12</a:t>
             </a:fld>
             <a:endParaRPr lang="en-US"/>
           </a:p>
@@ -2207,7 +2209,7 @@
           <a:p>
             <a:fld id="{EBBE2EFD-4DA5-4354-BB09-551207F90777}" type="datetime1">
               <a:rPr lang="en-US" smtClean="0"/>
-              <a:t>2021-07-05</a:t>
+              <a:t>2021-07-12</a:t>
             </a:fld>
             <a:endParaRPr lang="en-US"/>
           </a:p>
@@ -2348,7 +2350,7 @@
           <a:p>
             <a:fld id="{0357F3B6-5D5B-4F6A-8ABC-6500847F3284}" type="datetime1">
               <a:rPr lang="en-US" smtClean="0"/>
-              <a:t>2021-07-05</a:t>
+              <a:t>2021-07-12</a:t>
             </a:fld>
             <a:endParaRPr lang="en-US"/>
           </a:p>
@@ -2461,7 +2463,7 @@
           <a:p>
             <a:fld id="{470EE9C1-5D95-4DE1-8B8E-CE731554AA23}" type="datetime1">
               <a:rPr lang="en-US" smtClean="0"/>
-              <a:t>2021-07-05</a:t>
+              <a:t>2021-07-12</a:t>
             </a:fld>
             <a:endParaRPr lang="en-US"/>
           </a:p>
@@ -2772,7 +2774,7 @@
           <a:p>
             <a:fld id="{ED4A0E8D-A460-4018-89F2-1FF6F9205C86}" type="datetime1">
               <a:rPr lang="en-US" smtClean="0"/>
-              <a:t>2021-07-05</a:t>
+              <a:t>2021-07-12</a:t>
             </a:fld>
             <a:endParaRPr lang="en-US"/>
           </a:p>
@@ -3060,7 +3062,7 @@
           <a:p>
             <a:fld id="{74076E25-3B53-45C6-AE55-8E3CC5E53EDE}" type="datetime1">
               <a:rPr lang="en-US" smtClean="0"/>
-              <a:t>2021-07-05</a:t>
+              <a:t>2021-07-12</a:t>
             </a:fld>
             <a:endParaRPr lang="en-US"/>
           </a:p>
@@ -3301,7 +3303,7 @@
           <a:p>
             <a:fld id="{3B0E2389-F93F-49F3-A6AD-79A456A600D1}" type="datetime1">
               <a:rPr lang="en-US" smtClean="0"/>
-              <a:t>2021-07-05</a:t>
+              <a:t>2021-07-12</a:t>
             </a:fld>
             <a:endParaRPr lang="en-US"/>
           </a:p>
@@ -16326,7 +16328,23 @@
           <a:bodyPr/>
           <a:lstStyle/>
           <a:p>
-            <a:endParaRPr lang="en-US"/>
+            <a:r>
+              <a:rPr lang="en-US" dirty="0"/>
+              <a:t>Minimal package </a:t>
+            </a:r>
+            <a:r>
+              <a:rPr lang="en-US" dirty="0" err="1">
+                <a:latin typeface="Consolas" panose="020B0609020204030204" pitchFamily="49" charset="0"/>
+              </a:rPr>
+              <a:t>Gcd</a:t>
+            </a:r>
+            <a:endParaRPr lang="en-US" dirty="0">
+              <a:latin typeface="Consolas" panose="020B0609020204030204" pitchFamily="49" charset="0"/>
+            </a:endParaRPr>
+          </a:p>
+          <a:p>
+            <a:pPr lvl="1"/>
+            <a:endParaRPr lang="en-US" dirty="0"/>
           </a:p>
         </p:txBody>
       </p:sp>
@@ -16356,6 +16374,327 @@
               <a:t>36</a:t>
             </a:fld>
             <a:endParaRPr lang="en-US"/>
+          </a:p>
+        </p:txBody>
+      </p:sp>
+      <p:pic>
+        <p:nvPicPr>
+          <p:cNvPr id="6" name="Picture 5">
+            <a:extLst>
+              <a:ext uri="{FF2B5EF4-FFF2-40B4-BE49-F238E27FC236}">
+                <a16:creationId xmlns:a16="http://schemas.microsoft.com/office/drawing/2014/main" id="{81586ECD-7D08-460B-959E-FA6E06707932}"/>
+              </a:ext>
+            </a:extLst>
+          </p:cNvPr>
+          <p:cNvPicPr>
+            <a:picLocks noChangeAspect="1"/>
+          </p:cNvPicPr>
+          <p:nvPr/>
+        </p:nvPicPr>
+        <p:blipFill>
+          <a:blip r:embed="rId2"/>
+          <a:stretch>
+            <a:fillRect/>
+          </a:stretch>
+        </p:blipFill>
+        <p:spPr>
+          <a:xfrm>
+            <a:off x="1492464" y="3536606"/>
+            <a:ext cx="2305176" cy="1208230"/>
+          </a:xfrm>
+          <a:prstGeom prst="rect">
+            <a:avLst/>
+          </a:prstGeom>
+        </p:spPr>
+      </p:pic>
+      <p:grpSp>
+        <p:nvGrpSpPr>
+          <p:cNvPr id="7" name="Group 6">
+            <a:extLst>
+              <a:ext uri="{FF2B5EF4-FFF2-40B4-BE49-F238E27FC236}">
+                <a16:creationId xmlns:a16="http://schemas.microsoft.com/office/drawing/2014/main" id="{FABA1504-2F36-4CD8-B7C1-ABB5958246C4}"/>
+              </a:ext>
+            </a:extLst>
+          </p:cNvPr>
+          <p:cNvGrpSpPr/>
+          <p:nvPr/>
+        </p:nvGrpSpPr>
+        <p:grpSpPr>
+          <a:xfrm>
+            <a:off x="4624557" y="3536606"/>
+            <a:ext cx="7122600" cy="1200329"/>
+            <a:chOff x="838200" y="2455198"/>
+            <a:chExt cx="7122600" cy="1200329"/>
+          </a:xfrm>
+        </p:grpSpPr>
+        <p:sp>
+          <p:nvSpPr>
+            <p:cNvPr id="8" name="TextBox 7">
+              <a:extLst>
+                <a:ext uri="{FF2B5EF4-FFF2-40B4-BE49-F238E27FC236}">
+                  <a16:creationId xmlns:a16="http://schemas.microsoft.com/office/drawing/2014/main" id="{CA88DB7D-1186-4B6B-B509-84E8EFC9F006}"/>
+                </a:ext>
+              </a:extLst>
+            </p:cNvPr>
+            <p:cNvSpPr txBox="1"/>
+            <p:nvPr/>
+          </p:nvSpPr>
+          <p:spPr>
+            <a:xfrm>
+              <a:off x="838200" y="2455198"/>
+              <a:ext cx="7122600" cy="1200329"/>
+            </a:xfrm>
+            <a:prstGeom prst="rect">
+              <a:avLst/>
+            </a:prstGeom>
+            <a:solidFill>
+              <a:schemeClr val="bg1">
+                <a:lumMod val="85000"/>
+              </a:schemeClr>
+            </a:solidFill>
+          </p:spPr>
+          <p:txBody>
+            <a:bodyPr wrap="square" rtlCol="0">
+              <a:spAutoFit/>
+            </a:bodyPr>
+            <a:lstStyle/>
+            <a:p>
+              <a:r>
+                <a:rPr lang="en-US" dirty="0">
+                  <a:latin typeface="Consolas" panose="020B0609020204030204" pitchFamily="49" charset="0"/>
+                </a:rPr>
+                <a:t>name = "</a:t>
+              </a:r>
+              <a:r>
+                <a:rPr lang="en-US" dirty="0" err="1">
+                  <a:latin typeface="Consolas" panose="020B0609020204030204" pitchFamily="49" charset="0"/>
+                </a:rPr>
+                <a:t>Gcd</a:t>
+              </a:r>
+              <a:r>
+                <a:rPr lang="en-US" dirty="0">
+                  <a:latin typeface="Consolas" panose="020B0609020204030204" pitchFamily="49" charset="0"/>
+                </a:rPr>
+                <a:t>"</a:t>
+              </a:r>
+            </a:p>
+            <a:p>
+              <a:r>
+                <a:rPr lang="en-US" dirty="0" err="1">
+                  <a:latin typeface="Consolas" panose="020B0609020204030204" pitchFamily="49" charset="0"/>
+                </a:rPr>
+                <a:t>uuid</a:t>
+              </a:r>
+              <a:r>
+                <a:rPr lang="en-US" dirty="0">
+                  <a:latin typeface="Consolas" panose="020B0609020204030204" pitchFamily="49" charset="0"/>
+                </a:rPr>
+                <a:t> = "6101a580-870c-4971-a759-bb25a2f00590"</a:t>
+              </a:r>
+            </a:p>
+            <a:p>
+              <a:r>
+                <a:rPr lang="en-US" dirty="0">
+                  <a:latin typeface="Consolas" panose="020B0609020204030204" pitchFamily="49" charset="0"/>
+                </a:rPr>
+                <a:t>authors = ["Geert Jan Bex &lt;geertjan.bex@uhasselt.be&gt;"]</a:t>
+              </a:r>
+            </a:p>
+            <a:p>
+              <a:r>
+                <a:rPr lang="en-US" dirty="0">
+                  <a:latin typeface="Consolas" panose="020B0609020204030204" pitchFamily="49" charset="0"/>
+                </a:rPr>
+                <a:t>version = "0.1.0"</a:t>
+              </a:r>
+            </a:p>
+          </p:txBody>
+        </p:sp>
+        <p:sp>
+          <p:nvSpPr>
+            <p:cNvPr id="9" name="TextBox 8">
+              <a:extLst>
+                <a:ext uri="{FF2B5EF4-FFF2-40B4-BE49-F238E27FC236}">
+                  <a16:creationId xmlns:a16="http://schemas.microsoft.com/office/drawing/2014/main" id="{EDE038DF-3332-4C06-ADCC-AB3BFD0EC7E4}"/>
+                </a:ext>
+              </a:extLst>
+            </p:cNvPr>
+            <p:cNvSpPr txBox="1"/>
+            <p:nvPr/>
+          </p:nvSpPr>
+          <p:spPr>
+            <a:xfrm>
+              <a:off x="6939367" y="3393917"/>
+              <a:ext cx="1021433" cy="261610"/>
+            </a:xfrm>
+            <a:prstGeom prst="rect">
+              <a:avLst/>
+            </a:prstGeom>
+            <a:solidFill>
+              <a:schemeClr val="bg1"/>
+            </a:solidFill>
+            <a:ln>
+              <a:solidFill>
+                <a:schemeClr val="tx1"/>
+              </a:solidFill>
+            </a:ln>
+          </p:spPr>
+          <p:txBody>
+            <a:bodyPr wrap="none" rtlCol="0">
+              <a:spAutoFit/>
+            </a:bodyPr>
+            <a:lstStyle/>
+            <a:p>
+              <a:r>
+                <a:rPr lang="en-US" sz="1100" dirty="0" err="1"/>
+                <a:t>MyFunctions.jl</a:t>
+              </a:r>
+              <a:endParaRPr lang="en-US" sz="1100" dirty="0"/>
+            </a:p>
+          </p:txBody>
+        </p:sp>
+      </p:grpSp>
+      <p:sp>
+        <p:nvSpPr>
+          <p:cNvPr id="10" name="TextBox 9">
+            <a:extLst>
+              <a:ext uri="{FF2B5EF4-FFF2-40B4-BE49-F238E27FC236}">
+                <a16:creationId xmlns:a16="http://schemas.microsoft.com/office/drawing/2014/main" id="{93D8DF2F-DAD4-45C9-BE67-1101395542A5}"/>
+              </a:ext>
+            </a:extLst>
+          </p:cNvPr>
+          <p:cNvSpPr txBox="1"/>
+          <p:nvPr/>
+        </p:nvSpPr>
+        <p:spPr>
+          <a:xfrm>
+            <a:off x="1492463" y="2496450"/>
+            <a:ext cx="2305172" cy="369332"/>
+          </a:xfrm>
+          <a:prstGeom prst="rect">
+            <a:avLst/>
+          </a:prstGeom>
+          <a:solidFill>
+            <a:schemeClr val="tx1"/>
+          </a:solidFill>
+        </p:spPr>
+        <p:txBody>
+          <a:bodyPr wrap="square" rtlCol="0">
+            <a:spAutoFit/>
+          </a:bodyPr>
+          <a:lstStyle/>
+          <a:p>
+            <a:r>
+              <a:rPr lang="en-US" b="1" dirty="0">
+                <a:solidFill>
+                  <a:schemeClr val="bg1"/>
+                </a:solidFill>
+              </a:rPr>
+              <a:t>pkg&gt; generate </a:t>
+            </a:r>
+            <a:r>
+              <a:rPr lang="en-US" b="1" dirty="0" err="1">
+                <a:solidFill>
+                  <a:schemeClr val="bg1"/>
+                </a:solidFill>
+              </a:rPr>
+              <a:t>Gcd</a:t>
+            </a:r>
+            <a:endParaRPr lang="en-US" b="1" dirty="0">
+              <a:solidFill>
+                <a:schemeClr val="bg1"/>
+              </a:solidFill>
+            </a:endParaRPr>
+          </a:p>
+        </p:txBody>
+      </p:sp>
+      <p:cxnSp>
+        <p:nvCxnSpPr>
+          <p:cNvPr id="11" name="Straight Arrow Connector 10">
+            <a:extLst>
+              <a:ext uri="{FF2B5EF4-FFF2-40B4-BE49-F238E27FC236}">
+                <a16:creationId xmlns:a16="http://schemas.microsoft.com/office/drawing/2014/main" id="{54D693ED-BB43-4463-A5C9-FC7AD066AF1A}"/>
+              </a:ext>
+            </a:extLst>
+          </p:cNvPr>
+          <p:cNvCxnSpPr>
+            <a:cxnSpLocks/>
+          </p:cNvCxnSpPr>
+          <p:nvPr/>
+        </p:nvCxnSpPr>
+        <p:spPr>
+          <a:xfrm rot="5400000">
+            <a:off x="2569856" y="3179122"/>
+            <a:ext cx="395417" cy="0"/>
+          </a:xfrm>
+          <a:prstGeom prst="straightConnector1">
+            <a:avLst/>
+          </a:prstGeom>
+          <a:ln w="38100">
+            <a:solidFill>
+              <a:schemeClr val="tx1"/>
+            </a:solidFill>
+            <a:tailEnd type="stealth" w="lg" len="lg"/>
+          </a:ln>
+        </p:spPr>
+        <p:style>
+          <a:lnRef idx="1">
+            <a:schemeClr val="accent1"/>
+          </a:lnRef>
+          <a:fillRef idx="0">
+            <a:schemeClr val="accent1"/>
+          </a:fillRef>
+          <a:effectRef idx="0">
+            <a:schemeClr val="accent1"/>
+          </a:effectRef>
+          <a:fontRef idx="minor">
+            <a:schemeClr val="tx1"/>
+          </a:fontRef>
+        </p:style>
+      </p:cxnSp>
+      <p:sp>
+        <p:nvSpPr>
+          <p:cNvPr id="12" name="TextBox 11">
+            <a:extLst>
+              <a:ext uri="{FF2B5EF4-FFF2-40B4-BE49-F238E27FC236}">
+                <a16:creationId xmlns:a16="http://schemas.microsoft.com/office/drawing/2014/main" id="{FF705B03-BE6A-4F88-A45C-E7D83A8B84D0}"/>
+              </a:ext>
+            </a:extLst>
+          </p:cNvPr>
+          <p:cNvSpPr txBox="1"/>
+          <p:nvPr/>
+        </p:nvSpPr>
+        <p:spPr>
+          <a:xfrm>
+            <a:off x="3534032" y="5410782"/>
+            <a:ext cx="5525936" cy="369332"/>
+          </a:xfrm>
+          <a:prstGeom prst="rect">
+            <a:avLst/>
+          </a:prstGeom>
+          <a:noFill/>
+          <a:ln>
+            <a:solidFill>
+              <a:schemeClr val="tx1"/>
+            </a:solidFill>
+          </a:ln>
+        </p:spPr>
+        <p:txBody>
+          <a:bodyPr wrap="none" rtlCol="0">
+            <a:spAutoFit/>
+          </a:bodyPr>
+          <a:lstStyle/>
+          <a:p>
+            <a:r>
+              <a:rPr lang="en-US" dirty="0"/>
+              <a:t>Ensure project parent directory is in </a:t>
+            </a:r>
+            <a:r>
+              <a:rPr lang="en-US" dirty="0">
+                <a:latin typeface="Consolas" panose="020B0609020204030204" pitchFamily="49" charset="0"/>
+              </a:rPr>
+              <a:t>JULIA_LOAD_PATH</a:t>
+            </a:r>
           </a:p>
         </p:txBody>
       </p:sp>
@@ -16438,7 +16777,10 @@
           <a:bodyPr/>
           <a:lstStyle/>
           <a:p>
-            <a:endParaRPr lang="en-US"/>
+            <a:r>
+              <a:rPr lang="en-US" dirty="0"/>
+              <a:t>Functions &amp; methods</a:t>
+            </a:r>
           </a:p>
         </p:txBody>
       </p:sp>
@@ -16471,6 +16813,325 @@
           </a:p>
         </p:txBody>
       </p:sp>
+      <p:sp>
+        <p:nvSpPr>
+          <p:cNvPr id="5" name="TextBox 4">
+            <a:extLst>
+              <a:ext uri="{FF2B5EF4-FFF2-40B4-BE49-F238E27FC236}">
+                <a16:creationId xmlns:a16="http://schemas.microsoft.com/office/drawing/2014/main" id="{A2004BB7-C085-449A-B01B-129DE79CF223}"/>
+              </a:ext>
+            </a:extLst>
+          </p:cNvPr>
+          <p:cNvSpPr txBox="1"/>
+          <p:nvPr/>
+        </p:nvSpPr>
+        <p:spPr>
+          <a:xfrm>
+            <a:off x="838200" y="2325001"/>
+            <a:ext cx="6122773" cy="4339650"/>
+          </a:xfrm>
+          <a:prstGeom prst="rect">
+            <a:avLst/>
+          </a:prstGeom>
+          <a:solidFill>
+            <a:schemeClr val="bg1">
+              <a:lumMod val="85000"/>
+            </a:schemeClr>
+          </a:solidFill>
+        </p:spPr>
+        <p:txBody>
+          <a:bodyPr wrap="square" rtlCol="0">
+            <a:spAutoFit/>
+          </a:bodyPr>
+          <a:lstStyle/>
+          <a:p>
+            <a:r>
+              <a:rPr lang="en-US" sz="1200" dirty="0">
+                <a:latin typeface="Consolas" panose="020B0609020204030204" pitchFamily="49" charset="0"/>
+              </a:rPr>
+              <a:t>"""</a:t>
+            </a:r>
+          </a:p>
+          <a:p>
+            <a:r>
+              <a:rPr lang="en-US" sz="1200" dirty="0">
+                <a:latin typeface="Consolas" panose="020B0609020204030204" pitchFamily="49" charset="0"/>
+              </a:rPr>
+              <a:t>   </a:t>
+            </a:r>
+            <a:r>
+              <a:rPr lang="en-US" sz="1200" dirty="0" err="1">
+                <a:latin typeface="Consolas" panose="020B0609020204030204" pitchFamily="49" charset="0"/>
+              </a:rPr>
+              <a:t>my_gcd</a:t>
+            </a:r>
+            <a:r>
+              <a:rPr lang="en-US" sz="1200" dirty="0">
+                <a:latin typeface="Consolas" panose="020B0609020204030204" pitchFamily="49" charset="0"/>
+              </a:rPr>
+              <a:t>(a, b)</a:t>
+            </a:r>
+          </a:p>
+          <a:p>
+            <a:endParaRPr lang="en-US" sz="1200" dirty="0">
+              <a:latin typeface="Consolas" panose="020B0609020204030204" pitchFamily="49" charset="0"/>
+            </a:endParaRPr>
+          </a:p>
+          <a:p>
+            <a:r>
+              <a:rPr lang="en-US" sz="1200" dirty="0">
+                <a:latin typeface="Consolas" panose="020B0609020204030204" pitchFamily="49" charset="0"/>
+              </a:rPr>
+              <a:t>Compute the greatest common divisor of a and b</a:t>
+            </a:r>
+          </a:p>
+          <a:p>
+            <a:endParaRPr lang="en-US" sz="1200" dirty="0">
+              <a:latin typeface="Consolas" panose="020B0609020204030204" pitchFamily="49" charset="0"/>
+            </a:endParaRPr>
+          </a:p>
+          <a:p>
+            <a:r>
+              <a:rPr lang="en-US" sz="1200" dirty="0">
+                <a:latin typeface="Consolas" panose="020B0609020204030204" pitchFamily="49" charset="0"/>
+              </a:rPr>
+              <a:t># Arguments</a:t>
+            </a:r>
+          </a:p>
+          <a:p>
+            <a:pPr marL="285750" indent="-285750">
+              <a:buFontTx/>
+              <a:buChar char="-"/>
+            </a:pPr>
+            <a:r>
+              <a:rPr lang="en-US" sz="1200" dirty="0">
+                <a:latin typeface="Consolas" panose="020B0609020204030204" pitchFamily="49" charset="0"/>
+              </a:rPr>
+              <a:t>`a::Integer`: first argument, not</a:t>
+            </a:r>
+          </a:p>
+          <a:p>
+            <a:r>
+              <a:rPr lang="en-US" sz="1200" dirty="0">
+                <a:latin typeface="Consolas" panose="020B0609020204030204" pitchFamily="49" charset="0"/>
+              </a:rPr>
+              <a:t>   required in real life documentation</a:t>
+            </a:r>
+          </a:p>
+          <a:p>
+            <a:pPr marL="285750" indent="-285750">
+              <a:buFontTx/>
+              <a:buChar char="-"/>
+            </a:pPr>
+            <a:r>
+              <a:rPr lang="en-US" sz="1200" dirty="0">
+                <a:latin typeface="Consolas" panose="020B0609020204030204" pitchFamily="49" charset="0"/>
+              </a:rPr>
+              <a:t>…</a:t>
+            </a:r>
+          </a:p>
+          <a:p>
+            <a:endParaRPr lang="en-US" sz="1200" dirty="0">
+              <a:latin typeface="Consolas" panose="020B0609020204030204" pitchFamily="49" charset="0"/>
+            </a:endParaRPr>
+          </a:p>
+          <a:p>
+            <a:r>
+              <a:rPr lang="en-US" sz="1200" dirty="0">
+                <a:latin typeface="Consolas" panose="020B0609020204030204" pitchFamily="49" charset="0"/>
+              </a:rPr>
+              <a:t>Both arguments should be strictly positive, otherwise a `</a:t>
+            </a:r>
+            <a:r>
+              <a:rPr lang="en-US" sz="1200" dirty="0" err="1">
+                <a:latin typeface="Consolas" panose="020B0609020204030204" pitchFamily="49" charset="0"/>
+              </a:rPr>
+              <a:t>DomaiunErr</a:t>
+            </a:r>
+            <a:r>
+              <a:rPr lang="en-US" sz="1200" dirty="0">
+                <a:latin typeface="Consolas" panose="020B0609020204030204" pitchFamily="49" charset="0"/>
+              </a:rPr>
+              <a:t>` exception will be thrown.</a:t>
+            </a:r>
+          </a:p>
+          <a:p>
+            <a:endParaRPr lang="en-US" sz="1200" dirty="0">
+              <a:latin typeface="Consolas" panose="020B0609020204030204" pitchFamily="49" charset="0"/>
+            </a:endParaRPr>
+          </a:p>
+          <a:p>
+            <a:r>
+              <a:rPr lang="en-US" sz="1200" dirty="0">
+                <a:latin typeface="Consolas" panose="020B0609020204030204" pitchFamily="49" charset="0"/>
+              </a:rPr>
+              <a:t># Examples</a:t>
+            </a:r>
+          </a:p>
+          <a:p>
+            <a:endParaRPr lang="en-US" sz="1200" dirty="0">
+              <a:latin typeface="Consolas" panose="020B0609020204030204" pitchFamily="49" charset="0"/>
+            </a:endParaRPr>
+          </a:p>
+          <a:p>
+            <a:r>
+              <a:rPr lang="en-US" sz="1200" dirty="0">
+                <a:latin typeface="Consolas" panose="020B0609020204030204" pitchFamily="49" charset="0"/>
+              </a:rPr>
+              <a:t>```</a:t>
+            </a:r>
+            <a:r>
+              <a:rPr lang="en-US" sz="1200" dirty="0" err="1">
+                <a:latin typeface="Consolas" panose="020B0609020204030204" pitchFamily="49" charset="0"/>
+              </a:rPr>
+              <a:t>julia-repl</a:t>
+            </a:r>
+            <a:endParaRPr lang="en-US" sz="1200" dirty="0">
+              <a:latin typeface="Consolas" panose="020B0609020204030204" pitchFamily="49" charset="0"/>
+            </a:endParaRPr>
+          </a:p>
+          <a:p>
+            <a:r>
+              <a:rPr lang="en-US" sz="1200" dirty="0" err="1">
+                <a:latin typeface="Consolas" panose="020B0609020204030204" pitchFamily="49" charset="0"/>
+              </a:rPr>
+              <a:t>julia</a:t>
+            </a:r>
+            <a:r>
+              <a:rPr lang="en-US" sz="1200" dirty="0">
+                <a:latin typeface="Consolas" panose="020B0609020204030204" pitchFamily="49" charset="0"/>
+              </a:rPr>
+              <a:t>&gt; </a:t>
+            </a:r>
+            <a:r>
+              <a:rPr lang="en-US" sz="1200" dirty="0" err="1">
+                <a:latin typeface="Consolas" panose="020B0609020204030204" pitchFamily="49" charset="0"/>
+              </a:rPr>
+              <a:t>my_gcd</a:t>
+            </a:r>
+            <a:r>
+              <a:rPr lang="en-US" sz="1200" dirty="0">
+                <a:latin typeface="Consolas" panose="020B0609020204030204" pitchFamily="49" charset="0"/>
+              </a:rPr>
+              <a:t>(12, 15)</a:t>
+            </a:r>
+          </a:p>
+          <a:p>
+            <a:r>
+              <a:rPr lang="en-US" sz="1200" dirty="0">
+                <a:latin typeface="Consolas" panose="020B0609020204030204" pitchFamily="49" charset="0"/>
+              </a:rPr>
+              <a:t>3</a:t>
+            </a:r>
+          </a:p>
+          <a:p>
+            <a:r>
+              <a:rPr lang="en-US" sz="1200" dirty="0" err="1">
+                <a:latin typeface="Consolas" panose="020B0609020204030204" pitchFamily="49" charset="0"/>
+              </a:rPr>
+              <a:t>julia</a:t>
+            </a:r>
+            <a:r>
+              <a:rPr lang="en-US" sz="1200" dirty="0">
+                <a:latin typeface="Consolas" panose="020B0609020204030204" pitchFamily="49" charset="0"/>
+              </a:rPr>
+              <a:t>&gt; </a:t>
+            </a:r>
+            <a:r>
+              <a:rPr lang="en-US" sz="1200" dirty="0" err="1">
+                <a:latin typeface="Consolas" panose="020B0609020204030204" pitchFamily="49" charset="0"/>
+              </a:rPr>
+              <a:t>my_gcd</a:t>
+            </a:r>
+            <a:r>
+              <a:rPr lang="en-US" sz="1200" dirty="0">
+                <a:latin typeface="Consolas" panose="020B0609020204030204" pitchFamily="49" charset="0"/>
+              </a:rPr>
+              <a:t>(13, 11)</a:t>
+            </a:r>
+          </a:p>
+          <a:p>
+            <a:r>
+              <a:rPr lang="en-US" sz="1200" dirty="0">
+                <a:latin typeface="Consolas" panose="020B0609020204030204" pitchFamily="49" charset="0"/>
+              </a:rPr>
+              <a:t>1</a:t>
+            </a:r>
+          </a:p>
+          <a:p>
+            <a:r>
+              <a:rPr lang="en-US" sz="1200" dirty="0">
+                <a:latin typeface="Consolas" panose="020B0609020204030204" pitchFamily="49" charset="0"/>
+              </a:rPr>
+              <a:t>```</a:t>
+            </a:r>
+          </a:p>
+          <a:p>
+            <a:r>
+              <a:rPr lang="en-US" sz="1200" dirty="0">
+                <a:latin typeface="Consolas" panose="020B0609020204030204" pitchFamily="49" charset="0"/>
+              </a:rPr>
+              <a:t>"""</a:t>
+            </a:r>
+          </a:p>
+          <a:p>
+            <a:r>
+              <a:rPr lang="en-US" sz="1200" dirty="0">
+                <a:latin typeface="Consolas" panose="020B0609020204030204" pitchFamily="49" charset="0"/>
+              </a:rPr>
+              <a:t>function </a:t>
+            </a:r>
+            <a:r>
+              <a:rPr lang="en-US" sz="1200" dirty="0" err="1">
+                <a:latin typeface="Consolas" panose="020B0609020204030204" pitchFamily="49" charset="0"/>
+              </a:rPr>
+              <a:t>my_gcd</a:t>
+            </a:r>
+            <a:r>
+              <a:rPr lang="en-US" sz="1200" dirty="0">
+                <a:latin typeface="Consolas" panose="020B0609020204030204" pitchFamily="49" charset="0"/>
+              </a:rPr>
+              <a:t>(a::Integer, b::Integer)</a:t>
+            </a:r>
+          </a:p>
+        </p:txBody>
+      </p:sp>
+      <p:pic>
+        <p:nvPicPr>
+          <p:cNvPr id="7" name="Picture 6" descr="Text&#10;&#10;Description automatically generated">
+            <a:extLst>
+              <a:ext uri="{FF2B5EF4-FFF2-40B4-BE49-F238E27FC236}">
+                <a16:creationId xmlns:a16="http://schemas.microsoft.com/office/drawing/2014/main" id="{74A2B296-F03A-4D1D-91C4-528BE2F95297}"/>
+              </a:ext>
+            </a:extLst>
+          </p:cNvPr>
+          <p:cNvPicPr>
+            <a:picLocks noChangeAspect="1"/>
+          </p:cNvPicPr>
+          <p:nvPr/>
+        </p:nvPicPr>
+        <p:blipFill>
+          <a:blip r:embed="rId2">
+            <a:extLst>
+              <a:ext uri="{28A0092B-C50C-407E-A947-70E740481C1C}">
+                <a14:useLocalDpi xmlns:a14="http://schemas.microsoft.com/office/drawing/2010/main" val="0"/>
+              </a:ext>
+            </a:extLst>
+          </a:blip>
+          <a:stretch>
+            <a:fillRect/>
+          </a:stretch>
+        </p:blipFill>
+        <p:spPr>
+          <a:xfrm>
+            <a:off x="7032196" y="2325001"/>
+            <a:ext cx="5040613" cy="3672145"/>
+          </a:xfrm>
+          <a:prstGeom prst="rect">
+            <a:avLst/>
+          </a:prstGeom>
+        </p:spPr>
+      </p:pic>
     </p:spTree>
     <p:extLst>
       <p:ext uri="{BB962C8B-B14F-4D97-AF65-F5344CB8AC3E}">
@@ -16662,7 +17323,40 @@
           <a:bodyPr/>
           <a:lstStyle/>
           <a:p>
-            <a:endParaRPr lang="en-US"/>
+            <a:r>
+              <a:rPr lang="en-US" dirty="0"/>
+              <a:t>Package &amp; environment handling: Pkg</a:t>
+            </a:r>
+          </a:p>
+          <a:p>
+            <a:r>
+              <a:rPr lang="en-US" dirty="0"/>
+              <a:t>Text formatting: </a:t>
+            </a:r>
+            <a:r>
+              <a:rPr lang="en-US" dirty="0" err="1"/>
+              <a:t>Printf</a:t>
+            </a:r>
+            <a:endParaRPr lang="en-US" dirty="0"/>
+          </a:p>
+          <a:p>
+            <a:r>
+              <a:rPr lang="en-US" dirty="0"/>
+              <a:t>Delimited text I/O: </a:t>
+            </a:r>
+            <a:r>
+              <a:rPr lang="en-US" dirty="0" err="1">
+                <a:latin typeface="Consolas" panose="020B0609020204030204" pitchFamily="49" charset="0"/>
+              </a:rPr>
+              <a:t>DelimitedFiles</a:t>
+            </a:r>
+            <a:endParaRPr lang="en-US" dirty="0"/>
+          </a:p>
+          <a:p>
+            <a:r>
+              <a:rPr lang="en-US" dirty="0"/>
+              <a:t>Lazy iterators: Iterations</a:t>
+            </a:r>
           </a:p>
         </p:txBody>
       </p:sp>
@@ -17359,7 +18053,7 @@
           <p:cNvPr id="2" name="Title 1">
             <a:extLst>
               <a:ext uri="{FF2B5EF4-FFF2-40B4-BE49-F238E27FC236}">
-                <a16:creationId xmlns:a16="http://schemas.microsoft.com/office/drawing/2014/main" id="{6307D81E-EFAF-4436-B73E-E939260CBB19}"/>
+                <a16:creationId xmlns:a16="http://schemas.microsoft.com/office/drawing/2014/main" id="{DF7A093F-DE92-4279-A40E-C263CD196ACF}"/>
               </a:ext>
             </a:extLst>
           </p:cNvPr>
@@ -17377,17 +18071,17 @@
           <a:p>
             <a:r>
               <a:rPr lang="en-US" dirty="0"/>
-              <a:t>Conclusions</a:t>
-            </a:r>
-          </a:p>
-        </p:txBody>
-      </p:sp>
-      <p:sp>
-        <p:nvSpPr>
-          <p:cNvPr id="3" name="Text Placeholder 2">
-            <a:extLst>
-              <a:ext uri="{FF2B5EF4-FFF2-40B4-BE49-F238E27FC236}">
-                <a16:creationId xmlns:a16="http://schemas.microsoft.com/office/drawing/2014/main" id="{DC55516A-4A28-44FF-8486-3FE865D91831}"/>
+              <a:t>Third party libraries</a:t>
+            </a:r>
+          </a:p>
+        </p:txBody>
+      </p:sp>
+      <p:sp>
+        <p:nvSpPr>
+          <p:cNvPr id="3" name="Content Placeholder 2">
+            <a:extLst>
+              <a:ext uri="{FF2B5EF4-FFF2-40B4-BE49-F238E27FC236}">
+                <a16:creationId xmlns:a16="http://schemas.microsoft.com/office/drawing/2014/main" id="{CE8E01E0-98D4-45FD-97D3-B617CBB3D2A9}"/>
               </a:ext>
             </a:extLst>
           </p:cNvPr>
@@ -17395,7 +18089,7 @@
             <a:spLocks noGrp="1"/>
           </p:cNvSpPr>
           <p:nvPr>
-            <p:ph type="body" idx="1"/>
+            <p:ph idx="1"/>
           </p:nvPr>
         </p:nvSpPr>
         <p:spPr/>
@@ -17403,7 +18097,54 @@
           <a:bodyPr/>
           <a:lstStyle/>
           <a:p>
-            <a:endParaRPr lang="en-US"/>
+            <a:r>
+              <a:rPr lang="en-US" dirty="0" err="1"/>
+              <a:t>BenchmarkTools</a:t>
+            </a:r>
+            <a:r>
+              <a:rPr lang="en-US" dirty="0"/>
+              <a:t>: benchmark Julia expressions</a:t>
+            </a:r>
+          </a:p>
+          <a:p>
+            <a:r>
+              <a:rPr lang="en-US" dirty="0" err="1"/>
+              <a:t>StructArrays</a:t>
+            </a:r>
+            <a:r>
+              <a:rPr lang="en-US" dirty="0"/>
+              <a:t>: convert array of structs into </a:t>
+            </a:r>
+            <a:r>
+              <a:rPr lang="en-US" dirty="0" err="1"/>
+              <a:t>stuct</a:t>
+            </a:r>
+            <a:r>
+              <a:rPr lang="en-US" dirty="0"/>
+              <a:t> of arrays</a:t>
+            </a:r>
+          </a:p>
+          <a:p>
+            <a:r>
+              <a:rPr lang="en-US" dirty="0"/>
+              <a:t>Gadfly: plotting library</a:t>
+            </a:r>
+          </a:p>
+          <a:p>
+            <a:r>
+              <a:rPr lang="en-US" dirty="0" err="1"/>
+              <a:t>DataFrames</a:t>
+            </a:r>
+            <a:r>
+              <a:rPr lang="en-US" dirty="0"/>
+              <a:t>: data frames</a:t>
+            </a:r>
+          </a:p>
+          <a:p>
+            <a:endParaRPr lang="en-US" dirty="0"/>
+          </a:p>
+          <a:p>
+            <a:endParaRPr lang="en-US" dirty="0"/>
           </a:p>
         </p:txBody>
       </p:sp>
@@ -17412,7 +18153,7 @@
           <p:cNvPr id="4" name="Slide Number Placeholder 3">
             <a:extLst>
               <a:ext uri="{FF2B5EF4-FFF2-40B4-BE49-F238E27FC236}">
-                <a16:creationId xmlns:a16="http://schemas.microsoft.com/office/drawing/2014/main" id="{53AB6EFF-30E7-456D-BC44-A709200CEB74}"/>
+                <a16:creationId xmlns:a16="http://schemas.microsoft.com/office/drawing/2014/main" id="{7D3B20DA-82BB-48D6-A3F4-367E44817145}"/>
               </a:ext>
             </a:extLst>
           </p:cNvPr>
@@ -17439,7 +18180,7 @@
     </p:spTree>
     <p:extLst>
       <p:ext uri="{BB962C8B-B14F-4D97-AF65-F5344CB8AC3E}">
-        <p14:creationId xmlns:p14="http://schemas.microsoft.com/office/powerpoint/2010/main" val="862146666"/>
+        <p14:creationId xmlns:p14="http://schemas.microsoft.com/office/powerpoint/2010/main" val="2344193690"/>
       </p:ext>
     </p:extLst>
   </p:cSld>
@@ -17471,7 +18212,7 @@
           <p:cNvPr id="2" name="Title 1">
             <a:extLst>
               <a:ext uri="{FF2B5EF4-FFF2-40B4-BE49-F238E27FC236}">
-                <a16:creationId xmlns:a16="http://schemas.microsoft.com/office/drawing/2014/main" id="{14D02DFE-982D-454E-88FE-F58EAAD99062}"/>
+                <a16:creationId xmlns:a16="http://schemas.microsoft.com/office/drawing/2014/main" id="{6307D81E-EFAF-4436-B73E-E939260CBB19}"/>
               </a:ext>
             </a:extLst>
           </p:cNvPr>
@@ -17489,7 +18230,119 @@
           <a:p>
             <a:r>
               <a:rPr lang="en-US" dirty="0"/>
-              <a:t>References</a:t>
+              <a:t>Conclusions</a:t>
+            </a:r>
+          </a:p>
+        </p:txBody>
+      </p:sp>
+      <p:sp>
+        <p:nvSpPr>
+          <p:cNvPr id="3" name="Text Placeholder 2">
+            <a:extLst>
+              <a:ext uri="{FF2B5EF4-FFF2-40B4-BE49-F238E27FC236}">
+                <a16:creationId xmlns:a16="http://schemas.microsoft.com/office/drawing/2014/main" id="{DC55516A-4A28-44FF-8486-3FE865D91831}"/>
+              </a:ext>
+            </a:extLst>
+          </p:cNvPr>
+          <p:cNvSpPr>
+            <a:spLocks noGrp="1"/>
+          </p:cNvSpPr>
+          <p:nvPr>
+            <p:ph type="body" idx="1"/>
+          </p:nvPr>
+        </p:nvSpPr>
+        <p:spPr/>
+        <p:txBody>
+          <a:bodyPr/>
+          <a:lstStyle/>
+          <a:p>
+            <a:endParaRPr lang="en-US"/>
+          </a:p>
+        </p:txBody>
+      </p:sp>
+      <p:sp>
+        <p:nvSpPr>
+          <p:cNvPr id="4" name="Slide Number Placeholder 3">
+            <a:extLst>
+              <a:ext uri="{FF2B5EF4-FFF2-40B4-BE49-F238E27FC236}">
+                <a16:creationId xmlns:a16="http://schemas.microsoft.com/office/drawing/2014/main" id="{53AB6EFF-30E7-456D-BC44-A709200CEB74}"/>
+              </a:ext>
+            </a:extLst>
+          </p:cNvPr>
+          <p:cNvSpPr>
+            <a:spLocks noGrp="1"/>
+          </p:cNvSpPr>
+          <p:nvPr>
+            <p:ph type="sldNum" sz="quarter" idx="12"/>
+          </p:nvPr>
+        </p:nvSpPr>
+        <p:spPr/>
+        <p:txBody>
+          <a:bodyPr/>
+          <a:lstStyle/>
+          <a:p>
+            <a:fld id="{78F7A1EC-23D1-431D-8C93-9C4ED5D4A04D}" type="slidenum">
+              <a:rPr lang="en-US" smtClean="0"/>
+              <a:t>41</a:t>
+            </a:fld>
+            <a:endParaRPr lang="en-US"/>
+          </a:p>
+        </p:txBody>
+      </p:sp>
+    </p:spTree>
+    <p:extLst>
+      <p:ext uri="{BB962C8B-B14F-4D97-AF65-F5344CB8AC3E}">
+        <p14:creationId xmlns:p14="http://schemas.microsoft.com/office/powerpoint/2010/main" val="862146666"/>
+      </p:ext>
+    </p:extLst>
+  </p:cSld>
+  <p:clrMapOvr>
+    <a:masterClrMapping/>
+  </p:clrMapOvr>
+</p:sld>
+</file>
+
+<file path=ppt/slides/slide42.xml><?xml version="1.0" encoding="utf-8"?>
+<p:sld xmlns:a="http://schemas.openxmlformats.org/drawingml/2006/main" xmlns:r="http://schemas.openxmlformats.org/officeDocument/2006/relationships" xmlns:p="http://schemas.openxmlformats.org/presentationml/2006/main">
+  <p:cSld>
+    <p:spTree>
+      <p:nvGrpSpPr>
+        <p:cNvPr id="1" name=""/>
+        <p:cNvGrpSpPr/>
+        <p:nvPr/>
+      </p:nvGrpSpPr>
+      <p:grpSpPr>
+        <a:xfrm>
+          <a:off x="0" y="0"/>
+          <a:ext cx="0" cy="0"/>
+          <a:chOff x="0" y="0"/>
+          <a:chExt cx="0" cy="0"/>
+        </a:xfrm>
+      </p:grpSpPr>
+      <p:sp>
+        <p:nvSpPr>
+          <p:cNvPr id="2" name="Title 1">
+            <a:extLst>
+              <a:ext uri="{FF2B5EF4-FFF2-40B4-BE49-F238E27FC236}">
+                <a16:creationId xmlns:a16="http://schemas.microsoft.com/office/drawing/2014/main" id="{7D71CE0B-3BBC-4BEB-9ECF-3DCA10062FBA}"/>
+              </a:ext>
+            </a:extLst>
+          </p:cNvPr>
+          <p:cNvSpPr>
+            <a:spLocks noGrp="1"/>
+          </p:cNvSpPr>
+          <p:nvPr>
+            <p:ph type="title"/>
+          </p:nvPr>
+        </p:nvSpPr>
+        <p:spPr/>
+        <p:txBody>
+          <a:bodyPr/>
+          <a:lstStyle/>
+          <a:p>
+            <a:r>
+              <a:rPr lang="en-US" dirty="0"/>
+              <a:t>Conclusions</a:t>
             </a:r>
           </a:p>
         </p:txBody>
@@ -17499,7 +18352,7 @@
           <p:cNvPr id="3" name="Content Placeholder 2">
             <a:extLst>
               <a:ext uri="{FF2B5EF4-FFF2-40B4-BE49-F238E27FC236}">
-                <a16:creationId xmlns:a16="http://schemas.microsoft.com/office/drawing/2014/main" id="{24B81427-8365-412F-B2D7-A0D761DDBF1A}"/>
+                <a16:creationId xmlns:a16="http://schemas.microsoft.com/office/drawing/2014/main" id="{441A1421-EDDE-4B1B-85F6-0D5A37BC3FE0}"/>
               </a:ext>
             </a:extLst>
           </p:cNvPr>
@@ -17517,46 +18370,19 @@
           <a:p>
             <a:r>
               <a:rPr lang="en-US" dirty="0"/>
-              <a:t>Julia documentation</a:t>
-            </a:r>
-            <a:br>
-              <a:rPr lang="en-US" dirty="0"/>
-            </a:br>
-            <a:r>
-              <a:rPr lang="en-US" dirty="0">
-                <a:hlinkClick r:id="rId2"/>
-              </a:rPr>
-              <a:t>https://docs.julialang.org/en/v1/</a:t>
-            </a:r>
-            <a:endParaRPr lang="en-US" dirty="0"/>
-          </a:p>
-          <a:p>
-            <a:r>
-              <a:rPr lang="en-US" i="1" dirty="0"/>
-              <a:t>Hands on design patterns and best practices with Julia</a:t>
-            </a:r>
-            <a:br>
-              <a:rPr lang="en-US" dirty="0"/>
-            </a:br>
-            <a:r>
-              <a:rPr lang="en-US" dirty="0"/>
-              <a:t>Tom </a:t>
-            </a:r>
-            <a:r>
-              <a:rPr lang="en-US" dirty="0" err="1"/>
-              <a:t>Kwong</a:t>
-            </a:r>
-            <a:r>
-              <a:rPr lang="en-US" dirty="0"/>
-              <a:t>, 2020, </a:t>
-            </a:r>
-            <a:r>
-              <a:rPr lang="en-US" dirty="0" err="1"/>
-              <a:t>Packt</a:t>
-            </a:r>
-            <a:r>
-              <a:rPr lang="en-US" dirty="0"/>
-              <a:t>&gt;</a:t>
+              <a:t>Good?</a:t>
+            </a:r>
+          </a:p>
+          <a:p>
+            <a:r>
+              <a:rPr lang="en-US" dirty="0"/>
+              <a:t>Bad?</a:t>
+            </a:r>
+          </a:p>
+          <a:p>
+            <a:r>
+              <a:rPr lang="en-US" dirty="0"/>
+              <a:t>Ugly?</a:t>
             </a:r>
           </a:p>
         </p:txBody>
@@ -17566,7 +18392,7 @@
           <p:cNvPr id="4" name="Slide Number Placeholder 3">
             <a:extLst>
               <a:ext uri="{FF2B5EF4-FFF2-40B4-BE49-F238E27FC236}">
-                <a16:creationId xmlns:a16="http://schemas.microsoft.com/office/drawing/2014/main" id="{37498B32-CB3D-4A06-ACBE-71F1E8CF3FE5}"/>
+                <a16:creationId xmlns:a16="http://schemas.microsoft.com/office/drawing/2014/main" id="{E421E6EB-94E9-4637-BB17-1BC09770C791}"/>
               </a:ext>
             </a:extLst>
           </p:cNvPr>
@@ -17584,7 +18410,201 @@
           <a:p>
             <a:fld id="{78F7A1EC-23D1-431D-8C93-9C4ED5D4A04D}" type="slidenum">
               <a:rPr lang="en-US" smtClean="0"/>
-              <a:t>41</a:t>
+              <a:t>42</a:t>
+            </a:fld>
+            <a:endParaRPr lang="en-US"/>
+          </a:p>
+        </p:txBody>
+      </p:sp>
+      <p:sp>
+        <p:nvSpPr>
+          <p:cNvPr id="5" name="TextBox 4">
+            <a:extLst>
+              <a:ext uri="{FF2B5EF4-FFF2-40B4-BE49-F238E27FC236}">
+                <a16:creationId xmlns:a16="http://schemas.microsoft.com/office/drawing/2014/main" id="{0D0F5D6D-CB01-487D-9919-87E16B452D83}"/>
+              </a:ext>
+            </a:extLst>
+          </p:cNvPr>
+          <p:cNvSpPr txBox="1"/>
+          <p:nvPr/>
+        </p:nvSpPr>
+        <p:spPr>
+          <a:xfrm>
+            <a:off x="3599935" y="2273643"/>
+            <a:ext cx="1503745" cy="461665"/>
+          </a:xfrm>
+          <a:prstGeom prst="rect">
+            <a:avLst/>
+          </a:prstGeom>
+          <a:noFill/>
+          <a:ln>
+            <a:solidFill>
+              <a:schemeClr val="tx1"/>
+            </a:solidFill>
+          </a:ln>
+        </p:spPr>
+        <p:txBody>
+          <a:bodyPr wrap="none" rtlCol="0">
+            <a:spAutoFit/>
+          </a:bodyPr>
+          <a:lstStyle/>
+          <a:p>
+            <a:r>
+              <a:rPr lang="en-US" sz="2400" dirty="0"/>
+              <a:t>Up to you!</a:t>
+            </a:r>
+          </a:p>
+        </p:txBody>
+      </p:sp>
+    </p:spTree>
+    <p:extLst>
+      <p:ext uri="{BB962C8B-B14F-4D97-AF65-F5344CB8AC3E}">
+        <p14:creationId xmlns:p14="http://schemas.microsoft.com/office/powerpoint/2010/main" val="59738894"/>
+      </p:ext>
+    </p:extLst>
+  </p:cSld>
+  <p:clrMapOvr>
+    <a:masterClrMapping/>
+  </p:clrMapOvr>
+</p:sld>
+</file>
+
+<file path=ppt/slides/slide43.xml><?xml version="1.0" encoding="utf-8"?>
+<p:sld xmlns:a="http://schemas.openxmlformats.org/drawingml/2006/main" xmlns:r="http://schemas.openxmlformats.org/officeDocument/2006/relationships" xmlns:p="http://schemas.openxmlformats.org/presentationml/2006/main">
+  <p:cSld>
+    <p:spTree>
+      <p:nvGrpSpPr>
+        <p:cNvPr id="1" name=""/>
+        <p:cNvGrpSpPr/>
+        <p:nvPr/>
+      </p:nvGrpSpPr>
+      <p:grpSpPr>
+        <a:xfrm>
+          <a:off x="0" y="0"/>
+          <a:ext cx="0" cy="0"/>
+          <a:chOff x="0" y="0"/>
+          <a:chExt cx="0" cy="0"/>
+        </a:xfrm>
+      </p:grpSpPr>
+      <p:sp>
+        <p:nvSpPr>
+          <p:cNvPr id="2" name="Title 1">
+            <a:extLst>
+              <a:ext uri="{FF2B5EF4-FFF2-40B4-BE49-F238E27FC236}">
+                <a16:creationId xmlns:a16="http://schemas.microsoft.com/office/drawing/2014/main" id="{14D02DFE-982D-454E-88FE-F58EAAD99062}"/>
+              </a:ext>
+            </a:extLst>
+          </p:cNvPr>
+          <p:cNvSpPr>
+            <a:spLocks noGrp="1"/>
+          </p:cNvSpPr>
+          <p:nvPr>
+            <p:ph type="title"/>
+          </p:nvPr>
+        </p:nvSpPr>
+        <p:spPr/>
+        <p:txBody>
+          <a:bodyPr/>
+          <a:lstStyle/>
+          <a:p>
+            <a:r>
+              <a:rPr lang="en-US" dirty="0"/>
+              <a:t>References</a:t>
+            </a:r>
+          </a:p>
+        </p:txBody>
+      </p:sp>
+      <p:sp>
+        <p:nvSpPr>
+          <p:cNvPr id="3" name="Content Placeholder 2">
+            <a:extLst>
+              <a:ext uri="{FF2B5EF4-FFF2-40B4-BE49-F238E27FC236}">
+                <a16:creationId xmlns:a16="http://schemas.microsoft.com/office/drawing/2014/main" id="{24B81427-8365-412F-B2D7-A0D761DDBF1A}"/>
+              </a:ext>
+            </a:extLst>
+          </p:cNvPr>
+          <p:cNvSpPr>
+            <a:spLocks noGrp="1"/>
+          </p:cNvSpPr>
+          <p:nvPr>
+            <p:ph idx="1"/>
+          </p:nvPr>
+        </p:nvSpPr>
+        <p:spPr/>
+        <p:txBody>
+          <a:bodyPr/>
+          <a:lstStyle/>
+          <a:p>
+            <a:r>
+              <a:rPr lang="en-US" dirty="0"/>
+              <a:t>Julia documentation</a:t>
+            </a:r>
+            <a:br>
+              <a:rPr lang="en-US" dirty="0"/>
+            </a:br>
+            <a:r>
+              <a:rPr lang="en-US" dirty="0">
+                <a:hlinkClick r:id="rId2"/>
+              </a:rPr>
+              <a:t>https://docs.julialang.org/</a:t>
+            </a:r>
+            <a:endParaRPr lang="en-US" dirty="0"/>
+          </a:p>
+          <a:p>
+            <a:r>
+              <a:rPr lang="en-US" i="1" dirty="0"/>
+              <a:t>Hands on design patterns and best practices with Julia</a:t>
+            </a:r>
+            <a:br>
+              <a:rPr lang="en-US" dirty="0"/>
+            </a:br>
+            <a:r>
+              <a:rPr lang="en-US" dirty="0"/>
+              <a:t>Tom </a:t>
+            </a:r>
+            <a:r>
+              <a:rPr lang="en-US" dirty="0" err="1"/>
+              <a:t>Kwong</a:t>
+            </a:r>
+            <a:r>
+              <a:rPr lang="en-US" dirty="0"/>
+              <a:t>, 2020, </a:t>
+            </a:r>
+            <a:r>
+              <a:rPr lang="en-US" dirty="0" err="1"/>
+              <a:t>Packt</a:t>
+            </a:r>
+            <a:r>
+              <a:rPr lang="en-US" dirty="0"/>
+              <a:t>&gt;</a:t>
+            </a:r>
+          </a:p>
+        </p:txBody>
+      </p:sp>
+      <p:sp>
+        <p:nvSpPr>
+          <p:cNvPr id="4" name="Slide Number Placeholder 3">
+            <a:extLst>
+              <a:ext uri="{FF2B5EF4-FFF2-40B4-BE49-F238E27FC236}">
+                <a16:creationId xmlns:a16="http://schemas.microsoft.com/office/drawing/2014/main" id="{37498B32-CB3D-4A06-ACBE-71F1E8CF3FE5}"/>
+              </a:ext>
+            </a:extLst>
+          </p:cNvPr>
+          <p:cNvSpPr>
+            <a:spLocks noGrp="1"/>
+          </p:cNvSpPr>
+          <p:nvPr>
+            <p:ph type="sldNum" sz="quarter" idx="12"/>
+          </p:nvPr>
+        </p:nvSpPr>
+        <p:spPr/>
+        <p:txBody>
+          <a:bodyPr/>
+          <a:lstStyle/>
+          <a:p>
+            <a:fld id="{78F7A1EC-23D1-431D-8C93-9C4ED5D4A04D}" type="slidenum">
+              <a:rPr lang="en-US" smtClean="0"/>
+              <a:t>43</a:t>
             </a:fld>
             <a:endParaRPr lang="en-US"/>
           </a:p>

</xml_diff>